<commit_message>
working on shuffling between Mod 01 and 02
</commit_message>
<xml_diff>
--- a/Slides/Lesson 1.3 The Data Design Recipe.pptx
+++ b/Slides/Lesson 1.3 The Data Design Recipe.pptx
@@ -4597,7 +4597,17 @@
           <a:p>
             <a:r>
               <a:rPr lang="en-US" dirty="0"/>
-              <a:t>;; A Rocket is represented as a struct (make-rocket altitude velocity)</a:t>
+              <a:t>;; A Rocket is represented as a struct </a:t>
+            </a:r>
+          </a:p>
+          <a:p>
+            <a:r>
+              <a:rPr lang="en-US"/>
+              <a:t>;;   (</a:t>
+            </a:r>
+            <a:r>
+              <a:rPr lang="en-US" dirty="0"/>
+              <a:t>make-rocket altitude velocity)</a:t>
             </a:r>
           </a:p>
           <a:p>
@@ -4617,7 +4627,6 @@
               <a:rPr lang="en-US" dirty="0"/>
               <a:t>;; velocity : Velocity  is the rocket's velocity</a:t>
             </a:r>
-            <a:endParaRPr lang="en-US" dirty="0"/>
           </a:p>
         </p:txBody>
       </p:sp>
@@ -6487,7 +6496,6 @@
               <a:rPr lang="en-US" dirty="0"/>
               <a:t>)</a:t>
             </a:r>
-            <a:endParaRPr lang="en-US" dirty="0"/>
           </a:p>
         </p:txBody>
       </p:sp>
@@ -7528,7 +7536,6 @@
               <a:rPr lang="en-US" dirty="0"/>
               <a:t> in [1800,2100]</a:t>
             </a:r>
-            <a:endParaRPr lang="en-US" dirty="0"/>
           </a:p>
         </p:txBody>
       </p:sp>
@@ -7929,7 +7936,6 @@
               <a:rPr lang="en-US" dirty="0"/>
               <a:t>    [(= s 30) ...]))</a:t>
             </a:r>
-            <a:endParaRPr lang="en-US" dirty="0"/>
           </a:p>
         </p:txBody>
       </p:sp>
@@ -8988,7 +8994,6 @@
               <a:rPr lang="en-US" dirty="0"/>
               <a:t>, you MUST write "any string will do".</a:t>
             </a:r>
-            <a:endParaRPr lang="en-US" dirty="0"/>
           </a:p>
         </p:txBody>
       </p:sp>
@@ -9031,7 +9036,6 @@
               <a:rPr lang="en-US" dirty="0"/>
               <a:t> further.	</a:t>
             </a:r>
-            <a:endParaRPr lang="en-US" dirty="0"/>
           </a:p>
         </p:txBody>
       </p:sp>
@@ -9766,7 +9770,6 @@
               <a:rPr lang="en-US" sz="1200" dirty="0"/>
               <a:t>    [(tea-order?    order) ...]))</a:t>
             </a:r>
-            <a:endParaRPr lang="en-US" sz="1200" dirty="0"/>
           </a:p>
         </p:txBody>
       </p:sp>
@@ -10257,7 +10260,6 @@
               <a:rPr lang="en-US" dirty="0"/>
               <a:t>    [(tea-order?    order) (yet-another-function order)]))</a:t>
             </a:r>
-            <a:endParaRPr lang="en-US" dirty="0"/>
           </a:p>
         </p:txBody>
       </p:sp>
@@ -11656,7 +11658,6 @@
               <a:rPr lang="en-US" dirty="0"/>
               <a:t>;;                     (e.g. $7.95 =&gt; 795)</a:t>
             </a:r>
-            <a:endParaRPr lang="en-US" dirty="0"/>
           </a:p>
         </p:txBody>
       </p:sp>

</xml_diff>

<commit_message>
helps to save the ppt files before you commit..
</commit_message>
<xml_diff>
--- a/Slides/Lesson 1.3 The Data Design Recipe.pptx
+++ b/Slides/Lesson 1.3 The Data Design Recipe.pptx
@@ -4602,12 +4602,8 @@
           </a:p>
           <a:p>
             <a:r>
-              <a:rPr lang="en-US"/>
-              <a:t>;;   (</a:t>
-            </a:r>
-            <a:r>
-              <a:rPr lang="en-US" dirty="0"/>
-              <a:t>make-rocket altitude velocity)</a:t>
+              <a:rPr lang="en-US" dirty="0"/>
+              <a:t>;;   (make-rocket altitude velocity)</a:t>
             </a:r>
           </a:p>
           <a:p>
@@ -6787,6 +6783,115 @@
               <a:t>17</a:t>
             </a:fld>
             <a:endParaRPr lang="en-US" dirty="0"/>
+          </a:p>
+        </p:txBody>
+      </p:sp>
+      <p:sp>
+        <p:nvSpPr>
+          <p:cNvPr id="5" name="TextBox 4"/>
+          <p:cNvSpPr txBox="1"/>
+          <p:nvPr/>
+        </p:nvSpPr>
+        <p:spPr>
+          <a:xfrm>
+            <a:off x="3962400" y="4672718"/>
+            <a:ext cx="3276600" cy="923330"/>
+          </a:xfrm>
+          <a:prstGeom prst="rect">
+            <a:avLst/>
+          </a:prstGeom>
+          <a:solidFill>
+            <a:schemeClr val="accent1">
+              <a:lumMod val="20000"/>
+              <a:lumOff val="80000"/>
+            </a:schemeClr>
+          </a:solidFill>
+        </p:spPr>
+        <p:txBody>
+          <a:bodyPr wrap="square" rtlCol="0">
+            <a:spAutoFit/>
+          </a:bodyPr>
+          <a:lstStyle/>
+          <a:p>
+            <a:r>
+              <a:rPr lang="en-US" dirty="0"/>
+              <a:t>We can fill in the ... with any expression, using any or all of the expressions in the inventory.</a:t>
+            </a:r>
+          </a:p>
+        </p:txBody>
+      </p:sp>
+      <p:sp>
+        <p:nvSpPr>
+          <p:cNvPr id="6" name="Right Brace 5"/>
+          <p:cNvSpPr/>
+          <p:nvPr/>
+        </p:nvSpPr>
+        <p:spPr>
+          <a:xfrm>
+            <a:off x="3733800" y="3124200"/>
+            <a:ext cx="228600" cy="1371600"/>
+          </a:xfrm>
+          <a:prstGeom prst="rightBrace">
+            <a:avLst>
+              <a:gd name="adj1" fmla="val 33333"/>
+              <a:gd name="adj2" fmla="val 50000"/>
+            </a:avLst>
+          </a:prstGeom>
+        </p:spPr>
+        <p:style>
+          <a:lnRef idx="1">
+            <a:schemeClr val="accent1"/>
+          </a:lnRef>
+          <a:fillRef idx="0">
+            <a:schemeClr val="accent1"/>
+          </a:fillRef>
+          <a:effectRef idx="0">
+            <a:schemeClr val="accent1"/>
+          </a:effectRef>
+          <a:fontRef idx="minor">
+            <a:schemeClr val="tx1"/>
+          </a:fontRef>
+        </p:style>
+        <p:txBody>
+          <a:bodyPr rtlCol="0" anchor="ctr"/>
+          <a:lstStyle/>
+          <a:p>
+            <a:pPr algn="ctr"/>
+            <a:endParaRPr lang="en-US"/>
+          </a:p>
+        </p:txBody>
+      </p:sp>
+      <p:sp>
+        <p:nvSpPr>
+          <p:cNvPr id="7" name="TextBox 6"/>
+          <p:cNvSpPr txBox="1"/>
+          <p:nvPr/>
+        </p:nvSpPr>
+        <p:spPr>
+          <a:xfrm>
+            <a:off x="3973689" y="3348335"/>
+            <a:ext cx="2590800" cy="923330"/>
+          </a:xfrm>
+          <a:prstGeom prst="rect">
+            <a:avLst/>
+          </a:prstGeom>
+          <a:solidFill>
+            <a:schemeClr val="accent1">
+              <a:lumMod val="20000"/>
+              <a:lumOff val="80000"/>
+            </a:schemeClr>
+          </a:solidFill>
+        </p:spPr>
+        <p:txBody>
+          <a:bodyPr wrap="square" rtlCol="0">
+            <a:spAutoFit/>
+          </a:bodyPr>
+          <a:lstStyle/>
+          <a:p>
+            <a:r>
+              <a:rPr lang="en-US" dirty="0"/>
+              <a:t>This is an inventory of the quantities we can use to construct the answer.</a:t>
+            </a:r>
           </a:p>
         </p:txBody>
       </p:sp>

</xml_diff>

<commit_message>
almost done with L2.3
</commit_message>
<xml_diff>
--- a/Slides/Lesson 1.3 The Data Design Recipe.pptx
+++ b/Slides/Lesson 1.3 The Data Design Recipe.pptx
@@ -5,7 +5,7 @@
     <p:sldMasterId id="2147483648" r:id="rId1"/>
   </p:sldMasterIdLst>
   <p:notesMasterIdLst>
-    <p:notesMasterId r:id="rId35"/>
+    <p:notesMasterId r:id="rId37"/>
   </p:notesMasterIdLst>
   <p:sldIdLst>
     <p:sldId id="378" r:id="rId2"/>
@@ -38,9 +38,11 @@
     <p:sldId id="437" r:id="rId29"/>
     <p:sldId id="441" r:id="rId30"/>
     <p:sldId id="442" r:id="rId31"/>
-    <p:sldId id="415" r:id="rId32"/>
-    <p:sldId id="416" r:id="rId33"/>
-    <p:sldId id="417" r:id="rId34"/>
+    <p:sldId id="443" r:id="rId32"/>
+    <p:sldId id="444" r:id="rId33"/>
+    <p:sldId id="415" r:id="rId34"/>
+    <p:sldId id="416" r:id="rId35"/>
+    <p:sldId id="417" r:id="rId36"/>
   </p:sldIdLst>
   <p:sldSz cx="9144000" cy="6858000" type="screen4x3"/>
   <p:notesSz cx="6858000" cy="9144000"/>
@@ -174,6 +176,8 @@
             <p14:sldId id="437"/>
             <p14:sldId id="441"/>
             <p14:sldId id="442"/>
+            <p14:sldId id="443"/>
+            <p14:sldId id="444"/>
             <p14:sldId id="415"/>
             <p14:sldId id="416"/>
             <p14:sldId id="417"/>
@@ -199,6 +203,3875 @@
 </p:presentation>
 </file>
 
+<file path=ppt/diagrams/colors1.xml><?xml version="1.0" encoding="utf-8"?>
+<dgm:colorsDef xmlns:dgm="http://schemas.openxmlformats.org/drawingml/2006/diagram" xmlns:a="http://schemas.openxmlformats.org/drawingml/2006/main" uniqueId="urn:microsoft.com/office/officeart/2005/8/colors/accent0_1">
+  <dgm:title val=""/>
+  <dgm:desc val=""/>
+  <dgm:catLst>
+    <dgm:cat type="mainScheme" pri="10100"/>
+  </dgm:catLst>
+  <dgm:styleLbl name="node0">
+    <dgm:fillClrLst meth="repeat">
+      <a:schemeClr val="lt1"/>
+    </dgm:fillClrLst>
+    <dgm:linClrLst meth="repeat">
+      <a:schemeClr val="dk1">
+        <a:shade val="80000"/>
+      </a:schemeClr>
+    </dgm:linClrLst>
+    <dgm:effectClrLst/>
+    <dgm:txLinClrLst/>
+    <dgm:txFillClrLst meth="repeat">
+      <a:schemeClr val="dk1"/>
+    </dgm:txFillClrLst>
+    <dgm:txEffectClrLst/>
+  </dgm:styleLbl>
+  <dgm:styleLbl name="node1">
+    <dgm:fillClrLst meth="repeat">
+      <a:schemeClr val="lt1"/>
+    </dgm:fillClrLst>
+    <dgm:linClrLst meth="repeat">
+      <a:schemeClr val="dk1">
+        <a:shade val="80000"/>
+      </a:schemeClr>
+    </dgm:linClrLst>
+    <dgm:effectClrLst/>
+    <dgm:txLinClrLst/>
+    <dgm:txFillClrLst meth="repeat">
+      <a:schemeClr val="dk1"/>
+    </dgm:txFillClrLst>
+    <dgm:txEffectClrLst/>
+  </dgm:styleLbl>
+  <dgm:styleLbl name="alignNode1">
+    <dgm:fillClrLst meth="repeat">
+      <a:schemeClr val="lt1"/>
+    </dgm:fillClrLst>
+    <dgm:linClrLst meth="repeat">
+      <a:schemeClr val="dk1">
+        <a:shade val="80000"/>
+      </a:schemeClr>
+    </dgm:linClrLst>
+    <dgm:effectClrLst/>
+    <dgm:txLinClrLst/>
+    <dgm:txFillClrLst meth="repeat">
+      <a:schemeClr val="dk1"/>
+    </dgm:txFillClrLst>
+    <dgm:txEffectClrLst/>
+  </dgm:styleLbl>
+  <dgm:styleLbl name="lnNode1">
+    <dgm:fillClrLst meth="repeat">
+      <a:schemeClr val="lt1"/>
+    </dgm:fillClrLst>
+    <dgm:linClrLst meth="repeat">
+      <a:schemeClr val="dk1">
+        <a:shade val="80000"/>
+      </a:schemeClr>
+    </dgm:linClrLst>
+    <dgm:effectClrLst/>
+    <dgm:txLinClrLst/>
+    <dgm:txFillClrLst meth="repeat">
+      <a:schemeClr val="dk1"/>
+    </dgm:txFillClrLst>
+    <dgm:txEffectClrLst/>
+  </dgm:styleLbl>
+  <dgm:styleLbl name="vennNode1">
+    <dgm:fillClrLst meth="repeat">
+      <a:schemeClr val="lt1">
+        <a:alpha val="50000"/>
+      </a:schemeClr>
+    </dgm:fillClrLst>
+    <dgm:linClrLst meth="repeat">
+      <a:schemeClr val="dk1">
+        <a:shade val="80000"/>
+      </a:schemeClr>
+    </dgm:linClrLst>
+    <dgm:effectClrLst/>
+    <dgm:txLinClrLst/>
+    <dgm:txFillClrLst/>
+    <dgm:txEffectClrLst/>
+  </dgm:styleLbl>
+  <dgm:styleLbl name="node2">
+    <dgm:fillClrLst meth="repeat">
+      <a:schemeClr val="lt1"/>
+    </dgm:fillClrLst>
+    <dgm:linClrLst meth="repeat">
+      <a:schemeClr val="dk1">
+        <a:shade val="80000"/>
+      </a:schemeClr>
+    </dgm:linClrLst>
+    <dgm:effectClrLst/>
+    <dgm:txLinClrLst/>
+    <dgm:txFillClrLst meth="repeat">
+      <a:schemeClr val="dk1"/>
+    </dgm:txFillClrLst>
+    <dgm:txEffectClrLst/>
+  </dgm:styleLbl>
+  <dgm:styleLbl name="node3">
+    <dgm:fillClrLst meth="repeat">
+      <a:schemeClr val="lt1"/>
+    </dgm:fillClrLst>
+    <dgm:linClrLst meth="repeat">
+      <a:schemeClr val="dk1">
+        <a:shade val="80000"/>
+      </a:schemeClr>
+    </dgm:linClrLst>
+    <dgm:effectClrLst/>
+    <dgm:txLinClrLst/>
+    <dgm:txFillClrLst meth="repeat">
+      <a:schemeClr val="dk1"/>
+    </dgm:txFillClrLst>
+    <dgm:txEffectClrLst/>
+  </dgm:styleLbl>
+  <dgm:styleLbl name="node4">
+    <dgm:fillClrLst meth="repeat">
+      <a:schemeClr val="lt1"/>
+    </dgm:fillClrLst>
+    <dgm:linClrLst meth="repeat">
+      <a:schemeClr val="dk1">
+        <a:shade val="80000"/>
+      </a:schemeClr>
+    </dgm:linClrLst>
+    <dgm:effectClrLst/>
+    <dgm:txLinClrLst/>
+    <dgm:txFillClrLst meth="repeat">
+      <a:schemeClr val="dk1"/>
+    </dgm:txFillClrLst>
+    <dgm:txEffectClrLst/>
+  </dgm:styleLbl>
+  <dgm:styleLbl name="fgImgPlace1">
+    <dgm:fillClrLst meth="repeat">
+      <a:schemeClr val="dk1">
+        <a:tint val="40000"/>
+      </a:schemeClr>
+    </dgm:fillClrLst>
+    <dgm:linClrLst meth="repeat">
+      <a:schemeClr val="dk1">
+        <a:shade val="80000"/>
+      </a:schemeClr>
+    </dgm:linClrLst>
+    <dgm:effectClrLst/>
+    <dgm:txLinClrLst/>
+    <dgm:txFillClrLst meth="repeat">
+      <a:schemeClr val="lt1"/>
+    </dgm:txFillClrLst>
+    <dgm:txEffectClrLst/>
+  </dgm:styleLbl>
+  <dgm:styleLbl name="alignImgPlace1">
+    <dgm:fillClrLst meth="repeat">
+      <a:schemeClr val="dk1">
+        <a:tint val="40000"/>
+      </a:schemeClr>
+    </dgm:fillClrLst>
+    <dgm:linClrLst meth="repeat">
+      <a:schemeClr val="dk1">
+        <a:shade val="80000"/>
+      </a:schemeClr>
+    </dgm:linClrLst>
+    <dgm:effectClrLst/>
+    <dgm:txLinClrLst/>
+    <dgm:txFillClrLst meth="repeat">
+      <a:schemeClr val="lt1"/>
+    </dgm:txFillClrLst>
+    <dgm:txEffectClrLst/>
+  </dgm:styleLbl>
+  <dgm:styleLbl name="bgImgPlace1">
+    <dgm:fillClrLst meth="repeat">
+      <a:schemeClr val="dk1">
+        <a:tint val="40000"/>
+      </a:schemeClr>
+    </dgm:fillClrLst>
+    <dgm:linClrLst meth="repeat">
+      <a:schemeClr val="dk1">
+        <a:shade val="80000"/>
+      </a:schemeClr>
+    </dgm:linClrLst>
+    <dgm:effectClrLst/>
+    <dgm:txLinClrLst/>
+    <dgm:txFillClrLst meth="repeat">
+      <a:schemeClr val="lt1"/>
+    </dgm:txFillClrLst>
+    <dgm:txEffectClrLst/>
+  </dgm:styleLbl>
+  <dgm:styleLbl name="sibTrans2D1">
+    <dgm:fillClrLst meth="repeat">
+      <a:schemeClr val="dk1">
+        <a:tint val="60000"/>
+      </a:schemeClr>
+    </dgm:fillClrLst>
+    <dgm:linClrLst meth="repeat">
+      <a:schemeClr val="dk1">
+        <a:tint val="60000"/>
+      </a:schemeClr>
+    </dgm:linClrLst>
+    <dgm:effectClrLst/>
+    <dgm:txLinClrLst/>
+    <dgm:txFillClrLst meth="repeat">
+      <a:schemeClr val="dk1"/>
+    </dgm:txFillClrLst>
+    <dgm:txEffectClrLst/>
+  </dgm:styleLbl>
+  <dgm:styleLbl name="fgSibTrans2D1">
+    <dgm:fillClrLst meth="repeat">
+      <a:schemeClr val="dk1">
+        <a:tint val="60000"/>
+      </a:schemeClr>
+    </dgm:fillClrLst>
+    <dgm:linClrLst meth="repeat">
+      <a:schemeClr val="dk1">
+        <a:tint val="60000"/>
+      </a:schemeClr>
+    </dgm:linClrLst>
+    <dgm:effectClrLst/>
+    <dgm:txLinClrLst/>
+    <dgm:txFillClrLst meth="repeat">
+      <a:schemeClr val="dk1"/>
+    </dgm:txFillClrLst>
+    <dgm:txEffectClrLst/>
+  </dgm:styleLbl>
+  <dgm:styleLbl name="bgSibTrans2D1">
+    <dgm:fillClrLst meth="repeat">
+      <a:schemeClr val="dk1">
+        <a:tint val="60000"/>
+      </a:schemeClr>
+    </dgm:fillClrLst>
+    <dgm:linClrLst meth="repeat">
+      <a:schemeClr val="dk1">
+        <a:tint val="60000"/>
+      </a:schemeClr>
+    </dgm:linClrLst>
+    <dgm:effectClrLst/>
+    <dgm:txLinClrLst/>
+    <dgm:txFillClrLst meth="repeat">
+      <a:schemeClr val="dk1"/>
+    </dgm:txFillClrLst>
+    <dgm:txEffectClrLst/>
+  </dgm:styleLbl>
+  <dgm:styleLbl name="sibTrans1D1">
+    <dgm:fillClrLst meth="repeat">
+      <a:schemeClr val="dk1"/>
+    </dgm:fillClrLst>
+    <dgm:linClrLst meth="repeat">
+      <a:schemeClr val="dk1"/>
+    </dgm:linClrLst>
+    <dgm:effectClrLst/>
+    <dgm:txLinClrLst/>
+    <dgm:txFillClrLst meth="repeat">
+      <a:schemeClr val="tx1"/>
+    </dgm:txFillClrLst>
+    <dgm:txEffectClrLst/>
+  </dgm:styleLbl>
+  <dgm:styleLbl name="callout">
+    <dgm:fillClrLst meth="repeat">
+      <a:schemeClr val="dk1"/>
+    </dgm:fillClrLst>
+    <dgm:linClrLst meth="repeat">
+      <a:schemeClr val="dk1"/>
+    </dgm:linClrLst>
+    <dgm:effectClrLst/>
+    <dgm:txLinClrLst/>
+    <dgm:txFillClrLst meth="repeat">
+      <a:schemeClr val="tx1"/>
+    </dgm:txFillClrLst>
+    <dgm:txEffectClrLst/>
+  </dgm:styleLbl>
+  <dgm:styleLbl name="asst0">
+    <dgm:fillClrLst meth="repeat">
+      <a:schemeClr val="lt1"/>
+    </dgm:fillClrLst>
+    <dgm:linClrLst meth="repeat">
+      <a:schemeClr val="dk1">
+        <a:shade val="80000"/>
+      </a:schemeClr>
+    </dgm:linClrLst>
+    <dgm:effectClrLst/>
+    <dgm:txLinClrLst/>
+    <dgm:txFillClrLst meth="repeat">
+      <a:schemeClr val="dk1"/>
+    </dgm:txFillClrLst>
+    <dgm:txEffectClrLst/>
+  </dgm:styleLbl>
+  <dgm:styleLbl name="asst1">
+    <dgm:fillClrLst meth="repeat">
+      <a:schemeClr val="lt1"/>
+    </dgm:fillClrLst>
+    <dgm:linClrLst meth="repeat">
+      <a:schemeClr val="dk1">
+        <a:shade val="80000"/>
+      </a:schemeClr>
+    </dgm:linClrLst>
+    <dgm:effectClrLst/>
+    <dgm:txLinClrLst/>
+    <dgm:txFillClrLst meth="repeat">
+      <a:schemeClr val="dk1"/>
+    </dgm:txFillClrLst>
+    <dgm:txEffectClrLst/>
+  </dgm:styleLbl>
+  <dgm:styleLbl name="asst2">
+    <dgm:fillClrLst meth="repeat">
+      <a:schemeClr val="lt1"/>
+    </dgm:fillClrLst>
+    <dgm:linClrLst meth="repeat">
+      <a:schemeClr val="dk1">
+        <a:shade val="80000"/>
+      </a:schemeClr>
+    </dgm:linClrLst>
+    <dgm:effectClrLst/>
+    <dgm:txLinClrLst/>
+    <dgm:txFillClrLst meth="repeat">
+      <a:schemeClr val="dk1"/>
+    </dgm:txFillClrLst>
+    <dgm:txEffectClrLst/>
+  </dgm:styleLbl>
+  <dgm:styleLbl name="asst3">
+    <dgm:fillClrLst meth="repeat">
+      <a:schemeClr val="lt1"/>
+    </dgm:fillClrLst>
+    <dgm:linClrLst meth="repeat">
+      <a:schemeClr val="dk1">
+        <a:shade val="80000"/>
+      </a:schemeClr>
+    </dgm:linClrLst>
+    <dgm:effectClrLst/>
+    <dgm:txLinClrLst/>
+    <dgm:txFillClrLst meth="repeat">
+      <a:schemeClr val="dk1"/>
+    </dgm:txFillClrLst>
+    <dgm:txEffectClrLst/>
+  </dgm:styleLbl>
+  <dgm:styleLbl name="asst4">
+    <dgm:fillClrLst meth="repeat">
+      <a:schemeClr val="lt1"/>
+    </dgm:fillClrLst>
+    <dgm:linClrLst meth="repeat">
+      <a:schemeClr val="dk1">
+        <a:shade val="80000"/>
+      </a:schemeClr>
+    </dgm:linClrLst>
+    <dgm:effectClrLst/>
+    <dgm:txLinClrLst/>
+    <dgm:txFillClrLst meth="repeat">
+      <a:schemeClr val="dk1"/>
+    </dgm:txFillClrLst>
+    <dgm:txEffectClrLst/>
+  </dgm:styleLbl>
+  <dgm:styleLbl name="parChTrans2D1">
+    <dgm:fillClrLst meth="repeat">
+      <a:schemeClr val="dk1">
+        <a:tint val="60000"/>
+      </a:schemeClr>
+    </dgm:fillClrLst>
+    <dgm:linClrLst meth="repeat">
+      <a:schemeClr val="dk1">
+        <a:tint val="60000"/>
+      </a:schemeClr>
+    </dgm:linClrLst>
+    <dgm:effectClrLst/>
+    <dgm:txLinClrLst/>
+    <dgm:txFillClrLst/>
+    <dgm:txEffectClrLst/>
+  </dgm:styleLbl>
+  <dgm:styleLbl name="parChTrans2D2">
+    <dgm:fillClrLst meth="repeat">
+      <a:schemeClr val="dk1"/>
+    </dgm:fillClrLst>
+    <dgm:linClrLst meth="repeat">
+      <a:schemeClr val="dk1"/>
+    </dgm:linClrLst>
+    <dgm:effectClrLst/>
+    <dgm:txLinClrLst/>
+    <dgm:txFillClrLst/>
+    <dgm:txEffectClrLst/>
+  </dgm:styleLbl>
+  <dgm:styleLbl name="parChTrans2D3">
+    <dgm:fillClrLst meth="repeat">
+      <a:schemeClr val="dk1"/>
+    </dgm:fillClrLst>
+    <dgm:linClrLst meth="repeat">
+      <a:schemeClr val="dk1"/>
+    </dgm:linClrLst>
+    <dgm:effectClrLst/>
+    <dgm:txLinClrLst/>
+    <dgm:txFillClrLst/>
+    <dgm:txEffectClrLst/>
+  </dgm:styleLbl>
+  <dgm:styleLbl name="parChTrans2D4">
+    <dgm:fillClrLst meth="repeat">
+      <a:schemeClr val="dk1"/>
+    </dgm:fillClrLst>
+    <dgm:linClrLst meth="repeat">
+      <a:schemeClr val="dk1"/>
+    </dgm:linClrLst>
+    <dgm:effectClrLst/>
+    <dgm:txLinClrLst/>
+    <dgm:txFillClrLst meth="repeat">
+      <a:schemeClr val="lt1"/>
+    </dgm:txFillClrLst>
+    <dgm:txEffectClrLst/>
+  </dgm:styleLbl>
+  <dgm:styleLbl name="parChTrans1D1">
+    <dgm:fillClrLst meth="repeat">
+      <a:schemeClr val="dk1"/>
+    </dgm:fillClrLst>
+    <dgm:linClrLst meth="repeat">
+      <a:schemeClr val="dk1">
+        <a:shade val="60000"/>
+      </a:schemeClr>
+    </dgm:linClrLst>
+    <dgm:effectClrLst/>
+    <dgm:txLinClrLst/>
+    <dgm:txFillClrLst meth="repeat">
+      <a:schemeClr val="tx1"/>
+    </dgm:txFillClrLst>
+    <dgm:txEffectClrLst/>
+  </dgm:styleLbl>
+  <dgm:styleLbl name="parChTrans1D2">
+    <dgm:fillClrLst meth="repeat">
+      <a:schemeClr val="dk1"/>
+    </dgm:fillClrLst>
+    <dgm:linClrLst meth="repeat">
+      <a:schemeClr val="dk1">
+        <a:shade val="60000"/>
+      </a:schemeClr>
+    </dgm:linClrLst>
+    <dgm:effectClrLst/>
+    <dgm:txLinClrLst/>
+    <dgm:txFillClrLst meth="repeat">
+      <a:schemeClr val="tx1"/>
+    </dgm:txFillClrLst>
+    <dgm:txEffectClrLst/>
+  </dgm:styleLbl>
+  <dgm:styleLbl name="parChTrans1D3">
+    <dgm:fillClrLst meth="repeat">
+      <a:schemeClr val="dk1"/>
+    </dgm:fillClrLst>
+    <dgm:linClrLst meth="repeat">
+      <a:schemeClr val="dk1">
+        <a:shade val="80000"/>
+      </a:schemeClr>
+    </dgm:linClrLst>
+    <dgm:effectClrLst/>
+    <dgm:txLinClrLst/>
+    <dgm:txFillClrLst meth="repeat">
+      <a:schemeClr val="tx1"/>
+    </dgm:txFillClrLst>
+    <dgm:txEffectClrLst/>
+  </dgm:styleLbl>
+  <dgm:styleLbl name="parChTrans1D4">
+    <dgm:fillClrLst meth="repeat">
+      <a:schemeClr val="dk1"/>
+    </dgm:fillClrLst>
+    <dgm:linClrLst meth="repeat">
+      <a:schemeClr val="dk1">
+        <a:shade val="80000"/>
+      </a:schemeClr>
+    </dgm:linClrLst>
+    <dgm:effectClrLst/>
+    <dgm:txLinClrLst/>
+    <dgm:txFillClrLst meth="repeat">
+      <a:schemeClr val="tx1"/>
+    </dgm:txFillClrLst>
+    <dgm:txEffectClrLst/>
+  </dgm:styleLbl>
+  <dgm:styleLbl name="fgAcc1">
+    <dgm:fillClrLst meth="repeat">
+      <a:schemeClr val="dk1">
+        <a:alpha val="90000"/>
+        <a:tint val="40000"/>
+      </a:schemeClr>
+    </dgm:fillClrLst>
+    <dgm:linClrLst meth="repeat">
+      <a:schemeClr val="dk1"/>
+    </dgm:linClrLst>
+    <dgm:effectClrLst/>
+    <dgm:txLinClrLst/>
+    <dgm:txFillClrLst meth="repeat">
+      <a:schemeClr val="dk1"/>
+    </dgm:txFillClrLst>
+    <dgm:txEffectClrLst/>
+  </dgm:styleLbl>
+  <dgm:styleLbl name="conFgAcc1">
+    <dgm:fillClrLst meth="repeat">
+      <a:schemeClr val="dk1">
+        <a:alpha val="90000"/>
+        <a:tint val="40000"/>
+      </a:schemeClr>
+    </dgm:fillClrLst>
+    <dgm:linClrLst meth="repeat">
+      <a:schemeClr val="dk1"/>
+    </dgm:linClrLst>
+    <dgm:effectClrLst/>
+    <dgm:txLinClrLst/>
+    <dgm:txFillClrLst meth="repeat">
+      <a:schemeClr val="dk1"/>
+    </dgm:txFillClrLst>
+    <dgm:txEffectClrLst/>
+  </dgm:styleLbl>
+  <dgm:styleLbl name="alignAcc1">
+    <dgm:fillClrLst meth="repeat">
+      <a:schemeClr val="dk1">
+        <a:alpha val="90000"/>
+        <a:tint val="40000"/>
+      </a:schemeClr>
+    </dgm:fillClrLst>
+    <dgm:linClrLst meth="repeat">
+      <a:schemeClr val="dk1"/>
+    </dgm:linClrLst>
+    <dgm:effectClrLst/>
+    <dgm:txLinClrLst/>
+    <dgm:txFillClrLst meth="repeat">
+      <a:schemeClr val="dk1"/>
+    </dgm:txFillClrLst>
+    <dgm:txEffectClrLst/>
+  </dgm:styleLbl>
+  <dgm:styleLbl name="trAlignAcc1">
+    <dgm:fillClrLst meth="repeat">
+      <a:schemeClr val="dk1">
+        <a:alpha val="40000"/>
+        <a:tint val="40000"/>
+      </a:schemeClr>
+    </dgm:fillClrLst>
+    <dgm:linClrLst meth="repeat">
+      <a:schemeClr val="dk1"/>
+    </dgm:linClrLst>
+    <dgm:effectClrLst/>
+    <dgm:txLinClrLst/>
+    <dgm:txFillClrLst meth="repeat">
+      <a:schemeClr val="dk1"/>
+    </dgm:txFillClrLst>
+    <dgm:txEffectClrLst/>
+  </dgm:styleLbl>
+  <dgm:styleLbl name="bgAcc1">
+    <dgm:fillClrLst meth="repeat">
+      <a:schemeClr val="dk1">
+        <a:alpha val="90000"/>
+        <a:tint val="40000"/>
+      </a:schemeClr>
+    </dgm:fillClrLst>
+    <dgm:linClrLst meth="repeat">
+      <a:schemeClr val="dk1"/>
+    </dgm:linClrLst>
+    <dgm:effectClrLst/>
+    <dgm:txLinClrLst/>
+    <dgm:txFillClrLst meth="repeat">
+      <a:schemeClr val="dk1"/>
+    </dgm:txFillClrLst>
+    <dgm:txEffectClrLst/>
+  </dgm:styleLbl>
+  <dgm:styleLbl name="solidFgAcc1">
+    <dgm:fillClrLst meth="repeat">
+      <a:schemeClr val="lt1"/>
+    </dgm:fillClrLst>
+    <dgm:linClrLst meth="repeat">
+      <a:schemeClr val="dk1"/>
+    </dgm:linClrLst>
+    <dgm:effectClrLst/>
+    <dgm:txLinClrLst/>
+    <dgm:txFillClrLst meth="repeat">
+      <a:schemeClr val="dk1"/>
+    </dgm:txFillClrLst>
+    <dgm:txEffectClrLst/>
+  </dgm:styleLbl>
+  <dgm:styleLbl name="solidAlignAcc1">
+    <dgm:fillClrLst meth="repeat">
+      <a:schemeClr val="lt1"/>
+    </dgm:fillClrLst>
+    <dgm:linClrLst meth="repeat">
+      <a:schemeClr val="dk1"/>
+    </dgm:linClrLst>
+    <dgm:effectClrLst/>
+    <dgm:txLinClrLst/>
+    <dgm:txFillClrLst meth="repeat">
+      <a:schemeClr val="dk1"/>
+    </dgm:txFillClrLst>
+    <dgm:txEffectClrLst/>
+  </dgm:styleLbl>
+  <dgm:styleLbl name="solidBgAcc1">
+    <dgm:fillClrLst meth="repeat">
+      <a:schemeClr val="lt1"/>
+    </dgm:fillClrLst>
+    <dgm:linClrLst meth="repeat">
+      <a:schemeClr val="dk1"/>
+    </dgm:linClrLst>
+    <dgm:effectClrLst/>
+    <dgm:txLinClrLst/>
+    <dgm:txFillClrLst meth="repeat">
+      <a:schemeClr val="dk1"/>
+    </dgm:txFillClrLst>
+    <dgm:txEffectClrLst/>
+  </dgm:styleLbl>
+  <dgm:styleLbl name="fgAccFollowNode1">
+    <dgm:fillClrLst meth="repeat">
+      <a:schemeClr val="lt1">
+        <a:alpha val="90000"/>
+        <a:tint val="40000"/>
+      </a:schemeClr>
+    </dgm:fillClrLst>
+    <dgm:linClrLst meth="repeat">
+      <a:schemeClr val="dk1">
+        <a:alpha val="90000"/>
+      </a:schemeClr>
+    </dgm:linClrLst>
+    <dgm:effectClrLst/>
+    <dgm:txLinClrLst/>
+    <dgm:txFillClrLst meth="repeat">
+      <a:schemeClr val="dk1"/>
+    </dgm:txFillClrLst>
+    <dgm:txEffectClrLst/>
+  </dgm:styleLbl>
+  <dgm:styleLbl name="alignAccFollowNode1">
+    <dgm:fillClrLst meth="repeat">
+      <a:schemeClr val="lt1">
+        <a:alpha val="90000"/>
+        <a:tint val="40000"/>
+      </a:schemeClr>
+    </dgm:fillClrLst>
+    <dgm:linClrLst meth="repeat">
+      <a:schemeClr val="dk1">
+        <a:alpha val="90000"/>
+      </a:schemeClr>
+    </dgm:linClrLst>
+    <dgm:effectClrLst/>
+    <dgm:txLinClrLst/>
+    <dgm:txFillClrLst meth="repeat">
+      <a:schemeClr val="dk1"/>
+    </dgm:txFillClrLst>
+    <dgm:txEffectClrLst/>
+  </dgm:styleLbl>
+  <dgm:styleLbl name="bgAccFollowNode1">
+    <dgm:fillClrLst meth="repeat">
+      <a:schemeClr val="lt1">
+        <a:alpha val="90000"/>
+        <a:tint val="40000"/>
+      </a:schemeClr>
+    </dgm:fillClrLst>
+    <dgm:linClrLst meth="repeat">
+      <a:schemeClr val="dk1">
+        <a:alpha val="90000"/>
+      </a:schemeClr>
+    </dgm:linClrLst>
+    <dgm:effectClrLst/>
+    <dgm:txLinClrLst/>
+    <dgm:txFillClrLst meth="repeat">
+      <a:schemeClr val="dk1"/>
+    </dgm:txFillClrLst>
+    <dgm:txEffectClrLst/>
+  </dgm:styleLbl>
+  <dgm:styleLbl name="fgAcc0">
+    <dgm:fillClrLst meth="repeat">
+      <a:schemeClr val="dk1">
+        <a:alpha val="90000"/>
+        <a:tint val="40000"/>
+      </a:schemeClr>
+    </dgm:fillClrLst>
+    <dgm:linClrLst meth="repeat">
+      <a:schemeClr val="dk1"/>
+    </dgm:linClrLst>
+    <dgm:effectClrLst/>
+    <dgm:txLinClrLst/>
+    <dgm:txFillClrLst meth="repeat">
+      <a:schemeClr val="dk1"/>
+    </dgm:txFillClrLst>
+    <dgm:txEffectClrLst/>
+  </dgm:styleLbl>
+  <dgm:styleLbl name="fgAcc2">
+    <dgm:fillClrLst meth="repeat">
+      <a:schemeClr val="dk1">
+        <a:alpha val="90000"/>
+        <a:tint val="40000"/>
+      </a:schemeClr>
+    </dgm:fillClrLst>
+    <dgm:linClrLst meth="repeat">
+      <a:schemeClr val="dk1"/>
+    </dgm:linClrLst>
+    <dgm:effectClrLst/>
+    <dgm:txLinClrLst/>
+    <dgm:txFillClrLst meth="repeat">
+      <a:schemeClr val="dk1"/>
+    </dgm:txFillClrLst>
+    <dgm:txEffectClrLst/>
+  </dgm:styleLbl>
+  <dgm:styleLbl name="fgAcc3">
+    <dgm:fillClrLst meth="repeat">
+      <a:schemeClr val="dk1">
+        <a:alpha val="90000"/>
+        <a:tint val="40000"/>
+      </a:schemeClr>
+    </dgm:fillClrLst>
+    <dgm:linClrLst meth="repeat">
+      <a:schemeClr val="dk1"/>
+    </dgm:linClrLst>
+    <dgm:effectClrLst/>
+    <dgm:txLinClrLst/>
+    <dgm:txFillClrLst meth="repeat">
+      <a:schemeClr val="dk1"/>
+    </dgm:txFillClrLst>
+    <dgm:txEffectClrLst/>
+  </dgm:styleLbl>
+  <dgm:styleLbl name="fgAcc4">
+    <dgm:fillClrLst meth="repeat">
+      <a:schemeClr val="dk1">
+        <a:alpha val="90000"/>
+        <a:tint val="40000"/>
+      </a:schemeClr>
+    </dgm:fillClrLst>
+    <dgm:linClrLst meth="repeat">
+      <a:schemeClr val="dk1"/>
+    </dgm:linClrLst>
+    <dgm:effectClrLst/>
+    <dgm:txLinClrLst/>
+    <dgm:txFillClrLst meth="repeat">
+      <a:schemeClr val="dk1"/>
+    </dgm:txFillClrLst>
+    <dgm:txEffectClrLst/>
+  </dgm:styleLbl>
+  <dgm:styleLbl name="bgShp">
+    <dgm:fillClrLst meth="repeat">
+      <a:schemeClr val="dk1">
+        <a:tint val="40000"/>
+      </a:schemeClr>
+    </dgm:fillClrLst>
+    <dgm:linClrLst meth="repeat">
+      <a:schemeClr val="dk1"/>
+    </dgm:linClrLst>
+    <dgm:effectClrLst/>
+    <dgm:txLinClrLst/>
+    <dgm:txFillClrLst meth="repeat">
+      <a:schemeClr val="dk1"/>
+    </dgm:txFillClrLst>
+    <dgm:txEffectClrLst/>
+  </dgm:styleLbl>
+  <dgm:styleLbl name="dkBgShp">
+    <dgm:fillClrLst meth="repeat">
+      <a:schemeClr val="dk1">
+        <a:shade val="80000"/>
+      </a:schemeClr>
+    </dgm:fillClrLst>
+    <dgm:linClrLst meth="repeat">
+      <a:schemeClr val="dk1"/>
+    </dgm:linClrLst>
+    <dgm:effectClrLst/>
+    <dgm:txLinClrLst/>
+    <dgm:txFillClrLst meth="repeat">
+      <a:schemeClr val="lt1"/>
+    </dgm:txFillClrLst>
+    <dgm:txEffectClrLst/>
+  </dgm:styleLbl>
+  <dgm:styleLbl name="trBgShp">
+    <dgm:fillClrLst meth="repeat">
+      <a:schemeClr val="dk1">
+        <a:tint val="50000"/>
+        <a:alpha val="40000"/>
+      </a:schemeClr>
+    </dgm:fillClrLst>
+    <dgm:linClrLst meth="repeat">
+      <a:schemeClr val="dk1"/>
+    </dgm:linClrLst>
+    <dgm:effectClrLst/>
+    <dgm:txLinClrLst/>
+    <dgm:txFillClrLst meth="repeat">
+      <a:schemeClr val="lt1"/>
+    </dgm:txFillClrLst>
+    <dgm:txEffectClrLst/>
+  </dgm:styleLbl>
+  <dgm:styleLbl name="fgShp">
+    <dgm:fillClrLst meth="repeat">
+      <a:schemeClr val="dk1">
+        <a:tint val="60000"/>
+      </a:schemeClr>
+    </dgm:fillClrLst>
+    <dgm:linClrLst meth="repeat">
+      <a:schemeClr val="lt1"/>
+    </dgm:linClrLst>
+    <dgm:effectClrLst/>
+    <dgm:txLinClrLst/>
+    <dgm:txFillClrLst meth="repeat">
+      <a:schemeClr val="dk1"/>
+    </dgm:txFillClrLst>
+    <dgm:txEffectClrLst/>
+  </dgm:styleLbl>
+  <dgm:styleLbl name="revTx">
+    <dgm:fillClrLst meth="repeat">
+      <a:schemeClr val="lt1">
+        <a:alpha val="0"/>
+      </a:schemeClr>
+    </dgm:fillClrLst>
+    <dgm:linClrLst meth="repeat">
+      <a:schemeClr val="dk1">
+        <a:alpha val="0"/>
+      </a:schemeClr>
+    </dgm:linClrLst>
+    <dgm:effectClrLst/>
+    <dgm:txLinClrLst/>
+    <dgm:txFillClrLst meth="repeat">
+      <a:schemeClr val="tx1"/>
+    </dgm:txFillClrLst>
+    <dgm:txEffectClrLst/>
+  </dgm:styleLbl>
+</dgm:colorsDef>
+</file>
+
+<file path=ppt/diagrams/data1.xml><?xml version="1.0" encoding="utf-8"?>
+<dgm:dataModel xmlns:dgm="http://schemas.openxmlformats.org/drawingml/2006/diagram" xmlns:a="http://schemas.openxmlformats.org/drawingml/2006/main">
+  <dgm:ptLst>
+    <dgm:pt modelId="{D2BFA37B-2C85-4733-BFCF-C98EBA882E6F}" type="doc">
+      <dgm:prSet loTypeId="urn:microsoft.com/office/officeart/2005/8/layout/orgChart1" loCatId="hierarchy" qsTypeId="urn:microsoft.com/office/officeart/2005/8/quickstyle/simple1" qsCatId="simple" csTypeId="urn:microsoft.com/office/officeart/2005/8/colors/accent0_1" csCatId="mainScheme" phldr="1"/>
+      <dgm:spPr/>
+      <dgm:t>
+        <a:bodyPr/>
+        <a:lstStyle/>
+        <a:p>
+          <a:endParaRPr lang="en-US"/>
+        </a:p>
+      </dgm:t>
+    </dgm:pt>
+    <dgm:pt modelId="{AD04AEDF-86C3-4001-A59C-3947C25BBF81}">
+      <dgm:prSet phldrT="[Text]"/>
+      <dgm:spPr/>
+      <dgm:t>
+        <a:bodyPr/>
+        <a:lstStyle/>
+        <a:p>
+          <a:r>
+            <a:rPr lang="en-US" dirty="0" err="1"/>
+            <a:t>BarOrder</a:t>
+          </a:r>
+          <a:endParaRPr lang="en-US" dirty="0"/>
+        </a:p>
+      </dgm:t>
+    </dgm:pt>
+    <dgm:pt modelId="{A9043AF0-941B-4D44-81C7-273519E3F8D7}" type="parTrans" cxnId="{0CF51E36-3EFC-4FEB-893A-FD79C46DBCBB}">
+      <dgm:prSet/>
+      <dgm:spPr/>
+      <dgm:t>
+        <a:bodyPr/>
+        <a:lstStyle/>
+        <a:p>
+          <a:endParaRPr lang="en-US"/>
+        </a:p>
+      </dgm:t>
+    </dgm:pt>
+    <dgm:pt modelId="{8678A4D2-A5A0-4DD3-98CA-52458C7CE02F}" type="sibTrans" cxnId="{0CF51E36-3EFC-4FEB-893A-FD79C46DBCBB}">
+      <dgm:prSet/>
+      <dgm:spPr/>
+      <dgm:t>
+        <a:bodyPr/>
+        <a:lstStyle/>
+        <a:p>
+          <a:endParaRPr lang="en-US"/>
+        </a:p>
+      </dgm:t>
+    </dgm:pt>
+    <dgm:pt modelId="{3868AD62-E3EF-499D-80F4-727D4D5639AE}">
+      <dgm:prSet phldrT="[Text]"/>
+      <dgm:spPr/>
+      <dgm:t>
+        <a:bodyPr/>
+        <a:lstStyle/>
+        <a:p>
+          <a:r>
+            <a:rPr lang="en-US" dirty="0" err="1"/>
+            <a:t>CoffeeOrder</a:t>
+          </a:r>
+          <a:endParaRPr lang="en-US" dirty="0"/>
+        </a:p>
+      </dgm:t>
+    </dgm:pt>
+    <dgm:pt modelId="{F61AB162-95F3-4A26-9867-0BE62CEF0B9D}" type="parTrans" cxnId="{7CF034E4-6E16-44A2-9BE5-B43E105AC85B}">
+      <dgm:prSet/>
+      <dgm:spPr/>
+      <dgm:t>
+        <a:bodyPr/>
+        <a:lstStyle/>
+        <a:p>
+          <a:endParaRPr lang="en-US"/>
+        </a:p>
+      </dgm:t>
+    </dgm:pt>
+    <dgm:pt modelId="{04F78014-F8CF-4BBE-9BE4-234C4E8CDA9B}" type="sibTrans" cxnId="{7CF034E4-6E16-44A2-9BE5-B43E105AC85B}">
+      <dgm:prSet/>
+      <dgm:spPr/>
+      <dgm:t>
+        <a:bodyPr/>
+        <a:lstStyle/>
+        <a:p>
+          <a:endParaRPr lang="en-US"/>
+        </a:p>
+      </dgm:t>
+    </dgm:pt>
+    <dgm:pt modelId="{58E20756-A961-44CA-99B3-3F332D7ABAA5}">
+      <dgm:prSet phldrT="[Text]"/>
+      <dgm:spPr/>
+      <dgm:t>
+        <a:bodyPr/>
+        <a:lstStyle/>
+        <a:p>
+          <a:r>
+            <a:rPr lang="en-US" dirty="0" err="1"/>
+            <a:t>TeaOrder</a:t>
+          </a:r>
+          <a:endParaRPr lang="en-US" dirty="0"/>
+        </a:p>
+      </dgm:t>
+    </dgm:pt>
+    <dgm:pt modelId="{8CB0BB80-7C52-4F36-AA42-715895658453}" type="parTrans" cxnId="{C90F3121-B98C-41E7-9910-508B2DB97482}">
+      <dgm:prSet/>
+      <dgm:spPr/>
+      <dgm:t>
+        <a:bodyPr/>
+        <a:lstStyle/>
+        <a:p>
+          <a:endParaRPr lang="en-US"/>
+        </a:p>
+      </dgm:t>
+    </dgm:pt>
+    <dgm:pt modelId="{4588ABC3-17B0-4337-98BB-002E527A43CA}" type="sibTrans" cxnId="{C90F3121-B98C-41E7-9910-508B2DB97482}">
+      <dgm:prSet/>
+      <dgm:spPr/>
+      <dgm:t>
+        <a:bodyPr/>
+        <a:lstStyle/>
+        <a:p>
+          <a:endParaRPr lang="en-US"/>
+        </a:p>
+      </dgm:t>
+    </dgm:pt>
+    <dgm:pt modelId="{6746C29A-59AA-47BC-A6D2-3AF1EAAE9AEE}">
+      <dgm:prSet phldrT="[Text]"/>
+      <dgm:spPr/>
+      <dgm:t>
+        <a:bodyPr/>
+        <a:lstStyle/>
+        <a:p>
+          <a:r>
+            <a:rPr lang="en-US" dirty="0" err="1"/>
+            <a:t>WineOrder</a:t>
+          </a:r>
+          <a:endParaRPr lang="en-US" dirty="0"/>
+        </a:p>
+      </dgm:t>
+    </dgm:pt>
+    <dgm:pt modelId="{1F49C3F3-20B9-49B0-B530-7742F239446B}" type="parTrans" cxnId="{265515E8-7DEF-4D57-A60E-D51BDA5C79DE}">
+      <dgm:prSet/>
+      <dgm:spPr/>
+      <dgm:t>
+        <a:bodyPr/>
+        <a:lstStyle/>
+        <a:p>
+          <a:endParaRPr lang="en-US"/>
+        </a:p>
+      </dgm:t>
+    </dgm:pt>
+    <dgm:pt modelId="{C992AF83-35C7-496F-97D5-44D1A0D0517C}" type="sibTrans" cxnId="{265515E8-7DEF-4D57-A60E-D51BDA5C79DE}">
+      <dgm:prSet/>
+      <dgm:spPr/>
+      <dgm:t>
+        <a:bodyPr/>
+        <a:lstStyle/>
+        <a:p>
+          <a:endParaRPr lang="en-US"/>
+        </a:p>
+      </dgm:t>
+    </dgm:pt>
+    <dgm:pt modelId="{7B23797D-3764-4E21-94F1-A049C771E25F}" type="pres">
+      <dgm:prSet presAssocID="{D2BFA37B-2C85-4733-BFCF-C98EBA882E6F}" presName="hierChild1" presStyleCnt="0">
+        <dgm:presLayoutVars>
+          <dgm:orgChart val="1"/>
+          <dgm:chPref val="1"/>
+          <dgm:dir/>
+          <dgm:animOne val="branch"/>
+          <dgm:animLvl val="lvl"/>
+          <dgm:resizeHandles/>
+        </dgm:presLayoutVars>
+      </dgm:prSet>
+      <dgm:spPr/>
+    </dgm:pt>
+    <dgm:pt modelId="{74F19F48-2F81-4FD9-8A68-13F6129AF79D}" type="pres">
+      <dgm:prSet presAssocID="{AD04AEDF-86C3-4001-A59C-3947C25BBF81}" presName="hierRoot1" presStyleCnt="0">
+        <dgm:presLayoutVars>
+          <dgm:hierBranch val="init"/>
+        </dgm:presLayoutVars>
+      </dgm:prSet>
+      <dgm:spPr/>
+    </dgm:pt>
+    <dgm:pt modelId="{89ED2F58-81D2-4BB9-8A3E-4BC667439C56}" type="pres">
+      <dgm:prSet presAssocID="{AD04AEDF-86C3-4001-A59C-3947C25BBF81}" presName="rootComposite1" presStyleCnt="0"/>
+      <dgm:spPr/>
+    </dgm:pt>
+    <dgm:pt modelId="{A0A617C9-40DD-411E-954D-70440C863D28}" type="pres">
+      <dgm:prSet presAssocID="{AD04AEDF-86C3-4001-A59C-3947C25BBF81}" presName="rootText1" presStyleLbl="node0" presStyleIdx="0" presStyleCnt="1" custLinFactNeighborX="1597" custLinFactNeighborY="-91440">
+        <dgm:presLayoutVars>
+          <dgm:chPref val="3"/>
+        </dgm:presLayoutVars>
+      </dgm:prSet>
+      <dgm:spPr/>
+    </dgm:pt>
+    <dgm:pt modelId="{0359433B-4424-4EB8-8499-7E58B5C76316}" type="pres">
+      <dgm:prSet presAssocID="{AD04AEDF-86C3-4001-A59C-3947C25BBF81}" presName="rootConnector1" presStyleLbl="node1" presStyleIdx="0" presStyleCnt="0"/>
+      <dgm:spPr/>
+    </dgm:pt>
+    <dgm:pt modelId="{731C87CA-0505-46E3-9EC0-EA9DC83B77E9}" type="pres">
+      <dgm:prSet presAssocID="{AD04AEDF-86C3-4001-A59C-3947C25BBF81}" presName="hierChild2" presStyleCnt="0"/>
+      <dgm:spPr/>
+    </dgm:pt>
+    <dgm:pt modelId="{E120C2BC-9971-4C06-B959-15F48257F503}" type="pres">
+      <dgm:prSet presAssocID="{F61AB162-95F3-4A26-9867-0BE62CEF0B9D}" presName="Name37" presStyleLbl="parChTrans1D2" presStyleIdx="0" presStyleCnt="3"/>
+      <dgm:spPr/>
+    </dgm:pt>
+    <dgm:pt modelId="{0BEAE8EF-0A4F-41EF-9058-1717CDAA8477}" type="pres">
+      <dgm:prSet presAssocID="{3868AD62-E3EF-499D-80F4-727D4D5639AE}" presName="hierRoot2" presStyleCnt="0">
+        <dgm:presLayoutVars>
+          <dgm:hierBranch val="init"/>
+        </dgm:presLayoutVars>
+      </dgm:prSet>
+      <dgm:spPr/>
+    </dgm:pt>
+    <dgm:pt modelId="{003AC5B9-9EB1-419E-8899-02136F40D59C}" type="pres">
+      <dgm:prSet presAssocID="{3868AD62-E3EF-499D-80F4-727D4D5639AE}" presName="rootComposite" presStyleCnt="0"/>
+      <dgm:spPr/>
+    </dgm:pt>
+    <dgm:pt modelId="{68DF29B4-CB2F-4E47-931F-1D0F60589E9F}" type="pres">
+      <dgm:prSet presAssocID="{3868AD62-E3EF-499D-80F4-727D4D5639AE}" presName="rootText" presStyleLbl="node2" presStyleIdx="0" presStyleCnt="3">
+        <dgm:presLayoutVars>
+          <dgm:chPref val="3"/>
+        </dgm:presLayoutVars>
+      </dgm:prSet>
+      <dgm:spPr/>
+    </dgm:pt>
+    <dgm:pt modelId="{7BD3C06E-8C7A-43FF-8DC4-E8D03131804B}" type="pres">
+      <dgm:prSet presAssocID="{3868AD62-E3EF-499D-80F4-727D4D5639AE}" presName="rootConnector" presStyleLbl="node2" presStyleIdx="0" presStyleCnt="3"/>
+      <dgm:spPr/>
+    </dgm:pt>
+    <dgm:pt modelId="{F3CA407E-7986-4870-96DC-EA6D3DDA8783}" type="pres">
+      <dgm:prSet presAssocID="{3868AD62-E3EF-499D-80F4-727D4D5639AE}" presName="hierChild4" presStyleCnt="0"/>
+      <dgm:spPr/>
+    </dgm:pt>
+    <dgm:pt modelId="{C13AEB80-B2E5-4F27-9873-7A1667E6AFBE}" type="pres">
+      <dgm:prSet presAssocID="{3868AD62-E3EF-499D-80F4-727D4D5639AE}" presName="hierChild5" presStyleCnt="0"/>
+      <dgm:spPr/>
+    </dgm:pt>
+    <dgm:pt modelId="{E884EC6A-6E63-4601-86D4-169559201A0F}" type="pres">
+      <dgm:prSet presAssocID="{1F49C3F3-20B9-49B0-B530-7742F239446B}" presName="Name37" presStyleLbl="parChTrans1D2" presStyleIdx="1" presStyleCnt="3"/>
+      <dgm:spPr/>
+    </dgm:pt>
+    <dgm:pt modelId="{680D4883-267C-4972-B2F3-3264BE800EF4}" type="pres">
+      <dgm:prSet presAssocID="{6746C29A-59AA-47BC-A6D2-3AF1EAAE9AEE}" presName="hierRoot2" presStyleCnt="0">
+        <dgm:presLayoutVars>
+          <dgm:hierBranch val="init"/>
+        </dgm:presLayoutVars>
+      </dgm:prSet>
+      <dgm:spPr/>
+    </dgm:pt>
+    <dgm:pt modelId="{6A213DE7-6DB1-4851-B9AD-A230F8E8EEC6}" type="pres">
+      <dgm:prSet presAssocID="{6746C29A-59AA-47BC-A6D2-3AF1EAAE9AEE}" presName="rootComposite" presStyleCnt="0"/>
+      <dgm:spPr/>
+    </dgm:pt>
+    <dgm:pt modelId="{7218482D-B1C4-4299-820E-061FE8B5CFC5}" type="pres">
+      <dgm:prSet presAssocID="{6746C29A-59AA-47BC-A6D2-3AF1EAAE9AEE}" presName="rootText" presStyleLbl="node2" presStyleIdx="1" presStyleCnt="3">
+        <dgm:presLayoutVars>
+          <dgm:chPref val="3"/>
+        </dgm:presLayoutVars>
+      </dgm:prSet>
+      <dgm:spPr/>
+    </dgm:pt>
+    <dgm:pt modelId="{2E5839CE-AE1D-45D5-BE6B-9CBEE7737158}" type="pres">
+      <dgm:prSet presAssocID="{6746C29A-59AA-47BC-A6D2-3AF1EAAE9AEE}" presName="rootConnector" presStyleLbl="node2" presStyleIdx="1" presStyleCnt="3"/>
+      <dgm:spPr/>
+    </dgm:pt>
+    <dgm:pt modelId="{BC856362-D0B0-4261-830B-2A747B4E3F1C}" type="pres">
+      <dgm:prSet presAssocID="{6746C29A-59AA-47BC-A6D2-3AF1EAAE9AEE}" presName="hierChild4" presStyleCnt="0"/>
+      <dgm:spPr/>
+    </dgm:pt>
+    <dgm:pt modelId="{AF90669B-30AA-4CDF-9D03-6139928EEDF0}" type="pres">
+      <dgm:prSet presAssocID="{6746C29A-59AA-47BC-A6D2-3AF1EAAE9AEE}" presName="hierChild5" presStyleCnt="0"/>
+      <dgm:spPr/>
+    </dgm:pt>
+    <dgm:pt modelId="{32A7B4C7-B9D4-4CF3-A551-D1417CC141AD}" type="pres">
+      <dgm:prSet presAssocID="{8CB0BB80-7C52-4F36-AA42-715895658453}" presName="Name37" presStyleLbl="parChTrans1D2" presStyleIdx="2" presStyleCnt="3"/>
+      <dgm:spPr/>
+    </dgm:pt>
+    <dgm:pt modelId="{CF2961F1-D647-409A-A791-34C62CD68AB1}" type="pres">
+      <dgm:prSet presAssocID="{58E20756-A961-44CA-99B3-3F332D7ABAA5}" presName="hierRoot2" presStyleCnt="0">
+        <dgm:presLayoutVars>
+          <dgm:hierBranch val="init"/>
+        </dgm:presLayoutVars>
+      </dgm:prSet>
+      <dgm:spPr/>
+    </dgm:pt>
+    <dgm:pt modelId="{B01C8EA2-76FF-4F00-B96E-342EDBA9C829}" type="pres">
+      <dgm:prSet presAssocID="{58E20756-A961-44CA-99B3-3F332D7ABAA5}" presName="rootComposite" presStyleCnt="0"/>
+      <dgm:spPr/>
+    </dgm:pt>
+    <dgm:pt modelId="{50F6EAD8-A2DB-4CCD-A1EE-4FBF8D3D8880}" type="pres">
+      <dgm:prSet presAssocID="{58E20756-A961-44CA-99B3-3F332D7ABAA5}" presName="rootText" presStyleLbl="node2" presStyleIdx="2" presStyleCnt="3">
+        <dgm:presLayoutVars>
+          <dgm:chPref val="3"/>
+        </dgm:presLayoutVars>
+      </dgm:prSet>
+      <dgm:spPr/>
+    </dgm:pt>
+    <dgm:pt modelId="{31473C47-94BC-4B4A-80C8-FD8B81289AEB}" type="pres">
+      <dgm:prSet presAssocID="{58E20756-A961-44CA-99B3-3F332D7ABAA5}" presName="rootConnector" presStyleLbl="node2" presStyleIdx="2" presStyleCnt="3"/>
+      <dgm:spPr/>
+    </dgm:pt>
+    <dgm:pt modelId="{D60E8639-A6DC-4E7A-A74E-B9586C743B38}" type="pres">
+      <dgm:prSet presAssocID="{58E20756-A961-44CA-99B3-3F332D7ABAA5}" presName="hierChild4" presStyleCnt="0"/>
+      <dgm:spPr/>
+    </dgm:pt>
+    <dgm:pt modelId="{9FCFFB9E-B20F-446C-90D1-ABE010F7A370}" type="pres">
+      <dgm:prSet presAssocID="{58E20756-A961-44CA-99B3-3F332D7ABAA5}" presName="hierChild5" presStyleCnt="0"/>
+      <dgm:spPr/>
+    </dgm:pt>
+    <dgm:pt modelId="{0EF66310-0034-4B50-AEF0-9877E6CCB46B}" type="pres">
+      <dgm:prSet presAssocID="{AD04AEDF-86C3-4001-A59C-3947C25BBF81}" presName="hierChild3" presStyleCnt="0"/>
+      <dgm:spPr/>
+    </dgm:pt>
+  </dgm:ptLst>
+  <dgm:cxnLst>
+    <dgm:cxn modelId="{6B06D103-62B7-4D40-BA24-8CDA7E0ECC06}" type="presOf" srcId="{6746C29A-59AA-47BC-A6D2-3AF1EAAE9AEE}" destId="{2E5839CE-AE1D-45D5-BE6B-9CBEE7737158}" srcOrd="1" destOrd="0" presId="urn:microsoft.com/office/officeart/2005/8/layout/orgChart1"/>
+    <dgm:cxn modelId="{C90F3121-B98C-41E7-9910-508B2DB97482}" srcId="{AD04AEDF-86C3-4001-A59C-3947C25BBF81}" destId="{58E20756-A961-44CA-99B3-3F332D7ABAA5}" srcOrd="2" destOrd="0" parTransId="{8CB0BB80-7C52-4F36-AA42-715895658453}" sibTransId="{4588ABC3-17B0-4337-98BB-002E527A43CA}"/>
+    <dgm:cxn modelId="{0CF51E36-3EFC-4FEB-893A-FD79C46DBCBB}" srcId="{D2BFA37B-2C85-4733-BFCF-C98EBA882E6F}" destId="{AD04AEDF-86C3-4001-A59C-3947C25BBF81}" srcOrd="0" destOrd="0" parTransId="{A9043AF0-941B-4D44-81C7-273519E3F8D7}" sibTransId="{8678A4D2-A5A0-4DD3-98CA-52458C7CE02F}"/>
+    <dgm:cxn modelId="{1ED8766E-E5F0-492D-B8F3-9542BF2C0D92}" type="presOf" srcId="{1F49C3F3-20B9-49B0-B530-7742F239446B}" destId="{E884EC6A-6E63-4601-86D4-169559201A0F}" srcOrd="0" destOrd="0" presId="urn:microsoft.com/office/officeart/2005/8/layout/orgChart1"/>
+    <dgm:cxn modelId="{B7132B79-C2C0-4E2F-B6D9-97FE63A10D89}" type="presOf" srcId="{3868AD62-E3EF-499D-80F4-727D4D5639AE}" destId="{7BD3C06E-8C7A-43FF-8DC4-E8D03131804B}" srcOrd="1" destOrd="0" presId="urn:microsoft.com/office/officeart/2005/8/layout/orgChart1"/>
+    <dgm:cxn modelId="{DBFC147A-EDCF-4E38-B262-8496A8ABF7B0}" type="presOf" srcId="{AD04AEDF-86C3-4001-A59C-3947C25BBF81}" destId="{A0A617C9-40DD-411E-954D-70440C863D28}" srcOrd="0" destOrd="0" presId="urn:microsoft.com/office/officeart/2005/8/layout/orgChart1"/>
+    <dgm:cxn modelId="{0F16B77F-2ED6-414D-8699-705FA25435FB}" type="presOf" srcId="{8CB0BB80-7C52-4F36-AA42-715895658453}" destId="{32A7B4C7-B9D4-4CF3-A551-D1417CC141AD}" srcOrd="0" destOrd="0" presId="urn:microsoft.com/office/officeart/2005/8/layout/orgChart1"/>
+    <dgm:cxn modelId="{56B96E88-C38E-4582-A789-19C5269D5643}" type="presOf" srcId="{F61AB162-95F3-4A26-9867-0BE62CEF0B9D}" destId="{E120C2BC-9971-4C06-B959-15F48257F503}" srcOrd="0" destOrd="0" presId="urn:microsoft.com/office/officeart/2005/8/layout/orgChart1"/>
+    <dgm:cxn modelId="{83B550AC-ACD6-4C97-95CF-86743A35DE3B}" type="presOf" srcId="{6746C29A-59AA-47BC-A6D2-3AF1EAAE9AEE}" destId="{7218482D-B1C4-4299-820E-061FE8B5CFC5}" srcOrd="0" destOrd="0" presId="urn:microsoft.com/office/officeart/2005/8/layout/orgChart1"/>
+    <dgm:cxn modelId="{09EAFEB3-096A-402D-A75D-95E99162AD39}" type="presOf" srcId="{3868AD62-E3EF-499D-80F4-727D4D5639AE}" destId="{68DF29B4-CB2F-4E47-931F-1D0F60589E9F}" srcOrd="0" destOrd="0" presId="urn:microsoft.com/office/officeart/2005/8/layout/orgChart1"/>
+    <dgm:cxn modelId="{5997AFB7-9C38-42EB-B5ED-C5F04A0308E1}" type="presOf" srcId="{AD04AEDF-86C3-4001-A59C-3947C25BBF81}" destId="{0359433B-4424-4EB8-8499-7E58B5C76316}" srcOrd="1" destOrd="0" presId="urn:microsoft.com/office/officeart/2005/8/layout/orgChart1"/>
+    <dgm:cxn modelId="{F9D178BE-9960-4194-86CC-FFAAA152051C}" type="presOf" srcId="{58E20756-A961-44CA-99B3-3F332D7ABAA5}" destId="{50F6EAD8-A2DB-4CCD-A1EE-4FBF8D3D8880}" srcOrd="0" destOrd="0" presId="urn:microsoft.com/office/officeart/2005/8/layout/orgChart1"/>
+    <dgm:cxn modelId="{B57D78DD-166C-41AA-ADF4-1F78A0ED291E}" type="presOf" srcId="{D2BFA37B-2C85-4733-BFCF-C98EBA882E6F}" destId="{7B23797D-3764-4E21-94F1-A049C771E25F}" srcOrd="0" destOrd="0" presId="urn:microsoft.com/office/officeart/2005/8/layout/orgChart1"/>
+    <dgm:cxn modelId="{7CF034E4-6E16-44A2-9BE5-B43E105AC85B}" srcId="{AD04AEDF-86C3-4001-A59C-3947C25BBF81}" destId="{3868AD62-E3EF-499D-80F4-727D4D5639AE}" srcOrd="0" destOrd="0" parTransId="{F61AB162-95F3-4A26-9867-0BE62CEF0B9D}" sibTransId="{04F78014-F8CF-4BBE-9BE4-234C4E8CDA9B}"/>
+    <dgm:cxn modelId="{265515E8-7DEF-4D57-A60E-D51BDA5C79DE}" srcId="{AD04AEDF-86C3-4001-A59C-3947C25BBF81}" destId="{6746C29A-59AA-47BC-A6D2-3AF1EAAE9AEE}" srcOrd="1" destOrd="0" parTransId="{1F49C3F3-20B9-49B0-B530-7742F239446B}" sibTransId="{C992AF83-35C7-496F-97D5-44D1A0D0517C}"/>
+    <dgm:cxn modelId="{97B191F2-B9B9-44E6-8163-E1550B9D37E9}" type="presOf" srcId="{58E20756-A961-44CA-99B3-3F332D7ABAA5}" destId="{31473C47-94BC-4B4A-80C8-FD8B81289AEB}" srcOrd="1" destOrd="0" presId="urn:microsoft.com/office/officeart/2005/8/layout/orgChart1"/>
+    <dgm:cxn modelId="{D609A4C5-EEBC-48C5-B7A7-B805407FCD45}" type="presParOf" srcId="{7B23797D-3764-4E21-94F1-A049C771E25F}" destId="{74F19F48-2F81-4FD9-8A68-13F6129AF79D}" srcOrd="0" destOrd="0" presId="urn:microsoft.com/office/officeart/2005/8/layout/orgChart1"/>
+    <dgm:cxn modelId="{5A163055-944A-4B18-9A04-95F181FA6800}" type="presParOf" srcId="{74F19F48-2F81-4FD9-8A68-13F6129AF79D}" destId="{89ED2F58-81D2-4BB9-8A3E-4BC667439C56}" srcOrd="0" destOrd="0" presId="urn:microsoft.com/office/officeart/2005/8/layout/orgChart1"/>
+    <dgm:cxn modelId="{2DA5107E-53AC-460E-81CD-E6E28A91D0A0}" type="presParOf" srcId="{89ED2F58-81D2-4BB9-8A3E-4BC667439C56}" destId="{A0A617C9-40DD-411E-954D-70440C863D28}" srcOrd="0" destOrd="0" presId="urn:microsoft.com/office/officeart/2005/8/layout/orgChart1"/>
+    <dgm:cxn modelId="{90CC9E16-BF4C-4D38-A5C4-639703EE7FFA}" type="presParOf" srcId="{89ED2F58-81D2-4BB9-8A3E-4BC667439C56}" destId="{0359433B-4424-4EB8-8499-7E58B5C76316}" srcOrd="1" destOrd="0" presId="urn:microsoft.com/office/officeart/2005/8/layout/orgChart1"/>
+    <dgm:cxn modelId="{1310925A-22AE-47D9-856E-21451662982B}" type="presParOf" srcId="{74F19F48-2F81-4FD9-8A68-13F6129AF79D}" destId="{731C87CA-0505-46E3-9EC0-EA9DC83B77E9}" srcOrd="1" destOrd="0" presId="urn:microsoft.com/office/officeart/2005/8/layout/orgChart1"/>
+    <dgm:cxn modelId="{BF6EB739-5F3C-418D-8F4A-A667D5373277}" type="presParOf" srcId="{731C87CA-0505-46E3-9EC0-EA9DC83B77E9}" destId="{E120C2BC-9971-4C06-B959-15F48257F503}" srcOrd="0" destOrd="0" presId="urn:microsoft.com/office/officeart/2005/8/layout/orgChart1"/>
+    <dgm:cxn modelId="{3D53195F-827D-4576-8794-0160145677C6}" type="presParOf" srcId="{731C87CA-0505-46E3-9EC0-EA9DC83B77E9}" destId="{0BEAE8EF-0A4F-41EF-9058-1717CDAA8477}" srcOrd="1" destOrd="0" presId="urn:microsoft.com/office/officeart/2005/8/layout/orgChart1"/>
+    <dgm:cxn modelId="{43D8EE34-5DA7-4850-B388-04E8AB6ECBAB}" type="presParOf" srcId="{0BEAE8EF-0A4F-41EF-9058-1717CDAA8477}" destId="{003AC5B9-9EB1-419E-8899-02136F40D59C}" srcOrd="0" destOrd="0" presId="urn:microsoft.com/office/officeart/2005/8/layout/orgChart1"/>
+    <dgm:cxn modelId="{F4E8D4A3-1150-4811-A51E-89B1F0FE3860}" type="presParOf" srcId="{003AC5B9-9EB1-419E-8899-02136F40D59C}" destId="{68DF29B4-CB2F-4E47-931F-1D0F60589E9F}" srcOrd="0" destOrd="0" presId="urn:microsoft.com/office/officeart/2005/8/layout/orgChart1"/>
+    <dgm:cxn modelId="{F2EFD152-B960-474A-B348-7403064777FB}" type="presParOf" srcId="{003AC5B9-9EB1-419E-8899-02136F40D59C}" destId="{7BD3C06E-8C7A-43FF-8DC4-E8D03131804B}" srcOrd="1" destOrd="0" presId="urn:microsoft.com/office/officeart/2005/8/layout/orgChart1"/>
+    <dgm:cxn modelId="{B0A32A70-5E82-4555-864F-A592739CA028}" type="presParOf" srcId="{0BEAE8EF-0A4F-41EF-9058-1717CDAA8477}" destId="{F3CA407E-7986-4870-96DC-EA6D3DDA8783}" srcOrd="1" destOrd="0" presId="urn:microsoft.com/office/officeart/2005/8/layout/orgChart1"/>
+    <dgm:cxn modelId="{065A968D-E966-4CD7-8C38-0FA604679B4C}" type="presParOf" srcId="{0BEAE8EF-0A4F-41EF-9058-1717CDAA8477}" destId="{C13AEB80-B2E5-4F27-9873-7A1667E6AFBE}" srcOrd="2" destOrd="0" presId="urn:microsoft.com/office/officeart/2005/8/layout/orgChart1"/>
+    <dgm:cxn modelId="{0BBFFBA1-CB39-46D4-8435-1767634A8C12}" type="presParOf" srcId="{731C87CA-0505-46E3-9EC0-EA9DC83B77E9}" destId="{E884EC6A-6E63-4601-86D4-169559201A0F}" srcOrd="2" destOrd="0" presId="urn:microsoft.com/office/officeart/2005/8/layout/orgChart1"/>
+    <dgm:cxn modelId="{63DA34A5-0965-498C-B6A7-F076B0D1FC19}" type="presParOf" srcId="{731C87CA-0505-46E3-9EC0-EA9DC83B77E9}" destId="{680D4883-267C-4972-B2F3-3264BE800EF4}" srcOrd="3" destOrd="0" presId="urn:microsoft.com/office/officeart/2005/8/layout/orgChart1"/>
+    <dgm:cxn modelId="{DBCE7B35-2A84-496B-9FC6-7AE1097E1F9C}" type="presParOf" srcId="{680D4883-267C-4972-B2F3-3264BE800EF4}" destId="{6A213DE7-6DB1-4851-B9AD-A230F8E8EEC6}" srcOrd="0" destOrd="0" presId="urn:microsoft.com/office/officeart/2005/8/layout/orgChart1"/>
+    <dgm:cxn modelId="{45D3D121-2C5F-4870-9F46-68158CD7B298}" type="presParOf" srcId="{6A213DE7-6DB1-4851-B9AD-A230F8E8EEC6}" destId="{7218482D-B1C4-4299-820E-061FE8B5CFC5}" srcOrd="0" destOrd="0" presId="urn:microsoft.com/office/officeart/2005/8/layout/orgChart1"/>
+    <dgm:cxn modelId="{8525FFD1-CA84-49C1-B6F2-24DE41820AC0}" type="presParOf" srcId="{6A213DE7-6DB1-4851-B9AD-A230F8E8EEC6}" destId="{2E5839CE-AE1D-45D5-BE6B-9CBEE7737158}" srcOrd="1" destOrd="0" presId="urn:microsoft.com/office/officeart/2005/8/layout/orgChart1"/>
+    <dgm:cxn modelId="{2ACC73B4-8555-448E-A0AA-DBC1B571A799}" type="presParOf" srcId="{680D4883-267C-4972-B2F3-3264BE800EF4}" destId="{BC856362-D0B0-4261-830B-2A747B4E3F1C}" srcOrd="1" destOrd="0" presId="urn:microsoft.com/office/officeart/2005/8/layout/orgChart1"/>
+    <dgm:cxn modelId="{B68244AF-94E7-47E1-9B7C-950518CBDA38}" type="presParOf" srcId="{680D4883-267C-4972-B2F3-3264BE800EF4}" destId="{AF90669B-30AA-4CDF-9D03-6139928EEDF0}" srcOrd="2" destOrd="0" presId="urn:microsoft.com/office/officeart/2005/8/layout/orgChart1"/>
+    <dgm:cxn modelId="{F95003BE-72E3-4E8A-9009-B52B3152E694}" type="presParOf" srcId="{731C87CA-0505-46E3-9EC0-EA9DC83B77E9}" destId="{32A7B4C7-B9D4-4CF3-A551-D1417CC141AD}" srcOrd="4" destOrd="0" presId="urn:microsoft.com/office/officeart/2005/8/layout/orgChart1"/>
+    <dgm:cxn modelId="{9E9704F8-8229-44CD-8077-34FE1D58359C}" type="presParOf" srcId="{731C87CA-0505-46E3-9EC0-EA9DC83B77E9}" destId="{CF2961F1-D647-409A-A791-34C62CD68AB1}" srcOrd="5" destOrd="0" presId="urn:microsoft.com/office/officeart/2005/8/layout/orgChart1"/>
+    <dgm:cxn modelId="{99FD3329-67F7-4A2E-8F61-54C4A33E1240}" type="presParOf" srcId="{CF2961F1-D647-409A-A791-34C62CD68AB1}" destId="{B01C8EA2-76FF-4F00-B96E-342EDBA9C829}" srcOrd="0" destOrd="0" presId="urn:microsoft.com/office/officeart/2005/8/layout/orgChart1"/>
+    <dgm:cxn modelId="{F23DF93F-E2DC-4065-9715-CD0F622AC191}" type="presParOf" srcId="{B01C8EA2-76FF-4F00-B96E-342EDBA9C829}" destId="{50F6EAD8-A2DB-4CCD-A1EE-4FBF8D3D8880}" srcOrd="0" destOrd="0" presId="urn:microsoft.com/office/officeart/2005/8/layout/orgChart1"/>
+    <dgm:cxn modelId="{659B70B7-DBF9-44EB-806C-FAA0CA4F10CC}" type="presParOf" srcId="{B01C8EA2-76FF-4F00-B96E-342EDBA9C829}" destId="{31473C47-94BC-4B4A-80C8-FD8B81289AEB}" srcOrd="1" destOrd="0" presId="urn:microsoft.com/office/officeart/2005/8/layout/orgChart1"/>
+    <dgm:cxn modelId="{6C346D21-F0B3-4F7F-9529-5557554E77F0}" type="presParOf" srcId="{CF2961F1-D647-409A-A791-34C62CD68AB1}" destId="{D60E8639-A6DC-4E7A-A74E-B9586C743B38}" srcOrd="1" destOrd="0" presId="urn:microsoft.com/office/officeart/2005/8/layout/orgChart1"/>
+    <dgm:cxn modelId="{E04F09A6-2A87-4990-A693-12FAF4C4695D}" type="presParOf" srcId="{CF2961F1-D647-409A-A791-34C62CD68AB1}" destId="{9FCFFB9E-B20F-446C-90D1-ABE010F7A370}" srcOrd="2" destOrd="0" presId="urn:microsoft.com/office/officeart/2005/8/layout/orgChart1"/>
+    <dgm:cxn modelId="{A62D47FF-90D9-4A4D-BA24-0645288F1A46}" type="presParOf" srcId="{74F19F48-2F81-4FD9-8A68-13F6129AF79D}" destId="{0EF66310-0034-4B50-AEF0-9877E6CCB46B}" srcOrd="2" destOrd="0" presId="urn:microsoft.com/office/officeart/2005/8/layout/orgChart1"/>
+  </dgm:cxnLst>
+  <dgm:bg/>
+  <dgm:whole/>
+  <dgm:extLst>
+    <a:ext uri="http://schemas.microsoft.com/office/drawing/2008/diagram">
+      <dsp:dataModelExt xmlns:dsp="http://schemas.microsoft.com/office/drawing/2008/diagram" relId="rId6" minVer="http://schemas.openxmlformats.org/drawingml/2006/diagram"/>
+    </a:ext>
+  </dgm:extLst>
+</dgm:dataModel>
+</file>
+
+<file path=ppt/diagrams/drawing1.xml><?xml version="1.0" encoding="utf-8"?>
+<dsp:drawing xmlns:dgm="http://schemas.openxmlformats.org/drawingml/2006/diagram" xmlns:dsp="http://schemas.microsoft.com/office/drawing/2008/diagram" xmlns:a="http://schemas.openxmlformats.org/drawingml/2006/main">
+  <dsp:spTree>
+    <dsp:nvGrpSpPr>
+      <dsp:cNvPr id="0" name=""/>
+      <dsp:cNvGrpSpPr/>
+    </dsp:nvGrpSpPr>
+    <dsp:grpSpPr/>
+    <dsp:sp modelId="{32A7B4C7-B9D4-4CF3-A551-D1417CC141AD}">
+      <dsp:nvSpPr>
+        <dsp:cNvPr id="0" name=""/>
+        <dsp:cNvSpPr/>
+      </dsp:nvSpPr>
+      <dsp:spPr>
+        <a:xfrm>
+          <a:off x="2038156" y="1599181"/>
+          <a:ext cx="1409813" cy="787775"/>
+        </a:xfrm>
+        <a:custGeom>
+          <a:avLst/>
+          <a:gdLst/>
+          <a:ahLst/>
+          <a:cxnLst/>
+          <a:rect l="0" t="0" r="0" b="0"/>
+          <a:pathLst>
+            <a:path>
+              <a:moveTo>
+                <a:pt x="0" y="0"/>
+              </a:moveTo>
+              <a:lnTo>
+                <a:pt x="0" y="663800"/>
+              </a:lnTo>
+              <a:lnTo>
+                <a:pt x="1409813" y="663800"/>
+              </a:lnTo>
+              <a:lnTo>
+                <a:pt x="1409813" y="787775"/>
+              </a:lnTo>
+            </a:path>
+          </a:pathLst>
+        </a:custGeom>
+        <a:noFill/>
+        <a:ln w="25400" cap="flat" cmpd="sng" algn="ctr">
+          <a:solidFill>
+            <a:schemeClr val="dk1">
+              <a:shade val="60000"/>
+              <a:hueOff val="0"/>
+              <a:satOff val="0"/>
+              <a:lumOff val="0"/>
+              <a:alphaOff val="0"/>
+            </a:schemeClr>
+          </a:solidFill>
+          <a:prstDash val="solid"/>
+        </a:ln>
+        <a:effectLst/>
+      </dsp:spPr>
+      <dsp:style>
+        <a:lnRef idx="2">
+          <a:scrgbClr r="0" g="0" b="0"/>
+        </a:lnRef>
+        <a:fillRef idx="0">
+          <a:scrgbClr r="0" g="0" b="0"/>
+        </a:fillRef>
+        <a:effectRef idx="0">
+          <a:scrgbClr r="0" g="0" b="0"/>
+        </a:effectRef>
+        <a:fontRef idx="minor"/>
+      </dsp:style>
+    </dsp:sp>
+    <dsp:sp modelId="{E884EC6A-6E63-4601-86D4-169559201A0F}">
+      <dsp:nvSpPr>
+        <dsp:cNvPr id="0" name=""/>
+        <dsp:cNvSpPr/>
+      </dsp:nvSpPr>
+      <dsp:spPr>
+        <a:xfrm>
+          <a:off x="1973580" y="1599181"/>
+          <a:ext cx="91440" cy="787775"/>
+        </a:xfrm>
+        <a:custGeom>
+          <a:avLst/>
+          <a:gdLst/>
+          <a:ahLst/>
+          <a:cxnLst/>
+          <a:rect l="0" t="0" r="0" b="0"/>
+          <a:pathLst>
+            <a:path>
+              <a:moveTo>
+                <a:pt x="64576" y="0"/>
+              </a:moveTo>
+              <a:lnTo>
+                <a:pt x="64576" y="663800"/>
+              </a:lnTo>
+              <a:lnTo>
+                <a:pt x="45720" y="663800"/>
+              </a:lnTo>
+              <a:lnTo>
+                <a:pt x="45720" y="787775"/>
+              </a:lnTo>
+            </a:path>
+          </a:pathLst>
+        </a:custGeom>
+        <a:noFill/>
+        <a:ln w="25400" cap="flat" cmpd="sng" algn="ctr">
+          <a:solidFill>
+            <a:schemeClr val="dk1">
+              <a:shade val="60000"/>
+              <a:hueOff val="0"/>
+              <a:satOff val="0"/>
+              <a:lumOff val="0"/>
+              <a:alphaOff val="0"/>
+            </a:schemeClr>
+          </a:solidFill>
+          <a:prstDash val="solid"/>
+        </a:ln>
+        <a:effectLst/>
+      </dsp:spPr>
+      <dsp:style>
+        <a:lnRef idx="2">
+          <a:scrgbClr r="0" g="0" b="0"/>
+        </a:lnRef>
+        <a:fillRef idx="0">
+          <a:scrgbClr r="0" g="0" b="0"/>
+        </a:fillRef>
+        <a:effectRef idx="0">
+          <a:scrgbClr r="0" g="0" b="0"/>
+        </a:effectRef>
+        <a:fontRef idx="minor"/>
+      </dsp:style>
+    </dsp:sp>
+    <dsp:sp modelId="{E120C2BC-9971-4C06-B959-15F48257F503}">
+      <dsp:nvSpPr>
+        <dsp:cNvPr id="0" name=""/>
+        <dsp:cNvSpPr/>
+      </dsp:nvSpPr>
+      <dsp:spPr>
+        <a:xfrm>
+          <a:off x="590630" y="1599181"/>
+          <a:ext cx="1447525" cy="787775"/>
+        </a:xfrm>
+        <a:custGeom>
+          <a:avLst/>
+          <a:gdLst/>
+          <a:ahLst/>
+          <a:cxnLst/>
+          <a:rect l="0" t="0" r="0" b="0"/>
+          <a:pathLst>
+            <a:path>
+              <a:moveTo>
+                <a:pt x="1447525" y="0"/>
+              </a:moveTo>
+              <a:lnTo>
+                <a:pt x="1447525" y="663800"/>
+              </a:lnTo>
+              <a:lnTo>
+                <a:pt x="0" y="663800"/>
+              </a:lnTo>
+              <a:lnTo>
+                <a:pt x="0" y="787775"/>
+              </a:lnTo>
+            </a:path>
+          </a:pathLst>
+        </a:custGeom>
+        <a:noFill/>
+        <a:ln w="25400" cap="flat" cmpd="sng" algn="ctr">
+          <a:solidFill>
+            <a:schemeClr val="dk1">
+              <a:shade val="60000"/>
+              <a:hueOff val="0"/>
+              <a:satOff val="0"/>
+              <a:lumOff val="0"/>
+              <a:alphaOff val="0"/>
+            </a:schemeClr>
+          </a:solidFill>
+          <a:prstDash val="solid"/>
+        </a:ln>
+        <a:effectLst/>
+      </dsp:spPr>
+      <dsp:style>
+        <a:lnRef idx="2">
+          <a:scrgbClr r="0" g="0" b="0"/>
+        </a:lnRef>
+        <a:fillRef idx="0">
+          <a:scrgbClr r="0" g="0" b="0"/>
+        </a:fillRef>
+        <a:effectRef idx="0">
+          <a:scrgbClr r="0" g="0" b="0"/>
+        </a:effectRef>
+        <a:fontRef idx="minor"/>
+      </dsp:style>
+    </dsp:sp>
+    <dsp:sp modelId="{A0A617C9-40DD-411E-954D-70440C863D28}">
+      <dsp:nvSpPr>
+        <dsp:cNvPr id="0" name=""/>
+        <dsp:cNvSpPr/>
+      </dsp:nvSpPr>
+      <dsp:spPr>
+        <a:xfrm>
+          <a:off x="1447796" y="1008822"/>
+          <a:ext cx="1180718" cy="590359"/>
+        </a:xfrm>
+        <a:prstGeom prst="rect">
+          <a:avLst/>
+        </a:prstGeom>
+        <a:solidFill>
+          <a:schemeClr val="lt1">
+            <a:hueOff val="0"/>
+            <a:satOff val="0"/>
+            <a:lumOff val="0"/>
+            <a:alphaOff val="0"/>
+          </a:schemeClr>
+        </a:solidFill>
+        <a:ln w="25400" cap="flat" cmpd="sng" algn="ctr">
+          <a:solidFill>
+            <a:schemeClr val="dk1">
+              <a:shade val="80000"/>
+              <a:hueOff val="0"/>
+              <a:satOff val="0"/>
+              <a:lumOff val="0"/>
+              <a:alphaOff val="0"/>
+            </a:schemeClr>
+          </a:solidFill>
+          <a:prstDash val="solid"/>
+        </a:ln>
+        <a:effectLst/>
+      </dsp:spPr>
+      <dsp:style>
+        <a:lnRef idx="2">
+          <a:scrgbClr r="0" g="0" b="0"/>
+        </a:lnRef>
+        <a:fillRef idx="1">
+          <a:scrgbClr r="0" g="0" b="0"/>
+        </a:fillRef>
+        <a:effectRef idx="0">
+          <a:scrgbClr r="0" g="0" b="0"/>
+        </a:effectRef>
+        <a:fontRef idx="minor">
+          <a:schemeClr val="lt1"/>
+        </a:fontRef>
+      </dsp:style>
+      <dsp:txBody>
+        <a:bodyPr spcFirstLastPara="0" vert="horz" wrap="square" lIns="11430" tIns="11430" rIns="11430" bIns="11430" numCol="1" spcCol="1270" anchor="ctr" anchorCtr="0">
+          <a:noAutofit/>
+        </a:bodyPr>
+        <a:lstStyle/>
+        <a:p>
+          <a:pPr marL="0" lvl="0" indent="0" algn="ctr" defTabSz="800100">
+            <a:lnSpc>
+              <a:spcPct val="90000"/>
+            </a:lnSpc>
+            <a:spcBef>
+              <a:spcPct val="0"/>
+            </a:spcBef>
+            <a:spcAft>
+              <a:spcPct val="35000"/>
+            </a:spcAft>
+            <a:buNone/>
+          </a:pPr>
+          <a:r>
+            <a:rPr lang="en-US" sz="1800" kern="1200" dirty="0" err="1"/>
+            <a:t>BarOrder</a:t>
+          </a:r>
+          <a:endParaRPr lang="en-US" sz="1800" kern="1200" dirty="0"/>
+        </a:p>
+      </dsp:txBody>
+      <dsp:txXfrm>
+        <a:off x="1447796" y="1008822"/>
+        <a:ext cx="1180718" cy="590359"/>
+      </dsp:txXfrm>
+    </dsp:sp>
+    <dsp:sp modelId="{68DF29B4-CB2F-4E47-931F-1D0F60589E9F}">
+      <dsp:nvSpPr>
+        <dsp:cNvPr id="0" name=""/>
+        <dsp:cNvSpPr/>
+      </dsp:nvSpPr>
+      <dsp:spPr>
+        <a:xfrm>
+          <a:off x="271" y="2386956"/>
+          <a:ext cx="1180718" cy="590359"/>
+        </a:xfrm>
+        <a:prstGeom prst="rect">
+          <a:avLst/>
+        </a:prstGeom>
+        <a:solidFill>
+          <a:schemeClr val="lt1">
+            <a:hueOff val="0"/>
+            <a:satOff val="0"/>
+            <a:lumOff val="0"/>
+            <a:alphaOff val="0"/>
+          </a:schemeClr>
+        </a:solidFill>
+        <a:ln w="25400" cap="flat" cmpd="sng" algn="ctr">
+          <a:solidFill>
+            <a:schemeClr val="dk1">
+              <a:shade val="80000"/>
+              <a:hueOff val="0"/>
+              <a:satOff val="0"/>
+              <a:lumOff val="0"/>
+              <a:alphaOff val="0"/>
+            </a:schemeClr>
+          </a:solidFill>
+          <a:prstDash val="solid"/>
+        </a:ln>
+        <a:effectLst/>
+      </dsp:spPr>
+      <dsp:style>
+        <a:lnRef idx="2">
+          <a:scrgbClr r="0" g="0" b="0"/>
+        </a:lnRef>
+        <a:fillRef idx="1">
+          <a:scrgbClr r="0" g="0" b="0"/>
+        </a:fillRef>
+        <a:effectRef idx="0">
+          <a:scrgbClr r="0" g="0" b="0"/>
+        </a:effectRef>
+        <a:fontRef idx="minor">
+          <a:schemeClr val="lt1"/>
+        </a:fontRef>
+      </dsp:style>
+      <dsp:txBody>
+        <a:bodyPr spcFirstLastPara="0" vert="horz" wrap="square" lIns="11430" tIns="11430" rIns="11430" bIns="11430" numCol="1" spcCol="1270" anchor="ctr" anchorCtr="0">
+          <a:noAutofit/>
+        </a:bodyPr>
+        <a:lstStyle/>
+        <a:p>
+          <a:pPr marL="0" lvl="0" indent="0" algn="ctr" defTabSz="800100">
+            <a:lnSpc>
+              <a:spcPct val="90000"/>
+            </a:lnSpc>
+            <a:spcBef>
+              <a:spcPct val="0"/>
+            </a:spcBef>
+            <a:spcAft>
+              <a:spcPct val="35000"/>
+            </a:spcAft>
+            <a:buNone/>
+          </a:pPr>
+          <a:r>
+            <a:rPr lang="en-US" sz="1800" kern="1200" dirty="0" err="1"/>
+            <a:t>CoffeeOrder</a:t>
+          </a:r>
+          <a:endParaRPr lang="en-US" sz="1800" kern="1200" dirty="0"/>
+        </a:p>
+      </dsp:txBody>
+      <dsp:txXfrm>
+        <a:off x="271" y="2386956"/>
+        <a:ext cx="1180718" cy="590359"/>
+      </dsp:txXfrm>
+    </dsp:sp>
+    <dsp:sp modelId="{7218482D-B1C4-4299-820E-061FE8B5CFC5}">
+      <dsp:nvSpPr>
+        <dsp:cNvPr id="0" name=""/>
+        <dsp:cNvSpPr/>
+      </dsp:nvSpPr>
+      <dsp:spPr>
+        <a:xfrm>
+          <a:off x="1428940" y="2386956"/>
+          <a:ext cx="1180718" cy="590359"/>
+        </a:xfrm>
+        <a:prstGeom prst="rect">
+          <a:avLst/>
+        </a:prstGeom>
+        <a:solidFill>
+          <a:schemeClr val="lt1">
+            <a:hueOff val="0"/>
+            <a:satOff val="0"/>
+            <a:lumOff val="0"/>
+            <a:alphaOff val="0"/>
+          </a:schemeClr>
+        </a:solidFill>
+        <a:ln w="25400" cap="flat" cmpd="sng" algn="ctr">
+          <a:solidFill>
+            <a:schemeClr val="dk1">
+              <a:shade val="80000"/>
+              <a:hueOff val="0"/>
+              <a:satOff val="0"/>
+              <a:lumOff val="0"/>
+              <a:alphaOff val="0"/>
+            </a:schemeClr>
+          </a:solidFill>
+          <a:prstDash val="solid"/>
+        </a:ln>
+        <a:effectLst/>
+      </dsp:spPr>
+      <dsp:style>
+        <a:lnRef idx="2">
+          <a:scrgbClr r="0" g="0" b="0"/>
+        </a:lnRef>
+        <a:fillRef idx="1">
+          <a:scrgbClr r="0" g="0" b="0"/>
+        </a:fillRef>
+        <a:effectRef idx="0">
+          <a:scrgbClr r="0" g="0" b="0"/>
+        </a:effectRef>
+        <a:fontRef idx="minor">
+          <a:schemeClr val="lt1"/>
+        </a:fontRef>
+      </dsp:style>
+      <dsp:txBody>
+        <a:bodyPr spcFirstLastPara="0" vert="horz" wrap="square" lIns="11430" tIns="11430" rIns="11430" bIns="11430" numCol="1" spcCol="1270" anchor="ctr" anchorCtr="0">
+          <a:noAutofit/>
+        </a:bodyPr>
+        <a:lstStyle/>
+        <a:p>
+          <a:pPr marL="0" lvl="0" indent="0" algn="ctr" defTabSz="800100">
+            <a:lnSpc>
+              <a:spcPct val="90000"/>
+            </a:lnSpc>
+            <a:spcBef>
+              <a:spcPct val="0"/>
+            </a:spcBef>
+            <a:spcAft>
+              <a:spcPct val="35000"/>
+            </a:spcAft>
+            <a:buNone/>
+          </a:pPr>
+          <a:r>
+            <a:rPr lang="en-US" sz="1800" kern="1200" dirty="0" err="1"/>
+            <a:t>WineOrder</a:t>
+          </a:r>
+          <a:endParaRPr lang="en-US" sz="1800" kern="1200" dirty="0"/>
+        </a:p>
+      </dsp:txBody>
+      <dsp:txXfrm>
+        <a:off x="1428940" y="2386956"/>
+        <a:ext cx="1180718" cy="590359"/>
+      </dsp:txXfrm>
+    </dsp:sp>
+    <dsp:sp modelId="{50F6EAD8-A2DB-4CCD-A1EE-4FBF8D3D8880}">
+      <dsp:nvSpPr>
+        <dsp:cNvPr id="0" name=""/>
+        <dsp:cNvSpPr/>
+      </dsp:nvSpPr>
+      <dsp:spPr>
+        <a:xfrm>
+          <a:off x="2857610" y="2386956"/>
+          <a:ext cx="1180718" cy="590359"/>
+        </a:xfrm>
+        <a:prstGeom prst="rect">
+          <a:avLst/>
+        </a:prstGeom>
+        <a:solidFill>
+          <a:schemeClr val="lt1">
+            <a:hueOff val="0"/>
+            <a:satOff val="0"/>
+            <a:lumOff val="0"/>
+            <a:alphaOff val="0"/>
+          </a:schemeClr>
+        </a:solidFill>
+        <a:ln w="25400" cap="flat" cmpd="sng" algn="ctr">
+          <a:solidFill>
+            <a:schemeClr val="dk1">
+              <a:shade val="80000"/>
+              <a:hueOff val="0"/>
+              <a:satOff val="0"/>
+              <a:lumOff val="0"/>
+              <a:alphaOff val="0"/>
+            </a:schemeClr>
+          </a:solidFill>
+          <a:prstDash val="solid"/>
+        </a:ln>
+        <a:effectLst/>
+      </dsp:spPr>
+      <dsp:style>
+        <a:lnRef idx="2">
+          <a:scrgbClr r="0" g="0" b="0"/>
+        </a:lnRef>
+        <a:fillRef idx="1">
+          <a:scrgbClr r="0" g="0" b="0"/>
+        </a:fillRef>
+        <a:effectRef idx="0">
+          <a:scrgbClr r="0" g="0" b="0"/>
+        </a:effectRef>
+        <a:fontRef idx="minor">
+          <a:schemeClr val="lt1"/>
+        </a:fontRef>
+      </dsp:style>
+      <dsp:txBody>
+        <a:bodyPr spcFirstLastPara="0" vert="horz" wrap="square" lIns="11430" tIns="11430" rIns="11430" bIns="11430" numCol="1" spcCol="1270" anchor="ctr" anchorCtr="0">
+          <a:noAutofit/>
+        </a:bodyPr>
+        <a:lstStyle/>
+        <a:p>
+          <a:pPr marL="0" lvl="0" indent="0" algn="ctr" defTabSz="800100">
+            <a:lnSpc>
+              <a:spcPct val="90000"/>
+            </a:lnSpc>
+            <a:spcBef>
+              <a:spcPct val="0"/>
+            </a:spcBef>
+            <a:spcAft>
+              <a:spcPct val="35000"/>
+            </a:spcAft>
+            <a:buNone/>
+          </a:pPr>
+          <a:r>
+            <a:rPr lang="en-US" sz="1800" kern="1200" dirty="0" err="1"/>
+            <a:t>TeaOrder</a:t>
+          </a:r>
+          <a:endParaRPr lang="en-US" sz="1800" kern="1200" dirty="0"/>
+        </a:p>
+      </dsp:txBody>
+      <dsp:txXfrm>
+        <a:off x="2857610" y="2386956"/>
+        <a:ext cx="1180718" cy="590359"/>
+      </dsp:txXfrm>
+    </dsp:sp>
+  </dsp:spTree>
+</dsp:drawing>
+</file>
+
+<file path=ppt/diagrams/layout1.xml><?xml version="1.0" encoding="utf-8"?>
+<dgm:layoutDef xmlns:dgm="http://schemas.openxmlformats.org/drawingml/2006/diagram" xmlns:a="http://schemas.openxmlformats.org/drawingml/2006/main" uniqueId="urn:microsoft.com/office/officeart/2005/8/layout/orgChart1">
+  <dgm:title val=""/>
+  <dgm:desc val=""/>
+  <dgm:catLst>
+    <dgm:cat type="hierarchy" pri="1000"/>
+    <dgm:cat type="convert" pri="6000"/>
+  </dgm:catLst>
+  <dgm:sampData>
+    <dgm:dataModel>
+      <dgm:ptLst>
+        <dgm:pt modelId="0" type="doc"/>
+        <dgm:pt modelId="1">
+          <dgm:prSet phldr="1"/>
+        </dgm:pt>
+        <dgm:pt modelId="2" type="asst">
+          <dgm:prSet phldr="1"/>
+        </dgm:pt>
+        <dgm:pt modelId="3">
+          <dgm:prSet phldr="1"/>
+        </dgm:pt>
+        <dgm:pt modelId="4">
+          <dgm:prSet phldr="1"/>
+        </dgm:pt>
+        <dgm:pt modelId="5">
+          <dgm:prSet phldr="1"/>
+        </dgm:pt>
+      </dgm:ptLst>
+      <dgm:cxnLst>
+        <dgm:cxn modelId="5" srcId="0" destId="1" srcOrd="0" destOrd="0"/>
+        <dgm:cxn modelId="6" srcId="1" destId="2" srcOrd="0" destOrd="0"/>
+        <dgm:cxn modelId="7" srcId="1" destId="3" srcOrd="1" destOrd="0"/>
+        <dgm:cxn modelId="8" srcId="1" destId="4" srcOrd="2" destOrd="0"/>
+        <dgm:cxn modelId="9" srcId="1" destId="5" srcOrd="3" destOrd="0"/>
+      </dgm:cxnLst>
+      <dgm:bg/>
+      <dgm:whole/>
+    </dgm:dataModel>
+  </dgm:sampData>
+  <dgm:styleData>
+    <dgm:dataModel>
+      <dgm:ptLst>
+        <dgm:pt modelId="0" type="doc"/>
+        <dgm:pt modelId="1"/>
+        <dgm:pt modelId="12"/>
+        <dgm:pt modelId="13"/>
+      </dgm:ptLst>
+      <dgm:cxnLst>
+        <dgm:cxn modelId="2" srcId="0" destId="1" srcOrd="0" destOrd="0"/>
+        <dgm:cxn modelId="16" srcId="1" destId="12" srcOrd="1" destOrd="0"/>
+        <dgm:cxn modelId="17" srcId="1" destId="13" srcOrd="2" destOrd="0"/>
+      </dgm:cxnLst>
+      <dgm:bg/>
+      <dgm:whole/>
+    </dgm:dataModel>
+  </dgm:styleData>
+  <dgm:clrData>
+    <dgm:dataModel>
+      <dgm:ptLst>
+        <dgm:pt modelId="0" type="doc"/>
+        <dgm:pt modelId="1"/>
+        <dgm:pt modelId="11" type="asst"/>
+        <dgm:pt modelId="12"/>
+        <dgm:pt modelId="13"/>
+        <dgm:pt modelId="14"/>
+      </dgm:ptLst>
+      <dgm:cxnLst>
+        <dgm:cxn modelId="2" srcId="0" destId="1" srcOrd="0" destOrd="0"/>
+        <dgm:cxn modelId="15" srcId="1" destId="11" srcOrd="0" destOrd="0"/>
+        <dgm:cxn modelId="16" srcId="1" destId="12" srcOrd="1" destOrd="0"/>
+        <dgm:cxn modelId="17" srcId="1" destId="13" srcOrd="2" destOrd="0"/>
+        <dgm:cxn modelId="18" srcId="1" destId="14" srcOrd="2" destOrd="0"/>
+      </dgm:cxnLst>
+      <dgm:bg/>
+      <dgm:whole/>
+    </dgm:dataModel>
+  </dgm:clrData>
+  <dgm:layoutNode name="hierChild1">
+    <dgm:varLst>
+      <dgm:orgChart val="1"/>
+      <dgm:chPref val="1"/>
+      <dgm:dir/>
+      <dgm:animOne val="branch"/>
+      <dgm:animLvl val="lvl"/>
+      <dgm:resizeHandles/>
+    </dgm:varLst>
+    <dgm:choose name="Name0">
+      <dgm:if name="Name1" func="var" arg="dir" op="equ" val="norm">
+        <dgm:alg type="hierChild">
+          <dgm:param type="linDir" val="fromL"/>
+        </dgm:alg>
+      </dgm:if>
+      <dgm:else name="Name2">
+        <dgm:alg type="hierChild">
+          <dgm:param type="linDir" val="fromR"/>
+        </dgm:alg>
+      </dgm:else>
+    </dgm:choose>
+    <dgm:shape xmlns:r="http://schemas.openxmlformats.org/officeDocument/2006/relationships" r:blip="">
+      <dgm:adjLst/>
+    </dgm:shape>
+    <dgm:presOf/>
+    <dgm:constrLst>
+      <dgm:constr type="w" for="des" forName="rootComposite1" refType="w" fact="10"/>
+      <dgm:constr type="h" for="des" forName="rootComposite1" refType="w" refFor="des" refForName="rootComposite1" fact="0.5"/>
+      <dgm:constr type="w" for="des" forName="rootComposite" refType="w" fact="10"/>
+      <dgm:constr type="h" for="des" forName="rootComposite" refType="w" refFor="des" refForName="rootComposite1" fact="0.5"/>
+      <dgm:constr type="w" for="des" forName="rootComposite3" refType="w" fact="10"/>
+      <dgm:constr type="h" for="des" forName="rootComposite3" refType="w" refFor="des" refForName="rootComposite1" fact="0.5"/>
+      <dgm:constr type="primFontSz" for="des" ptType="node" op="equ"/>
+      <dgm:constr type="sp" for="des" op="equ"/>
+      <dgm:constr type="sp" for="des" forName="hierRoot1" refType="w" refFor="des" refForName="rootComposite1" fact="0.21"/>
+      <dgm:constr type="sp" for="des" forName="hierRoot2" refType="sp" refFor="des" refForName="hierRoot1"/>
+      <dgm:constr type="sp" for="des" forName="hierRoot3" refType="sp" refFor="des" refForName="hierRoot1"/>
+      <dgm:constr type="sibSp" refType="w" refFor="des" refForName="rootComposite1" fact="0.21"/>
+      <dgm:constr type="sibSp" for="des" forName="hierChild2" refType="sibSp"/>
+      <dgm:constr type="sibSp" for="des" forName="hierChild3" refType="sibSp"/>
+      <dgm:constr type="sibSp" for="des" forName="hierChild4" refType="sibSp"/>
+      <dgm:constr type="sibSp" for="des" forName="hierChild5" refType="sibSp"/>
+      <dgm:constr type="sibSp" for="des" forName="hierChild6" refType="sibSp"/>
+      <dgm:constr type="sibSp" for="des" forName="hierChild7" refType="sibSp"/>
+      <dgm:constr type="secSibSp" refType="w" refFor="des" refForName="rootComposite1" fact="0.21"/>
+      <dgm:constr type="secSibSp" for="des" forName="hierChild2" refType="secSibSp"/>
+      <dgm:constr type="secSibSp" for="des" forName="hierChild3" refType="secSibSp"/>
+      <dgm:constr type="secSibSp" for="des" forName="hierChild4" refType="secSibSp"/>
+      <dgm:constr type="secSibSp" for="des" forName="hierChild5" refType="secSibSp"/>
+      <dgm:constr type="secSibSp" for="des" forName="hierChild6" refType="secSibSp"/>
+      <dgm:constr type="secSibSp" for="des" forName="hierChild7" refType="secSibSp"/>
+    </dgm:constrLst>
+    <dgm:ruleLst/>
+    <dgm:forEach name="Name3" axis="ch">
+      <dgm:forEach name="Name4" axis="self" ptType="node">
+        <dgm:layoutNode name="hierRoot1">
+          <dgm:varLst>
+            <dgm:hierBranch val="init"/>
+          </dgm:varLst>
+          <dgm:choose name="Name5">
+            <dgm:if name="Name6" func="var" arg="hierBranch" op="equ" val="l">
+              <dgm:choose name="Name7">
+                <dgm:if name="Name8" axis="ch" ptType="asst" func="cnt" op="gte" val="1">
+                  <dgm:alg type="hierRoot">
+                    <dgm:param type="hierAlign" val="tR"/>
+                  </dgm:alg>
+                  <dgm:constrLst>
+                    <dgm:constr type="alignOff" val="0.65"/>
+                  </dgm:constrLst>
+                </dgm:if>
+                <dgm:else name="Name9">
+                  <dgm:alg type="hierRoot">
+                    <dgm:param type="hierAlign" val="tR"/>
+                  </dgm:alg>
+                  <dgm:constrLst>
+                    <dgm:constr type="alignOff" val="0.25"/>
+                  </dgm:constrLst>
+                </dgm:else>
+              </dgm:choose>
+            </dgm:if>
+            <dgm:if name="Name10" func="var" arg="hierBranch" op="equ" val="r">
+              <dgm:choose name="Name11">
+                <dgm:if name="Name12" axis="ch" ptType="asst" func="cnt" op="gte" val="1">
+                  <dgm:alg type="hierRoot">
+                    <dgm:param type="hierAlign" val="tL"/>
+                  </dgm:alg>
+                  <dgm:constrLst>
+                    <dgm:constr type="alignOff" val="0.65"/>
+                  </dgm:constrLst>
+                </dgm:if>
+                <dgm:else name="Name13">
+                  <dgm:alg type="hierRoot">
+                    <dgm:param type="hierAlign" val="tL"/>
+                  </dgm:alg>
+                  <dgm:constrLst>
+                    <dgm:constr type="alignOff" val="0.25"/>
+                  </dgm:constrLst>
+                </dgm:else>
+              </dgm:choose>
+            </dgm:if>
+            <dgm:if name="Name14" func="var" arg="hierBranch" op="equ" val="hang">
+              <dgm:alg type="hierRoot"/>
+              <dgm:constrLst>
+                <dgm:constr type="alignOff" val="0.65"/>
+              </dgm:constrLst>
+            </dgm:if>
+            <dgm:else name="Name15">
+              <dgm:alg type="hierRoot"/>
+              <dgm:constrLst>
+                <dgm:constr type="alignOff"/>
+                <dgm:constr type="bendDist" for="des" ptType="parTrans" refType="sp" fact="0.5"/>
+              </dgm:constrLst>
+            </dgm:else>
+          </dgm:choose>
+          <dgm:shape xmlns:r="http://schemas.openxmlformats.org/officeDocument/2006/relationships" r:blip="">
+            <dgm:adjLst/>
+          </dgm:shape>
+          <dgm:presOf/>
+          <dgm:ruleLst/>
+          <dgm:layoutNode name="rootComposite1">
+            <dgm:alg type="composite"/>
+            <dgm:shape xmlns:r="http://schemas.openxmlformats.org/officeDocument/2006/relationships" r:blip="">
+              <dgm:adjLst/>
+            </dgm:shape>
+            <dgm:presOf axis="self" ptType="node" cnt="1"/>
+            <dgm:choose name="Name16">
+              <dgm:if name="Name17" func="var" arg="hierBranch" op="equ" val="init">
+                <dgm:constrLst>
+                  <dgm:constr type="l" for="ch" forName="rootText1"/>
+                  <dgm:constr type="t" for="ch" forName="rootText1"/>
+                  <dgm:constr type="w" for="ch" forName="rootText1" refType="w"/>
+                  <dgm:constr type="h" for="ch" forName="rootText1" refType="h"/>
+                  <dgm:constr type="l" for="ch" forName="rootConnector1"/>
+                  <dgm:constr type="t" for="ch" forName="rootConnector1"/>
+                  <dgm:constr type="w" for="ch" forName="rootConnector1" refType="w" refFor="ch" refForName="rootText1" fact="0.2"/>
+                  <dgm:constr type="h" for="ch" forName="rootConnector1" refType="h" refFor="ch" refForName="rootText1"/>
+                </dgm:constrLst>
+              </dgm:if>
+              <dgm:if name="Name18" func="var" arg="hierBranch" op="equ" val="l">
+                <dgm:constrLst>
+                  <dgm:constr type="l" for="ch" forName="rootText1"/>
+                  <dgm:constr type="t" for="ch" forName="rootText1"/>
+                  <dgm:constr type="w" for="ch" forName="rootText1" refType="w"/>
+                  <dgm:constr type="h" for="ch" forName="rootText1" refType="h"/>
+                  <dgm:constr type="r" for="ch" forName="rootConnector1" refType="w"/>
+                  <dgm:constr type="t" for="ch" forName="rootConnector1"/>
+                  <dgm:constr type="w" for="ch" forName="rootConnector1" refType="w" refFor="ch" refForName="rootText1" fact="0.2"/>
+                  <dgm:constr type="h" for="ch" forName="rootConnector1" refType="h" refFor="ch" refForName="rootText1"/>
+                </dgm:constrLst>
+              </dgm:if>
+              <dgm:if name="Name19" func="var" arg="hierBranch" op="equ" val="r">
+                <dgm:constrLst>
+                  <dgm:constr type="l" for="ch" forName="rootText1"/>
+                  <dgm:constr type="t" for="ch" forName="rootText1"/>
+                  <dgm:constr type="w" for="ch" forName="rootText1" refType="w"/>
+                  <dgm:constr type="h" for="ch" forName="rootText1" refType="h"/>
+                  <dgm:constr type="l" for="ch" forName="rootConnector1"/>
+                  <dgm:constr type="t" for="ch" forName="rootConnector1"/>
+                  <dgm:constr type="w" for="ch" forName="rootConnector1" refType="w" refFor="ch" refForName="rootText1" fact="0.2"/>
+                  <dgm:constr type="h" for="ch" forName="rootConnector1" refType="h" refFor="ch" refForName="rootText1"/>
+                </dgm:constrLst>
+              </dgm:if>
+              <dgm:else name="Name20">
+                <dgm:constrLst>
+                  <dgm:constr type="l" for="ch" forName="rootText1"/>
+                  <dgm:constr type="t" for="ch" forName="rootText1"/>
+                  <dgm:constr type="w" for="ch" forName="rootText1" refType="w"/>
+                  <dgm:constr type="h" for="ch" forName="rootText1" refType="h"/>
+                  <dgm:constr type="r" for="ch" forName="rootConnector1" refType="w"/>
+                  <dgm:constr type="t" for="ch" forName="rootConnector1"/>
+                  <dgm:constr type="w" for="ch" forName="rootConnector1" refType="w" refFor="ch" refForName="rootText1" fact="0.2"/>
+                  <dgm:constr type="h" for="ch" forName="rootConnector1" refType="h" refFor="ch" refForName="rootText1"/>
+                </dgm:constrLst>
+              </dgm:else>
+            </dgm:choose>
+            <dgm:ruleLst/>
+            <dgm:layoutNode name="rootText1" styleLbl="node0">
+              <dgm:varLst>
+                <dgm:chPref val="3"/>
+              </dgm:varLst>
+              <dgm:alg type="tx"/>
+              <dgm:shape xmlns:r="http://schemas.openxmlformats.org/officeDocument/2006/relationships" type="rect" r:blip="">
+                <dgm:adjLst/>
+              </dgm:shape>
+              <dgm:presOf axis="self" ptType="node" cnt="1"/>
+              <dgm:constrLst>
+                <dgm:constr type="primFontSz" val="65"/>
+                <dgm:constr type="lMarg" refType="primFontSz" fact="0.05"/>
+                <dgm:constr type="rMarg" refType="primFontSz" fact="0.05"/>
+                <dgm:constr type="tMarg" refType="primFontSz" fact="0.05"/>
+                <dgm:constr type="bMarg" refType="primFontSz" fact="0.05"/>
+              </dgm:constrLst>
+              <dgm:ruleLst>
+                <dgm:rule type="primFontSz" val="5" fact="NaN" max="NaN"/>
+              </dgm:ruleLst>
+            </dgm:layoutNode>
+            <dgm:layoutNode name="rootConnector1" moveWith="rootText1">
+              <dgm:alg type="sp"/>
+              <dgm:shape xmlns:r="http://schemas.openxmlformats.org/officeDocument/2006/relationships" type="rect" r:blip="" hideGeom="1">
+                <dgm:adjLst/>
+              </dgm:shape>
+              <dgm:presOf axis="self" ptType="node" cnt="1"/>
+              <dgm:constrLst/>
+              <dgm:ruleLst/>
+            </dgm:layoutNode>
+          </dgm:layoutNode>
+          <dgm:layoutNode name="hierChild2">
+            <dgm:choose name="Name21">
+              <dgm:if name="Name22" func="var" arg="hierBranch" op="equ" val="l">
+                <dgm:alg type="hierChild">
+                  <dgm:param type="chAlign" val="r"/>
+                  <dgm:param type="linDir" val="fromT"/>
+                </dgm:alg>
+              </dgm:if>
+              <dgm:if name="Name23" func="var" arg="hierBranch" op="equ" val="r">
+                <dgm:alg type="hierChild">
+                  <dgm:param type="chAlign" val="l"/>
+                  <dgm:param type="linDir" val="fromT"/>
+                </dgm:alg>
+              </dgm:if>
+              <dgm:if name="Name24" func="var" arg="hierBranch" op="equ" val="hang">
+                <dgm:choose name="Name25">
+                  <dgm:if name="Name26" func="var" arg="dir" op="equ" val="norm">
+                    <dgm:alg type="hierChild">
+                      <dgm:param type="chAlign" val="l"/>
+                      <dgm:param type="linDir" val="fromL"/>
+                      <dgm:param type="secChAlign" val="t"/>
+                      <dgm:param type="secLinDir" val="fromT"/>
+                    </dgm:alg>
+                  </dgm:if>
+                  <dgm:else name="Name27">
+                    <dgm:alg type="hierChild">
+                      <dgm:param type="chAlign" val="l"/>
+                      <dgm:param type="linDir" val="fromR"/>
+                      <dgm:param type="secChAlign" val="t"/>
+                      <dgm:param type="secLinDir" val="fromT"/>
+                    </dgm:alg>
+                  </dgm:else>
+                </dgm:choose>
+              </dgm:if>
+              <dgm:else name="Name28">
+                <dgm:choose name="Name29">
+                  <dgm:if name="Name30" func="var" arg="dir" op="equ" val="norm">
+                    <dgm:alg type="hierChild"/>
+                  </dgm:if>
+                  <dgm:else name="Name31">
+                    <dgm:alg type="hierChild">
+                      <dgm:param type="linDir" val="fromR"/>
+                    </dgm:alg>
+                  </dgm:else>
+                </dgm:choose>
+              </dgm:else>
+            </dgm:choose>
+            <dgm:shape xmlns:r="http://schemas.openxmlformats.org/officeDocument/2006/relationships" r:blip="">
+              <dgm:adjLst/>
+            </dgm:shape>
+            <dgm:presOf/>
+            <dgm:constrLst/>
+            <dgm:ruleLst/>
+            <dgm:forEach name="rep2a" axis="ch" ptType="nonAsst">
+              <dgm:forEach name="Name32" axis="precedSib" ptType="parTrans" st="-1" cnt="1">
+                <dgm:choose name="Name33">
+                  <dgm:if name="Name34" func="var" arg="hierBranch" op="equ" val="std">
+                    <dgm:layoutNode name="Name35">
+                      <dgm:alg type="conn">
+                        <dgm:param type="connRout" val="bend"/>
+                        <dgm:param type="dim" val="1D"/>
+                        <dgm:param type="endSty" val="noArr"/>
+                        <dgm:param type="begPts" val="bCtr"/>
+                        <dgm:param type="endPts" val="tCtr"/>
+                        <dgm:param type="bendPt" val="end"/>
+                      </dgm:alg>
+                      <dgm:shape xmlns:r="http://schemas.openxmlformats.org/officeDocument/2006/relationships" type="conn" r:blip="" zOrderOff="-99999">
+                        <dgm:adjLst/>
+                      </dgm:shape>
+                      <dgm:presOf axis="self"/>
+                      <dgm:constrLst>
+                        <dgm:constr type="begPad"/>
+                        <dgm:constr type="endPad"/>
+                      </dgm:constrLst>
+                      <dgm:ruleLst/>
+                    </dgm:layoutNode>
+                  </dgm:if>
+                  <dgm:if name="Name36" func="var" arg="hierBranch" op="equ" val="init">
+                    <dgm:layoutNode name="Name37">
+                      <dgm:choose name="Name38">
+                        <dgm:if name="Name39" axis="self" func="depth" op="lte" val="2">
+                          <dgm:alg type="conn">
+                            <dgm:param type="connRout" val="bend"/>
+                            <dgm:param type="dim" val="1D"/>
+                            <dgm:param type="endSty" val="noArr"/>
+                            <dgm:param type="begPts" val="bCtr"/>
+                            <dgm:param type="endPts" val="tCtr"/>
+                            <dgm:param type="bendPt" val="end"/>
+                          </dgm:alg>
+                        </dgm:if>
+                        <dgm:else name="Name40">
+                          <dgm:choose name="Name41">
+                            <dgm:if name="Name42" axis="par des" func="maxDepth" op="lte" val="1">
+                              <dgm:choose name="Name43">
+                                <dgm:if name="Name44" axis="par ch" ptType="node asst" func="cnt" op="gte" val="1">
+                                  <dgm:alg type="conn">
+                                    <dgm:param type="connRout" val="bend"/>
+                                    <dgm:param type="dim" val="1D"/>
+                                    <dgm:param type="endSty" val="noArr"/>
+                                    <dgm:param type="begPts" val="bCtr"/>
+                                    <dgm:param type="endPts" val="midL midR"/>
+                                  </dgm:alg>
+                                </dgm:if>
+                                <dgm:else name="Name45">
+                                  <dgm:alg type="conn">
+                                    <dgm:param type="connRout" val="bend"/>
+                                    <dgm:param type="dim" val="1D"/>
+                                    <dgm:param type="endSty" val="noArr"/>
+                                    <dgm:param type="begPts" val="bCtr"/>
+                                    <dgm:param type="endPts" val="midL midR"/>
+                                    <dgm:param type="srcNode" val="rootConnector"/>
+                                  </dgm:alg>
+                                </dgm:else>
+                              </dgm:choose>
+                            </dgm:if>
+                            <dgm:else name="Name46">
+                              <dgm:alg type="conn">
+                                <dgm:param type="connRout" val="bend"/>
+                                <dgm:param type="dim" val="1D"/>
+                                <dgm:param type="endSty" val="noArr"/>
+                                <dgm:param type="begPts" val="bCtr"/>
+                                <dgm:param type="endPts" val="tCtr"/>
+                                <dgm:param type="bendPt" val="end"/>
+                              </dgm:alg>
+                            </dgm:else>
+                          </dgm:choose>
+                        </dgm:else>
+                      </dgm:choose>
+                      <dgm:shape xmlns:r="http://schemas.openxmlformats.org/officeDocument/2006/relationships" type="conn" r:blip="" zOrderOff="-99999">
+                        <dgm:adjLst/>
+                      </dgm:shape>
+                      <dgm:presOf axis="self"/>
+                      <dgm:constrLst>
+                        <dgm:constr type="begPad"/>
+                        <dgm:constr type="endPad"/>
+                      </dgm:constrLst>
+                      <dgm:ruleLst/>
+                    </dgm:layoutNode>
+                  </dgm:if>
+                  <dgm:if name="Name47" func="var" arg="hierBranch" op="equ" val="hang">
+                    <dgm:layoutNode name="Name48">
+                      <dgm:alg type="conn">
+                        <dgm:param type="connRout" val="bend"/>
+                        <dgm:param type="dim" val="1D"/>
+                        <dgm:param type="endSty" val="noArr"/>
+                        <dgm:param type="begPts" val="bCtr"/>
+                        <dgm:param type="endPts" val="midL midR"/>
+                      </dgm:alg>
+                      <dgm:shape xmlns:r="http://schemas.openxmlformats.org/officeDocument/2006/relationships" type="conn" r:blip="" zOrderOff="-99999">
+                        <dgm:adjLst/>
+                      </dgm:shape>
+                      <dgm:presOf axis="self"/>
+                      <dgm:constrLst>
+                        <dgm:constr type="begPad"/>
+                        <dgm:constr type="endPad"/>
+                      </dgm:constrLst>
+                      <dgm:ruleLst/>
+                    </dgm:layoutNode>
+                  </dgm:if>
+                  <dgm:else name="Name49">
+                    <dgm:layoutNode name="Name50">
+                      <dgm:choose name="Name51">
+                        <dgm:if name="Name52" axis="self" func="depth" op="lte" val="2">
+                          <dgm:choose name="Name53">
+                            <dgm:if name="Name54" axis="par ch" ptType="node asst" func="cnt" op="gte" val="1">
+                              <dgm:alg type="conn">
+                                <dgm:param type="connRout" val="bend"/>
+                                <dgm:param type="dim" val="1D"/>
+                                <dgm:param type="endSty" val="noArr"/>
+                                <dgm:param type="begPts" val="bCtr"/>
+                                <dgm:param type="endPts" val="midL midR"/>
+                              </dgm:alg>
+                            </dgm:if>
+                            <dgm:else name="Name55">
+                              <dgm:alg type="conn">
+                                <dgm:param type="connRout" val="bend"/>
+                                <dgm:param type="dim" val="1D"/>
+                                <dgm:param type="endSty" val="noArr"/>
+                                <dgm:param type="begPts" val="bCtr"/>
+                                <dgm:param type="endPts" val="midL midR"/>
+                                <dgm:param type="srcNode" val="rootConnector1"/>
+                              </dgm:alg>
+                            </dgm:else>
+                          </dgm:choose>
+                        </dgm:if>
+                        <dgm:else name="Name56">
+                          <dgm:choose name="Name57">
+                            <dgm:if name="Name58" axis="par ch" ptType="node asst" func="cnt" op="gte" val="1">
+                              <dgm:alg type="conn">
+                                <dgm:param type="connRout" val="bend"/>
+                                <dgm:param type="dim" val="1D"/>
+                                <dgm:param type="endSty" val="noArr"/>
+                                <dgm:param type="begPts" val="bCtr"/>
+                                <dgm:param type="endPts" val="midL midR"/>
+                              </dgm:alg>
+                            </dgm:if>
+                            <dgm:else name="Name59">
+                              <dgm:alg type="conn">
+                                <dgm:param type="connRout" val="bend"/>
+                                <dgm:param type="dim" val="1D"/>
+                                <dgm:param type="endSty" val="noArr"/>
+                                <dgm:param type="begPts" val="bCtr"/>
+                                <dgm:param type="endPts" val="midL midR"/>
+                                <dgm:param type="srcNode" val="rootConnector"/>
+                              </dgm:alg>
+                            </dgm:else>
+                          </dgm:choose>
+                        </dgm:else>
+                      </dgm:choose>
+                      <dgm:shape xmlns:r="http://schemas.openxmlformats.org/officeDocument/2006/relationships" type="conn" r:blip="" zOrderOff="-99999">
+                        <dgm:adjLst/>
+                      </dgm:shape>
+                      <dgm:presOf axis="self"/>
+                      <dgm:constrLst>
+                        <dgm:constr type="begPad"/>
+                        <dgm:constr type="endPad"/>
+                      </dgm:constrLst>
+                      <dgm:ruleLst/>
+                    </dgm:layoutNode>
+                  </dgm:else>
+                </dgm:choose>
+              </dgm:forEach>
+              <dgm:layoutNode name="hierRoot2">
+                <dgm:varLst>
+                  <dgm:hierBranch val="init"/>
+                </dgm:varLst>
+                <dgm:choose name="Name60">
+                  <dgm:if name="Name61" func="var" arg="hierBranch" op="equ" val="l">
+                    <dgm:choose name="Name62">
+                      <dgm:if name="Name63" axis="ch" ptType="asst" func="cnt" op="gte" val="1">
+                        <dgm:alg type="hierRoot">
+                          <dgm:param type="hierAlign" val="tR"/>
+                        </dgm:alg>
+                        <dgm:shape xmlns:r="http://schemas.openxmlformats.org/officeDocument/2006/relationships" r:blip="">
+                          <dgm:adjLst/>
+                        </dgm:shape>
+                        <dgm:presOf/>
+                        <dgm:constrLst>
+                          <dgm:constr type="alignOff" val="0.65"/>
+                        </dgm:constrLst>
+                      </dgm:if>
+                      <dgm:else name="Name64">
+                        <dgm:alg type="hierRoot">
+                          <dgm:param type="hierAlign" val="tR"/>
+                        </dgm:alg>
+                        <dgm:shape xmlns:r="http://schemas.openxmlformats.org/officeDocument/2006/relationships" r:blip="">
+                          <dgm:adjLst/>
+                        </dgm:shape>
+                        <dgm:presOf/>
+                        <dgm:constrLst>
+                          <dgm:constr type="alignOff" val="0.25"/>
+                        </dgm:constrLst>
+                      </dgm:else>
+                    </dgm:choose>
+                  </dgm:if>
+                  <dgm:if name="Name65" func="var" arg="hierBranch" op="equ" val="r">
+                    <dgm:choose name="Name66">
+                      <dgm:if name="Name67" axis="ch" ptType="asst" func="cnt" op="gte" val="1">
+                        <dgm:alg type="hierRoot">
+                          <dgm:param type="hierAlign" val="tL"/>
+                        </dgm:alg>
+                        <dgm:shape xmlns:r="http://schemas.openxmlformats.org/officeDocument/2006/relationships" r:blip="">
+                          <dgm:adjLst/>
+                        </dgm:shape>
+                        <dgm:presOf/>
+                        <dgm:constrLst>
+                          <dgm:constr type="alignOff" val="0.65"/>
+                        </dgm:constrLst>
+                      </dgm:if>
+                      <dgm:else name="Name68">
+                        <dgm:alg type="hierRoot">
+                          <dgm:param type="hierAlign" val="tL"/>
+                        </dgm:alg>
+                        <dgm:shape xmlns:r="http://schemas.openxmlformats.org/officeDocument/2006/relationships" r:blip="">
+                          <dgm:adjLst/>
+                        </dgm:shape>
+                        <dgm:presOf/>
+                        <dgm:constrLst>
+                          <dgm:constr type="alignOff" val="0.25"/>
+                        </dgm:constrLst>
+                      </dgm:else>
+                    </dgm:choose>
+                  </dgm:if>
+                  <dgm:if name="Name69" func="var" arg="hierBranch" op="equ" val="std">
+                    <dgm:alg type="hierRoot"/>
+                    <dgm:shape xmlns:r="http://schemas.openxmlformats.org/officeDocument/2006/relationships" r:blip="">
+                      <dgm:adjLst/>
+                    </dgm:shape>
+                    <dgm:presOf/>
+                    <dgm:constrLst>
+                      <dgm:constr type="alignOff"/>
+                      <dgm:constr type="bendDist" for="des" ptType="parTrans" refType="sp" fact="0.5"/>
+                    </dgm:constrLst>
+                  </dgm:if>
+                  <dgm:if name="Name70" func="var" arg="hierBranch" op="equ" val="init">
+                    <dgm:choose name="Name71">
+                      <dgm:if name="Name72" axis="des" func="maxDepth" op="lte" val="1">
+                        <dgm:choose name="Name73">
+                          <dgm:if name="Name74" axis="ch" ptType="asst" func="cnt" op="gte" val="1">
+                            <dgm:alg type="hierRoot">
+                              <dgm:param type="hierAlign" val="tL"/>
+                            </dgm:alg>
+                            <dgm:shape xmlns:r="http://schemas.openxmlformats.org/officeDocument/2006/relationships" r:blip="">
+                              <dgm:adjLst/>
+                            </dgm:shape>
+                            <dgm:presOf/>
+                            <dgm:constrLst>
+                              <dgm:constr type="alignOff" val="0.65"/>
+                            </dgm:constrLst>
+                          </dgm:if>
+                          <dgm:else name="Name75">
+                            <dgm:alg type="hierRoot">
+                              <dgm:param type="hierAlign" val="tL"/>
+                            </dgm:alg>
+                            <dgm:shape xmlns:r="http://schemas.openxmlformats.org/officeDocument/2006/relationships" r:blip="">
+                              <dgm:adjLst/>
+                            </dgm:shape>
+                            <dgm:presOf/>
+                            <dgm:constrLst>
+                              <dgm:constr type="alignOff" val="0.25"/>
+                            </dgm:constrLst>
+                          </dgm:else>
+                        </dgm:choose>
+                      </dgm:if>
+                      <dgm:else name="Name76">
+                        <dgm:alg type="hierRoot"/>
+                        <dgm:shape xmlns:r="http://schemas.openxmlformats.org/officeDocument/2006/relationships" r:blip="">
+                          <dgm:adjLst/>
+                        </dgm:shape>
+                        <dgm:presOf/>
+                        <dgm:constrLst>
+                          <dgm:constr type="alignOff"/>
+                          <dgm:constr type="bendDist" for="des" ptType="parTrans" refType="sp" fact="0.5"/>
+                        </dgm:constrLst>
+                      </dgm:else>
+                    </dgm:choose>
+                  </dgm:if>
+                  <dgm:else name="Name77">
+                    <dgm:alg type="hierRoot"/>
+                    <dgm:shape xmlns:r="http://schemas.openxmlformats.org/officeDocument/2006/relationships" r:blip="">
+                      <dgm:adjLst/>
+                    </dgm:shape>
+                    <dgm:presOf/>
+                    <dgm:constrLst>
+                      <dgm:constr type="alignOff" val="0.65"/>
+                    </dgm:constrLst>
+                  </dgm:else>
+                </dgm:choose>
+                <dgm:ruleLst/>
+                <dgm:layoutNode name="rootComposite">
+                  <dgm:alg type="composite"/>
+                  <dgm:shape xmlns:r="http://schemas.openxmlformats.org/officeDocument/2006/relationships" r:blip="">
+                    <dgm:adjLst/>
+                  </dgm:shape>
+                  <dgm:presOf axis="self" ptType="node" cnt="1"/>
+                  <dgm:choose name="Name78">
+                    <dgm:if name="Name79" func="var" arg="hierBranch" op="equ" val="init">
+                      <dgm:constrLst>
+                        <dgm:constr type="l" for="ch" forName="rootText"/>
+                        <dgm:constr type="t" for="ch" forName="rootText"/>
+                        <dgm:constr type="w" for="ch" forName="rootText" refType="w"/>
+                        <dgm:constr type="h" for="ch" forName="rootText" refType="h"/>
+                        <dgm:constr type="l" for="ch" forName="rootConnector"/>
+                        <dgm:constr type="t" for="ch" forName="rootConnector"/>
+                        <dgm:constr type="w" for="ch" forName="rootConnector" refType="w" refFor="ch" refForName="rootText" fact="0.2"/>
+                        <dgm:constr type="h" for="ch" forName="rootConnector" refType="h" refFor="ch" refForName="rootText"/>
+                      </dgm:constrLst>
+                    </dgm:if>
+                    <dgm:if name="Name80" func="var" arg="hierBranch" op="equ" val="l">
+                      <dgm:constrLst>
+                        <dgm:constr type="l" for="ch" forName="rootText"/>
+                        <dgm:constr type="t" for="ch" forName="rootText"/>
+                        <dgm:constr type="w" for="ch" forName="rootText" refType="w"/>
+                        <dgm:constr type="h" for="ch" forName="rootText" refType="h"/>
+                        <dgm:constr type="r" for="ch" forName="rootConnector" refType="w"/>
+                        <dgm:constr type="t" for="ch" forName="rootConnector"/>
+                        <dgm:constr type="w" for="ch" forName="rootConnector" refType="w" refFor="ch" refForName="rootText" fact="0.2"/>
+                        <dgm:constr type="h" for="ch" forName="rootConnector" refType="h" refFor="ch" refForName="rootText"/>
+                      </dgm:constrLst>
+                    </dgm:if>
+                    <dgm:if name="Name81" func="var" arg="hierBranch" op="equ" val="r">
+                      <dgm:constrLst>
+                        <dgm:constr type="l" for="ch" forName="rootText"/>
+                        <dgm:constr type="t" for="ch" forName="rootText"/>
+                        <dgm:constr type="w" for="ch" forName="rootText" refType="w"/>
+                        <dgm:constr type="h" for="ch" forName="rootText" refType="h"/>
+                        <dgm:constr type="l" for="ch" forName="rootConnector"/>
+                        <dgm:constr type="t" for="ch" forName="rootConnector"/>
+                        <dgm:constr type="w" for="ch" forName="rootConnector" refType="w" refFor="ch" refForName="rootText" fact="0.2"/>
+                        <dgm:constr type="h" for="ch" forName="rootConnector" refType="h" refFor="ch" refForName="rootText"/>
+                      </dgm:constrLst>
+                    </dgm:if>
+                    <dgm:else name="Name82">
+                      <dgm:constrLst>
+                        <dgm:constr type="l" for="ch" forName="rootText"/>
+                        <dgm:constr type="t" for="ch" forName="rootText"/>
+                        <dgm:constr type="w" for="ch" forName="rootText" refType="w"/>
+                        <dgm:constr type="h" for="ch" forName="rootText" refType="h"/>
+                        <dgm:constr type="r" for="ch" forName="rootConnector" refType="w"/>
+                        <dgm:constr type="t" for="ch" forName="rootConnector"/>
+                        <dgm:constr type="w" for="ch" forName="rootConnector" refType="w" refFor="ch" refForName="rootText" fact="0.2"/>
+                        <dgm:constr type="h" for="ch" forName="rootConnector" refType="h" refFor="ch" refForName="rootText"/>
+                      </dgm:constrLst>
+                    </dgm:else>
+                  </dgm:choose>
+                  <dgm:ruleLst/>
+                  <dgm:layoutNode name="rootText">
+                    <dgm:varLst>
+                      <dgm:chPref val="3"/>
+                    </dgm:varLst>
+                    <dgm:alg type="tx"/>
+                    <dgm:shape xmlns:r="http://schemas.openxmlformats.org/officeDocument/2006/relationships" type="rect" r:blip="">
+                      <dgm:adjLst/>
+                    </dgm:shape>
+                    <dgm:presOf axis="self" ptType="node" cnt="1"/>
+                    <dgm:constrLst>
+                      <dgm:constr type="primFontSz" val="65"/>
+                      <dgm:constr type="lMarg" refType="primFontSz" fact="0.05"/>
+                      <dgm:constr type="rMarg" refType="primFontSz" fact="0.05"/>
+                      <dgm:constr type="tMarg" refType="primFontSz" fact="0.05"/>
+                      <dgm:constr type="bMarg" refType="primFontSz" fact="0.05"/>
+                    </dgm:constrLst>
+                    <dgm:ruleLst>
+                      <dgm:rule type="primFontSz" val="5" fact="NaN" max="NaN"/>
+                    </dgm:ruleLst>
+                  </dgm:layoutNode>
+                  <dgm:layoutNode name="rootConnector" moveWith="rootText">
+                    <dgm:alg type="sp"/>
+                    <dgm:shape xmlns:r="http://schemas.openxmlformats.org/officeDocument/2006/relationships" type="rect" r:blip="" hideGeom="1">
+                      <dgm:adjLst/>
+                    </dgm:shape>
+                    <dgm:presOf axis="self" ptType="node" cnt="1"/>
+                    <dgm:constrLst/>
+                    <dgm:ruleLst/>
+                  </dgm:layoutNode>
+                </dgm:layoutNode>
+                <dgm:layoutNode name="hierChild4">
+                  <dgm:choose name="Name83">
+                    <dgm:if name="Name84" func="var" arg="hierBranch" op="equ" val="l">
+                      <dgm:alg type="hierChild">
+                        <dgm:param type="chAlign" val="r"/>
+                        <dgm:param type="linDir" val="fromT"/>
+                      </dgm:alg>
+                    </dgm:if>
+                    <dgm:if name="Name85" func="var" arg="hierBranch" op="equ" val="r">
+                      <dgm:alg type="hierChild">
+                        <dgm:param type="chAlign" val="l"/>
+                        <dgm:param type="linDir" val="fromT"/>
+                      </dgm:alg>
+                    </dgm:if>
+                    <dgm:if name="Name86" func="var" arg="hierBranch" op="equ" val="hang">
+                      <dgm:choose name="Name87">
+                        <dgm:if name="Name88" func="var" arg="dir" op="equ" val="norm">
+                          <dgm:alg type="hierChild">
+                            <dgm:param type="chAlign" val="l"/>
+                            <dgm:param type="linDir" val="fromL"/>
+                            <dgm:param type="secChAlign" val="t"/>
+                            <dgm:param type="secLinDir" val="fromT"/>
+                          </dgm:alg>
+                        </dgm:if>
+                        <dgm:else name="Name89">
+                          <dgm:alg type="hierChild">
+                            <dgm:param type="chAlign" val="l"/>
+                            <dgm:param type="linDir" val="fromR"/>
+                            <dgm:param type="secChAlign" val="t"/>
+                            <dgm:param type="secLinDir" val="fromT"/>
+                          </dgm:alg>
+                        </dgm:else>
+                      </dgm:choose>
+                    </dgm:if>
+                    <dgm:if name="Name90" func="var" arg="hierBranch" op="equ" val="std">
+                      <dgm:choose name="Name91">
+                        <dgm:if name="Name92" func="var" arg="dir" op="equ" val="norm">
+                          <dgm:alg type="hierChild"/>
+                        </dgm:if>
+                        <dgm:else name="Name93">
+                          <dgm:alg type="hierChild">
+                            <dgm:param type="linDir" val="fromR"/>
+                          </dgm:alg>
+                        </dgm:else>
+                      </dgm:choose>
+                    </dgm:if>
+                    <dgm:if name="Name94" func="var" arg="hierBranch" op="equ" val="init">
+                      <dgm:choose name="Name95">
+                        <dgm:if name="Name96" axis="des" func="maxDepth" op="lte" val="1">
+                          <dgm:alg type="hierChild">
+                            <dgm:param type="chAlign" val="l"/>
+                            <dgm:param type="linDir" val="fromT"/>
+                          </dgm:alg>
+                        </dgm:if>
+                        <dgm:else name="Name97">
+                          <dgm:choose name="Name98">
+                            <dgm:if name="Name99" func="var" arg="dir" op="equ" val="norm">
+                              <dgm:alg type="hierChild"/>
+                            </dgm:if>
+                            <dgm:else name="Name100">
+                              <dgm:alg type="hierChild">
+                                <dgm:param type="linDir" val="fromR"/>
+                              </dgm:alg>
+                            </dgm:else>
+                          </dgm:choose>
+                        </dgm:else>
+                      </dgm:choose>
+                    </dgm:if>
+                    <dgm:else name="Name101"/>
+                  </dgm:choose>
+                  <dgm:shape xmlns:r="http://schemas.openxmlformats.org/officeDocument/2006/relationships" r:blip="">
+                    <dgm:adjLst/>
+                  </dgm:shape>
+                  <dgm:presOf/>
+                  <dgm:constrLst/>
+                  <dgm:ruleLst/>
+                  <dgm:forEach name="Name102" ref="rep2a"/>
+                </dgm:layoutNode>
+                <dgm:layoutNode name="hierChild5">
+                  <dgm:choose name="Name103">
+                    <dgm:if name="Name104" func="var" arg="dir" op="equ" val="norm">
+                      <dgm:alg type="hierChild">
+                        <dgm:param type="chAlign" val="l"/>
+                        <dgm:param type="linDir" val="fromL"/>
+                        <dgm:param type="secChAlign" val="t"/>
+                        <dgm:param type="secLinDir" val="fromT"/>
+                      </dgm:alg>
+                    </dgm:if>
+                    <dgm:else name="Name105">
+                      <dgm:alg type="hierChild">
+                        <dgm:param type="chAlign" val="l"/>
+                        <dgm:param type="linDir" val="fromR"/>
+                        <dgm:param type="secChAlign" val="t"/>
+                        <dgm:param type="secLinDir" val="fromT"/>
+                      </dgm:alg>
+                    </dgm:else>
+                  </dgm:choose>
+                  <dgm:shape xmlns:r="http://schemas.openxmlformats.org/officeDocument/2006/relationships" r:blip="">
+                    <dgm:adjLst/>
+                  </dgm:shape>
+                  <dgm:presOf/>
+                  <dgm:constrLst/>
+                  <dgm:ruleLst/>
+                  <dgm:forEach name="Name106" ref="rep2b"/>
+                </dgm:layoutNode>
+              </dgm:layoutNode>
+            </dgm:forEach>
+          </dgm:layoutNode>
+          <dgm:layoutNode name="hierChild3">
+            <dgm:choose name="Name107">
+              <dgm:if name="Name108" func="var" arg="dir" op="equ" val="norm">
+                <dgm:alg type="hierChild">
+                  <dgm:param type="chAlign" val="l"/>
+                  <dgm:param type="linDir" val="fromL"/>
+                  <dgm:param type="secChAlign" val="t"/>
+                  <dgm:param type="secLinDir" val="fromT"/>
+                </dgm:alg>
+              </dgm:if>
+              <dgm:else name="Name109">
+                <dgm:alg type="hierChild">
+                  <dgm:param type="chAlign" val="l"/>
+                  <dgm:param type="linDir" val="fromR"/>
+                  <dgm:param type="secChAlign" val="t"/>
+                  <dgm:param type="secLinDir" val="fromT"/>
+                </dgm:alg>
+              </dgm:else>
+            </dgm:choose>
+            <dgm:shape xmlns:r="http://schemas.openxmlformats.org/officeDocument/2006/relationships" r:blip="">
+              <dgm:adjLst/>
+            </dgm:shape>
+            <dgm:presOf/>
+            <dgm:constrLst/>
+            <dgm:ruleLst/>
+            <dgm:forEach name="rep2b" axis="ch" ptType="asst">
+              <dgm:forEach name="Name110" axis="precedSib" ptType="parTrans" st="-1" cnt="1">
+                <dgm:layoutNode name="Name111">
+                  <dgm:alg type="conn">
+                    <dgm:param type="connRout" val="bend"/>
+                    <dgm:param type="dim" val="1D"/>
+                    <dgm:param type="endSty" val="noArr"/>
+                    <dgm:param type="begPts" val="bCtr"/>
+                    <dgm:param type="endPts" val="midL midR"/>
+                  </dgm:alg>
+                  <dgm:shape xmlns:r="http://schemas.openxmlformats.org/officeDocument/2006/relationships" type="conn" r:blip="" zOrderOff="-99999">
+                    <dgm:adjLst/>
+                  </dgm:shape>
+                  <dgm:presOf axis="self"/>
+                  <dgm:constrLst>
+                    <dgm:constr type="begPad"/>
+                    <dgm:constr type="endPad"/>
+                  </dgm:constrLst>
+                  <dgm:ruleLst/>
+                </dgm:layoutNode>
+              </dgm:forEach>
+              <dgm:layoutNode name="hierRoot3">
+                <dgm:varLst>
+                  <dgm:hierBranch val="init"/>
+                </dgm:varLst>
+                <dgm:choose name="Name112">
+                  <dgm:if name="Name113" func="var" arg="hierBranch" op="equ" val="l">
+                    <dgm:alg type="hierRoot">
+                      <dgm:param type="hierAlign" val="tR"/>
+                    </dgm:alg>
+                    <dgm:shape xmlns:r="http://schemas.openxmlformats.org/officeDocument/2006/relationships" r:blip="">
+                      <dgm:adjLst/>
+                    </dgm:shape>
+                    <dgm:presOf/>
+                    <dgm:constrLst>
+                      <dgm:constr type="alignOff" val="0.65"/>
+                    </dgm:constrLst>
+                  </dgm:if>
+                  <dgm:if name="Name114" func="var" arg="hierBranch" op="equ" val="r">
+                    <dgm:alg type="hierRoot">
+                      <dgm:param type="hierAlign" val="tL"/>
+                    </dgm:alg>
+                    <dgm:shape xmlns:r="http://schemas.openxmlformats.org/officeDocument/2006/relationships" r:blip="">
+                      <dgm:adjLst/>
+                    </dgm:shape>
+                    <dgm:presOf/>
+                    <dgm:constrLst>
+                      <dgm:constr type="alignOff" val="0.65"/>
+                    </dgm:constrLst>
+                  </dgm:if>
+                  <dgm:if name="Name115" func="var" arg="hierBranch" op="equ" val="hang">
+                    <dgm:alg type="hierRoot"/>
+                    <dgm:shape xmlns:r="http://schemas.openxmlformats.org/officeDocument/2006/relationships" r:blip="">
+                      <dgm:adjLst/>
+                    </dgm:shape>
+                    <dgm:presOf/>
+                    <dgm:constrLst>
+                      <dgm:constr type="alignOff" val="0.65"/>
+                    </dgm:constrLst>
+                  </dgm:if>
+                  <dgm:if name="Name116" func="var" arg="hierBranch" op="equ" val="std">
+                    <dgm:alg type="hierRoot"/>
+                    <dgm:shape xmlns:r="http://schemas.openxmlformats.org/officeDocument/2006/relationships" r:blip="">
+                      <dgm:adjLst/>
+                    </dgm:shape>
+                    <dgm:presOf/>
+                    <dgm:constrLst>
+                      <dgm:constr type="alignOff"/>
+                      <dgm:constr type="bendDist" for="des" ptType="parTrans" refType="sp" fact="0.5"/>
+                    </dgm:constrLst>
+                  </dgm:if>
+                  <dgm:if name="Name117" func="var" arg="hierBranch" op="equ" val="init">
+                    <dgm:choose name="Name118">
+                      <dgm:if name="Name119" axis="des" func="maxDepth" op="lte" val="1">
+                        <dgm:alg type="hierRoot">
+                          <dgm:param type="hierAlign" val="tL"/>
+                        </dgm:alg>
+                        <dgm:shape xmlns:r="http://schemas.openxmlformats.org/officeDocument/2006/relationships" r:blip="">
+                          <dgm:adjLst/>
+                        </dgm:shape>
+                        <dgm:presOf/>
+                        <dgm:constrLst>
+                          <dgm:constr type="alignOff" val="0.65"/>
+                        </dgm:constrLst>
+                      </dgm:if>
+                      <dgm:else name="Name120">
+                        <dgm:alg type="hierRoot"/>
+                        <dgm:shape xmlns:r="http://schemas.openxmlformats.org/officeDocument/2006/relationships" r:blip="">
+                          <dgm:adjLst/>
+                        </dgm:shape>
+                        <dgm:presOf/>
+                        <dgm:constrLst>
+                          <dgm:constr type="alignOff"/>
+                          <dgm:constr type="bendDist" for="des" ptType="parTrans" refType="sp" fact="0.5"/>
+                        </dgm:constrLst>
+                      </dgm:else>
+                    </dgm:choose>
+                  </dgm:if>
+                  <dgm:else name="Name121"/>
+                </dgm:choose>
+                <dgm:ruleLst/>
+                <dgm:layoutNode name="rootComposite3">
+                  <dgm:alg type="composite"/>
+                  <dgm:shape xmlns:r="http://schemas.openxmlformats.org/officeDocument/2006/relationships" r:blip="">
+                    <dgm:adjLst/>
+                  </dgm:shape>
+                  <dgm:presOf axis="self" ptType="node" cnt="1"/>
+                  <dgm:choose name="Name122">
+                    <dgm:if name="Name123" func="var" arg="hierBranch" op="equ" val="init">
+                      <dgm:constrLst>
+                        <dgm:constr type="l" for="ch" forName="rootText3"/>
+                        <dgm:constr type="t" for="ch" forName="rootText3"/>
+                        <dgm:constr type="w" for="ch" forName="rootText3" refType="w"/>
+                        <dgm:constr type="h" for="ch" forName="rootText3" refType="h"/>
+                        <dgm:constr type="l" for="ch" forName="rootConnector3"/>
+                        <dgm:constr type="t" for="ch" forName="rootConnector3"/>
+                        <dgm:constr type="w" for="ch" forName="rootConnector3" refType="w" refFor="ch" refForName="rootText3" fact="0.2"/>
+                        <dgm:constr type="h" for="ch" forName="rootConnector3" refType="h" refFor="ch" refForName="rootText3"/>
+                      </dgm:constrLst>
+                    </dgm:if>
+                    <dgm:if name="Name124" func="var" arg="hierBranch" op="equ" val="l">
+                      <dgm:constrLst>
+                        <dgm:constr type="l" for="ch" forName="rootText3"/>
+                        <dgm:constr type="t" for="ch" forName="rootText3"/>
+                        <dgm:constr type="w" for="ch" forName="rootText3" refType="w"/>
+                        <dgm:constr type="h" for="ch" forName="rootText3" refType="h"/>
+                        <dgm:constr type="r" for="ch" forName="rootConnector3" refType="w"/>
+                        <dgm:constr type="t" for="ch" forName="rootConnector3"/>
+                        <dgm:constr type="w" for="ch" forName="rootConnector3" refType="w" refFor="ch" refForName="rootText3" fact="0.2"/>
+                        <dgm:constr type="h" for="ch" forName="rootConnector3" refType="h" refFor="ch" refForName="rootText3"/>
+                      </dgm:constrLst>
+                    </dgm:if>
+                    <dgm:if name="Name125" func="var" arg="hierBranch" op="equ" val="r">
+                      <dgm:constrLst>
+                        <dgm:constr type="l" for="ch" forName="rootText3"/>
+                        <dgm:constr type="t" for="ch" forName="rootText3"/>
+                        <dgm:constr type="w" for="ch" forName="rootText3" refType="w"/>
+                        <dgm:constr type="h" for="ch" forName="rootText3" refType="h"/>
+                        <dgm:constr type="l" for="ch" forName="rootConnector3"/>
+                        <dgm:constr type="t" for="ch" forName="rootConnector3"/>
+                        <dgm:constr type="w" for="ch" forName="rootConnector3" refType="w" refFor="ch" refForName="rootText3" fact="0.2"/>
+                        <dgm:constr type="h" for="ch" forName="rootConnector3" refType="h" refFor="ch" refForName="rootText3"/>
+                      </dgm:constrLst>
+                    </dgm:if>
+                    <dgm:else name="Name126">
+                      <dgm:constrLst>
+                        <dgm:constr type="l" for="ch" forName="rootText3"/>
+                        <dgm:constr type="t" for="ch" forName="rootText3"/>
+                        <dgm:constr type="w" for="ch" forName="rootText3" refType="w"/>
+                        <dgm:constr type="h" for="ch" forName="rootText3" refType="h"/>
+                        <dgm:constr type="r" for="ch" forName="rootConnector3" refType="w"/>
+                        <dgm:constr type="t" for="ch" forName="rootConnector3"/>
+                        <dgm:constr type="w" for="ch" forName="rootConnector3" refType="w" refFor="ch" refForName="rootText3" fact="0.2"/>
+                        <dgm:constr type="h" for="ch" forName="rootConnector3" refType="h" refFor="ch" refForName="rootText3"/>
+                      </dgm:constrLst>
+                    </dgm:else>
+                  </dgm:choose>
+                  <dgm:ruleLst/>
+                  <dgm:layoutNode name="rootText3">
+                    <dgm:varLst>
+                      <dgm:chPref val="3"/>
+                    </dgm:varLst>
+                    <dgm:alg type="tx"/>
+                    <dgm:shape xmlns:r="http://schemas.openxmlformats.org/officeDocument/2006/relationships" type="rect" r:blip="">
+                      <dgm:adjLst/>
+                    </dgm:shape>
+                    <dgm:presOf axis="self" ptType="node" cnt="1"/>
+                    <dgm:constrLst>
+                      <dgm:constr type="primFontSz" val="65"/>
+                      <dgm:constr type="lMarg" refType="primFontSz" fact="0.05"/>
+                      <dgm:constr type="rMarg" refType="primFontSz" fact="0.05"/>
+                      <dgm:constr type="tMarg" refType="primFontSz" fact="0.05"/>
+                      <dgm:constr type="bMarg" refType="primFontSz" fact="0.05"/>
+                    </dgm:constrLst>
+                    <dgm:ruleLst>
+                      <dgm:rule type="primFontSz" val="5" fact="NaN" max="NaN"/>
+                    </dgm:ruleLst>
+                  </dgm:layoutNode>
+                  <dgm:layoutNode name="rootConnector3" moveWith="rootText1">
+                    <dgm:alg type="sp"/>
+                    <dgm:shape xmlns:r="http://schemas.openxmlformats.org/officeDocument/2006/relationships" type="rect" r:blip="" hideGeom="1">
+                      <dgm:adjLst/>
+                    </dgm:shape>
+                    <dgm:presOf axis="self" ptType="node" cnt="1"/>
+                    <dgm:constrLst/>
+                    <dgm:ruleLst/>
+                  </dgm:layoutNode>
+                </dgm:layoutNode>
+                <dgm:layoutNode name="hierChild6">
+                  <dgm:choose name="Name127">
+                    <dgm:if name="Name128" func="var" arg="hierBranch" op="equ" val="l">
+                      <dgm:alg type="hierChild">
+                        <dgm:param type="chAlign" val="r"/>
+                        <dgm:param type="linDir" val="fromT"/>
+                      </dgm:alg>
+                    </dgm:if>
+                    <dgm:if name="Name129" func="var" arg="hierBranch" op="equ" val="r">
+                      <dgm:alg type="hierChild">
+                        <dgm:param type="chAlign" val="l"/>
+                        <dgm:param type="linDir" val="fromT"/>
+                      </dgm:alg>
+                    </dgm:if>
+                    <dgm:if name="Name130" func="var" arg="hierBranch" op="equ" val="hang">
+                      <dgm:choose name="Name131">
+                        <dgm:if name="Name132" func="var" arg="dir" op="equ" val="norm">
+                          <dgm:alg type="hierChild">
+                            <dgm:param type="chAlign" val="l"/>
+                            <dgm:param type="linDir" val="fromL"/>
+                            <dgm:param type="secChAlign" val="t"/>
+                            <dgm:param type="secLinDir" val="fromT"/>
+                          </dgm:alg>
+                        </dgm:if>
+                        <dgm:else name="Name133">
+                          <dgm:alg type="hierChild">
+                            <dgm:param type="chAlign" val="l"/>
+                            <dgm:param type="linDir" val="fromR"/>
+                            <dgm:param type="secChAlign" val="t"/>
+                            <dgm:param type="secLinDir" val="fromT"/>
+                          </dgm:alg>
+                        </dgm:else>
+                      </dgm:choose>
+                    </dgm:if>
+                    <dgm:if name="Name134" func="var" arg="hierBranch" op="equ" val="std">
+                      <dgm:choose name="Name135">
+                        <dgm:if name="Name136" func="var" arg="dir" op="equ" val="norm">
+                          <dgm:alg type="hierChild"/>
+                        </dgm:if>
+                        <dgm:else name="Name137">
+                          <dgm:alg type="hierChild">
+                            <dgm:param type="linDir" val="fromR"/>
+                          </dgm:alg>
+                        </dgm:else>
+                      </dgm:choose>
+                    </dgm:if>
+                    <dgm:if name="Name138" func="var" arg="hierBranch" op="equ" val="init">
+                      <dgm:choose name="Name139">
+                        <dgm:if name="Name140" axis="des" func="maxDepth" op="lte" val="1">
+                          <dgm:alg type="hierChild">
+                            <dgm:param type="chAlign" val="l"/>
+                            <dgm:param type="linDir" val="fromT"/>
+                          </dgm:alg>
+                        </dgm:if>
+                        <dgm:else name="Name141">
+                          <dgm:alg type="hierChild"/>
+                        </dgm:else>
+                      </dgm:choose>
+                    </dgm:if>
+                    <dgm:else name="Name142"/>
+                  </dgm:choose>
+                  <dgm:shape xmlns:r="http://schemas.openxmlformats.org/officeDocument/2006/relationships" r:blip="">
+                    <dgm:adjLst/>
+                  </dgm:shape>
+                  <dgm:presOf/>
+                  <dgm:constrLst/>
+                  <dgm:ruleLst/>
+                  <dgm:forEach name="Name143" ref="rep2a"/>
+                </dgm:layoutNode>
+                <dgm:layoutNode name="hierChild7">
+                  <dgm:choose name="Name144">
+                    <dgm:if name="Name145" func="var" arg="dir" op="equ" val="norm">
+                      <dgm:alg type="hierChild">
+                        <dgm:param type="chAlign" val="l"/>
+                        <dgm:param type="linDir" val="fromL"/>
+                        <dgm:param type="secChAlign" val="t"/>
+                        <dgm:param type="secLinDir" val="fromT"/>
+                      </dgm:alg>
+                    </dgm:if>
+                    <dgm:else name="Name146">
+                      <dgm:alg type="hierChild">
+                        <dgm:param type="chAlign" val="l"/>
+                        <dgm:param type="linDir" val="fromR"/>
+                        <dgm:param type="secChAlign" val="t"/>
+                        <dgm:param type="secLinDir" val="fromT"/>
+                      </dgm:alg>
+                    </dgm:else>
+                  </dgm:choose>
+                  <dgm:shape xmlns:r="http://schemas.openxmlformats.org/officeDocument/2006/relationships" r:blip="">
+                    <dgm:adjLst/>
+                  </dgm:shape>
+                  <dgm:presOf/>
+                  <dgm:constrLst/>
+                  <dgm:ruleLst/>
+                  <dgm:forEach name="Name147" ref="rep2b"/>
+                </dgm:layoutNode>
+              </dgm:layoutNode>
+            </dgm:forEach>
+          </dgm:layoutNode>
+        </dgm:layoutNode>
+      </dgm:forEach>
+    </dgm:forEach>
+  </dgm:layoutNode>
+</dgm:layoutDef>
+</file>
+
+<file path=ppt/diagrams/quickStyle1.xml><?xml version="1.0" encoding="utf-8"?>
+<dgm:styleDef xmlns:dgm="http://schemas.openxmlformats.org/drawingml/2006/diagram" xmlns:a="http://schemas.openxmlformats.org/drawingml/2006/main" uniqueId="urn:microsoft.com/office/officeart/2005/8/quickstyle/simple1">
+  <dgm:title val=""/>
+  <dgm:desc val=""/>
+  <dgm:catLst>
+    <dgm:cat type="simple" pri="10100"/>
+  </dgm:catLst>
+  <dgm:scene3d>
+    <a:camera prst="orthographicFront"/>
+    <a:lightRig rig="threePt" dir="t"/>
+  </dgm:scene3d>
+  <dgm:styleLbl name="node0">
+    <dgm:scene3d>
+      <a:camera prst="orthographicFront"/>
+      <a:lightRig rig="threePt" dir="t"/>
+    </dgm:scene3d>
+    <dgm:sp3d/>
+    <dgm:txPr/>
+    <dgm:style>
+      <a:lnRef idx="2">
+        <a:scrgbClr r="0" g="0" b="0"/>
+      </a:lnRef>
+      <a:fillRef idx="1">
+        <a:scrgbClr r="0" g="0" b="0"/>
+      </a:fillRef>
+      <a:effectRef idx="0">
+        <a:scrgbClr r="0" g="0" b="0"/>
+      </a:effectRef>
+      <a:fontRef idx="minor">
+        <a:schemeClr val="lt1"/>
+      </a:fontRef>
+    </dgm:style>
+  </dgm:styleLbl>
+  <dgm:styleLbl name="lnNode1">
+    <dgm:scene3d>
+      <a:camera prst="orthographicFront"/>
+      <a:lightRig rig="threePt" dir="t"/>
+    </dgm:scene3d>
+    <dgm:sp3d/>
+    <dgm:txPr/>
+    <dgm:style>
+      <a:lnRef idx="2">
+        <a:scrgbClr r="0" g="0" b="0"/>
+      </a:lnRef>
+      <a:fillRef idx="1">
+        <a:scrgbClr r="0" g="0" b="0"/>
+      </a:fillRef>
+      <a:effectRef idx="0">
+        <a:scrgbClr r="0" g="0" b="0"/>
+      </a:effectRef>
+      <a:fontRef idx="minor">
+        <a:schemeClr val="lt1"/>
+      </a:fontRef>
+    </dgm:style>
+  </dgm:styleLbl>
+  <dgm:styleLbl name="vennNode1">
+    <dgm:scene3d>
+      <a:camera prst="orthographicFront"/>
+      <a:lightRig rig="threePt" dir="t"/>
+    </dgm:scene3d>
+    <dgm:sp3d/>
+    <dgm:txPr/>
+    <dgm:style>
+      <a:lnRef idx="2">
+        <a:scrgbClr r="0" g="0" b="0"/>
+      </a:lnRef>
+      <a:fillRef idx="1">
+        <a:scrgbClr r="0" g="0" b="0"/>
+      </a:fillRef>
+      <a:effectRef idx="0">
+        <a:scrgbClr r="0" g="0" b="0"/>
+      </a:effectRef>
+      <a:fontRef idx="minor">
+        <a:schemeClr val="tx1"/>
+      </a:fontRef>
+    </dgm:style>
+  </dgm:styleLbl>
+  <dgm:styleLbl name="alignNode1">
+    <dgm:scene3d>
+      <a:camera prst="orthographicFront"/>
+      <a:lightRig rig="threePt" dir="t"/>
+    </dgm:scene3d>
+    <dgm:sp3d/>
+    <dgm:txPr/>
+    <dgm:style>
+      <a:lnRef idx="2">
+        <a:scrgbClr r="0" g="0" b="0"/>
+      </a:lnRef>
+      <a:fillRef idx="1">
+        <a:scrgbClr r="0" g="0" b="0"/>
+      </a:fillRef>
+      <a:effectRef idx="0">
+        <a:scrgbClr r="0" g="0" b="0"/>
+      </a:effectRef>
+      <a:fontRef idx="minor">
+        <a:schemeClr val="lt1"/>
+      </a:fontRef>
+    </dgm:style>
+  </dgm:styleLbl>
+  <dgm:styleLbl name="node1">
+    <dgm:scene3d>
+      <a:camera prst="orthographicFront"/>
+      <a:lightRig rig="threePt" dir="t"/>
+    </dgm:scene3d>
+    <dgm:sp3d/>
+    <dgm:txPr/>
+    <dgm:style>
+      <a:lnRef idx="2">
+        <a:scrgbClr r="0" g="0" b="0"/>
+      </a:lnRef>
+      <a:fillRef idx="1">
+        <a:scrgbClr r="0" g="0" b="0"/>
+      </a:fillRef>
+      <a:effectRef idx="0">
+        <a:scrgbClr r="0" g="0" b="0"/>
+      </a:effectRef>
+      <a:fontRef idx="minor">
+        <a:schemeClr val="lt1"/>
+      </a:fontRef>
+    </dgm:style>
+  </dgm:styleLbl>
+  <dgm:styleLbl name="node2">
+    <dgm:scene3d>
+      <a:camera prst="orthographicFront"/>
+      <a:lightRig rig="threePt" dir="t"/>
+    </dgm:scene3d>
+    <dgm:sp3d/>
+    <dgm:txPr/>
+    <dgm:style>
+      <a:lnRef idx="2">
+        <a:scrgbClr r="0" g="0" b="0"/>
+      </a:lnRef>
+      <a:fillRef idx="1">
+        <a:scrgbClr r="0" g="0" b="0"/>
+      </a:fillRef>
+      <a:effectRef idx="0">
+        <a:scrgbClr r="0" g="0" b="0"/>
+      </a:effectRef>
+      <a:fontRef idx="minor">
+        <a:schemeClr val="lt1"/>
+      </a:fontRef>
+    </dgm:style>
+  </dgm:styleLbl>
+  <dgm:styleLbl name="node3">
+    <dgm:scene3d>
+      <a:camera prst="orthographicFront"/>
+      <a:lightRig rig="threePt" dir="t"/>
+    </dgm:scene3d>
+    <dgm:sp3d/>
+    <dgm:txPr/>
+    <dgm:style>
+      <a:lnRef idx="2">
+        <a:scrgbClr r="0" g="0" b="0"/>
+      </a:lnRef>
+      <a:fillRef idx="1">
+        <a:scrgbClr r="0" g="0" b="0"/>
+      </a:fillRef>
+      <a:effectRef idx="0">
+        <a:scrgbClr r="0" g="0" b="0"/>
+      </a:effectRef>
+      <a:fontRef idx="minor">
+        <a:schemeClr val="lt1"/>
+      </a:fontRef>
+    </dgm:style>
+  </dgm:styleLbl>
+  <dgm:styleLbl name="node4">
+    <dgm:scene3d>
+      <a:camera prst="orthographicFront"/>
+      <a:lightRig rig="threePt" dir="t"/>
+    </dgm:scene3d>
+    <dgm:sp3d/>
+    <dgm:txPr/>
+    <dgm:style>
+      <a:lnRef idx="2">
+        <a:scrgbClr r="0" g="0" b="0"/>
+      </a:lnRef>
+      <a:fillRef idx="1">
+        <a:scrgbClr r="0" g="0" b="0"/>
+      </a:fillRef>
+      <a:effectRef idx="0">
+        <a:scrgbClr r="0" g="0" b="0"/>
+      </a:effectRef>
+      <a:fontRef idx="minor">
+        <a:schemeClr val="lt1"/>
+      </a:fontRef>
+    </dgm:style>
+  </dgm:styleLbl>
+  <dgm:styleLbl name="fgImgPlace1">
+    <dgm:scene3d>
+      <a:camera prst="orthographicFront"/>
+      <a:lightRig rig="threePt" dir="t"/>
+    </dgm:scene3d>
+    <dgm:sp3d/>
+    <dgm:txPr/>
+    <dgm:style>
+      <a:lnRef idx="2">
+        <a:scrgbClr r="0" g="0" b="0"/>
+      </a:lnRef>
+      <a:fillRef idx="1">
+        <a:scrgbClr r="0" g="0" b="0"/>
+      </a:fillRef>
+      <a:effectRef idx="0">
+        <a:scrgbClr r="0" g="0" b="0"/>
+      </a:effectRef>
+      <a:fontRef idx="minor"/>
+    </dgm:style>
+  </dgm:styleLbl>
+  <dgm:styleLbl name="alignImgPlace1">
+    <dgm:scene3d>
+      <a:camera prst="orthographicFront"/>
+      <a:lightRig rig="threePt" dir="t"/>
+    </dgm:scene3d>
+    <dgm:sp3d/>
+    <dgm:txPr/>
+    <dgm:style>
+      <a:lnRef idx="2">
+        <a:scrgbClr r="0" g="0" b="0"/>
+      </a:lnRef>
+      <a:fillRef idx="1">
+        <a:scrgbClr r="0" g="0" b="0"/>
+      </a:fillRef>
+      <a:effectRef idx="0">
+        <a:scrgbClr r="0" g="0" b="0"/>
+      </a:effectRef>
+      <a:fontRef idx="minor"/>
+    </dgm:style>
+  </dgm:styleLbl>
+  <dgm:styleLbl name="bgImgPlace1">
+    <dgm:scene3d>
+      <a:camera prst="orthographicFront"/>
+      <a:lightRig rig="threePt" dir="t"/>
+    </dgm:scene3d>
+    <dgm:sp3d/>
+    <dgm:txPr/>
+    <dgm:style>
+      <a:lnRef idx="2">
+        <a:scrgbClr r="0" g="0" b="0"/>
+      </a:lnRef>
+      <a:fillRef idx="1">
+        <a:scrgbClr r="0" g="0" b="0"/>
+      </a:fillRef>
+      <a:effectRef idx="0">
+        <a:scrgbClr r="0" g="0" b="0"/>
+      </a:effectRef>
+      <a:fontRef idx="minor"/>
+    </dgm:style>
+  </dgm:styleLbl>
+  <dgm:styleLbl name="sibTrans2D1">
+    <dgm:scene3d>
+      <a:camera prst="orthographicFront"/>
+      <a:lightRig rig="threePt" dir="t"/>
+    </dgm:scene3d>
+    <dgm:sp3d/>
+    <dgm:txPr/>
+    <dgm:style>
+      <a:lnRef idx="0">
+        <a:scrgbClr r="0" g="0" b="0"/>
+      </a:lnRef>
+      <a:fillRef idx="1">
+        <a:scrgbClr r="0" g="0" b="0"/>
+      </a:fillRef>
+      <a:effectRef idx="0">
+        <a:scrgbClr r="0" g="0" b="0"/>
+      </a:effectRef>
+      <a:fontRef idx="minor">
+        <a:schemeClr val="lt1"/>
+      </a:fontRef>
+    </dgm:style>
+  </dgm:styleLbl>
+  <dgm:styleLbl name="fgSibTrans2D1">
+    <dgm:scene3d>
+      <a:camera prst="orthographicFront"/>
+      <a:lightRig rig="threePt" dir="t"/>
+    </dgm:scene3d>
+    <dgm:sp3d/>
+    <dgm:txPr/>
+    <dgm:style>
+      <a:lnRef idx="0">
+        <a:scrgbClr r="0" g="0" b="0"/>
+      </a:lnRef>
+      <a:fillRef idx="1">
+        <a:scrgbClr r="0" g="0" b="0"/>
+      </a:fillRef>
+      <a:effectRef idx="0">
+        <a:scrgbClr r="0" g="0" b="0"/>
+      </a:effectRef>
+      <a:fontRef idx="minor">
+        <a:schemeClr val="lt1"/>
+      </a:fontRef>
+    </dgm:style>
+  </dgm:styleLbl>
+  <dgm:styleLbl name="bgSibTrans2D1">
+    <dgm:scene3d>
+      <a:camera prst="orthographicFront"/>
+      <a:lightRig rig="threePt" dir="t"/>
+    </dgm:scene3d>
+    <dgm:sp3d/>
+    <dgm:txPr/>
+    <dgm:style>
+      <a:lnRef idx="0">
+        <a:scrgbClr r="0" g="0" b="0"/>
+      </a:lnRef>
+      <a:fillRef idx="1">
+        <a:scrgbClr r="0" g="0" b="0"/>
+      </a:fillRef>
+      <a:effectRef idx="0">
+        <a:scrgbClr r="0" g="0" b="0"/>
+      </a:effectRef>
+      <a:fontRef idx="minor">
+        <a:schemeClr val="lt1"/>
+      </a:fontRef>
+    </dgm:style>
+  </dgm:styleLbl>
+  <dgm:styleLbl name="sibTrans1D1">
+    <dgm:scene3d>
+      <a:camera prst="orthographicFront"/>
+      <a:lightRig rig="threePt" dir="t"/>
+    </dgm:scene3d>
+    <dgm:sp3d/>
+    <dgm:txPr/>
+    <dgm:style>
+      <a:lnRef idx="1">
+        <a:scrgbClr r="0" g="0" b="0"/>
+      </a:lnRef>
+      <a:fillRef idx="0">
+        <a:scrgbClr r="0" g="0" b="0"/>
+      </a:fillRef>
+      <a:effectRef idx="0">
+        <a:scrgbClr r="0" g="0" b="0"/>
+      </a:effectRef>
+      <a:fontRef idx="minor"/>
+    </dgm:style>
+  </dgm:styleLbl>
+  <dgm:styleLbl name="callout">
+    <dgm:scene3d>
+      <a:camera prst="orthographicFront"/>
+      <a:lightRig rig="threePt" dir="t"/>
+    </dgm:scene3d>
+    <dgm:sp3d/>
+    <dgm:txPr/>
+    <dgm:style>
+      <a:lnRef idx="2">
+        <a:scrgbClr r="0" g="0" b="0"/>
+      </a:lnRef>
+      <a:fillRef idx="1">
+        <a:scrgbClr r="0" g="0" b="0"/>
+      </a:fillRef>
+      <a:effectRef idx="0">
+        <a:scrgbClr r="0" g="0" b="0"/>
+      </a:effectRef>
+      <a:fontRef idx="minor"/>
+    </dgm:style>
+  </dgm:styleLbl>
+  <dgm:styleLbl name="asst0">
+    <dgm:scene3d>
+      <a:camera prst="orthographicFront"/>
+      <a:lightRig rig="threePt" dir="t"/>
+    </dgm:scene3d>
+    <dgm:sp3d/>
+    <dgm:txPr/>
+    <dgm:style>
+      <a:lnRef idx="2">
+        <a:scrgbClr r="0" g="0" b="0"/>
+      </a:lnRef>
+      <a:fillRef idx="1">
+        <a:scrgbClr r="0" g="0" b="0"/>
+      </a:fillRef>
+      <a:effectRef idx="0">
+        <a:scrgbClr r="0" g="0" b="0"/>
+      </a:effectRef>
+      <a:fontRef idx="minor">
+        <a:schemeClr val="lt1"/>
+      </a:fontRef>
+    </dgm:style>
+  </dgm:styleLbl>
+  <dgm:styleLbl name="asst1">
+    <dgm:scene3d>
+      <a:camera prst="orthographicFront"/>
+      <a:lightRig rig="threePt" dir="t"/>
+    </dgm:scene3d>
+    <dgm:sp3d/>
+    <dgm:txPr/>
+    <dgm:style>
+      <a:lnRef idx="2">
+        <a:scrgbClr r="0" g="0" b="0"/>
+      </a:lnRef>
+      <a:fillRef idx="1">
+        <a:scrgbClr r="0" g="0" b="0"/>
+      </a:fillRef>
+      <a:effectRef idx="0">
+        <a:scrgbClr r="0" g="0" b="0"/>
+      </a:effectRef>
+      <a:fontRef idx="minor">
+        <a:schemeClr val="lt1"/>
+      </a:fontRef>
+    </dgm:style>
+  </dgm:styleLbl>
+  <dgm:styleLbl name="asst2">
+    <dgm:scene3d>
+      <a:camera prst="orthographicFront"/>
+      <a:lightRig rig="threePt" dir="t"/>
+    </dgm:scene3d>
+    <dgm:sp3d/>
+    <dgm:txPr/>
+    <dgm:style>
+      <a:lnRef idx="2">
+        <a:scrgbClr r="0" g="0" b="0"/>
+      </a:lnRef>
+      <a:fillRef idx="1">
+        <a:scrgbClr r="0" g="0" b="0"/>
+      </a:fillRef>
+      <a:effectRef idx="0">
+        <a:scrgbClr r="0" g="0" b="0"/>
+      </a:effectRef>
+      <a:fontRef idx="minor">
+        <a:schemeClr val="lt1"/>
+      </a:fontRef>
+    </dgm:style>
+  </dgm:styleLbl>
+  <dgm:styleLbl name="asst3">
+    <dgm:scene3d>
+      <a:camera prst="orthographicFront"/>
+      <a:lightRig rig="threePt" dir="t"/>
+    </dgm:scene3d>
+    <dgm:sp3d/>
+    <dgm:txPr/>
+    <dgm:style>
+      <a:lnRef idx="2">
+        <a:scrgbClr r="0" g="0" b="0"/>
+      </a:lnRef>
+      <a:fillRef idx="1">
+        <a:scrgbClr r="0" g="0" b="0"/>
+      </a:fillRef>
+      <a:effectRef idx="0">
+        <a:scrgbClr r="0" g="0" b="0"/>
+      </a:effectRef>
+      <a:fontRef idx="minor">
+        <a:schemeClr val="lt1"/>
+      </a:fontRef>
+    </dgm:style>
+  </dgm:styleLbl>
+  <dgm:styleLbl name="asst4">
+    <dgm:scene3d>
+      <a:camera prst="orthographicFront"/>
+      <a:lightRig rig="threePt" dir="t"/>
+    </dgm:scene3d>
+    <dgm:sp3d/>
+    <dgm:txPr/>
+    <dgm:style>
+      <a:lnRef idx="2">
+        <a:scrgbClr r="0" g="0" b="0"/>
+      </a:lnRef>
+      <a:fillRef idx="1">
+        <a:scrgbClr r="0" g="0" b="0"/>
+      </a:fillRef>
+      <a:effectRef idx="0">
+        <a:scrgbClr r="0" g="0" b="0"/>
+      </a:effectRef>
+      <a:fontRef idx="minor">
+        <a:schemeClr val="lt1"/>
+      </a:fontRef>
+    </dgm:style>
+  </dgm:styleLbl>
+  <dgm:styleLbl name="parChTrans2D1">
+    <dgm:scene3d>
+      <a:camera prst="orthographicFront"/>
+      <a:lightRig rig="threePt" dir="t"/>
+    </dgm:scene3d>
+    <dgm:sp3d/>
+    <dgm:txPr/>
+    <dgm:style>
+      <a:lnRef idx="2">
+        <a:scrgbClr r="0" g="0" b="0"/>
+      </a:lnRef>
+      <a:fillRef idx="1">
+        <a:scrgbClr r="0" g="0" b="0"/>
+      </a:fillRef>
+      <a:effectRef idx="0">
+        <a:scrgbClr r="0" g="0" b="0"/>
+      </a:effectRef>
+      <a:fontRef idx="minor">
+        <a:schemeClr val="lt1"/>
+      </a:fontRef>
+    </dgm:style>
+  </dgm:styleLbl>
+  <dgm:styleLbl name="parChTrans2D2">
+    <dgm:scene3d>
+      <a:camera prst="orthographicFront"/>
+      <a:lightRig rig="threePt" dir="t"/>
+    </dgm:scene3d>
+    <dgm:sp3d/>
+    <dgm:txPr/>
+    <dgm:style>
+      <a:lnRef idx="2">
+        <a:scrgbClr r="0" g="0" b="0"/>
+      </a:lnRef>
+      <a:fillRef idx="1">
+        <a:scrgbClr r="0" g="0" b="0"/>
+      </a:fillRef>
+      <a:effectRef idx="0">
+        <a:scrgbClr r="0" g="0" b="0"/>
+      </a:effectRef>
+      <a:fontRef idx="minor">
+        <a:schemeClr val="lt1"/>
+      </a:fontRef>
+    </dgm:style>
+  </dgm:styleLbl>
+  <dgm:styleLbl name="parChTrans2D3">
+    <dgm:scene3d>
+      <a:camera prst="orthographicFront"/>
+      <a:lightRig rig="threePt" dir="t"/>
+    </dgm:scene3d>
+    <dgm:sp3d/>
+    <dgm:txPr/>
+    <dgm:style>
+      <a:lnRef idx="2">
+        <a:scrgbClr r="0" g="0" b="0"/>
+      </a:lnRef>
+      <a:fillRef idx="1">
+        <a:scrgbClr r="0" g="0" b="0"/>
+      </a:fillRef>
+      <a:effectRef idx="0">
+        <a:scrgbClr r="0" g="0" b="0"/>
+      </a:effectRef>
+      <a:fontRef idx="minor">
+        <a:schemeClr val="lt1"/>
+      </a:fontRef>
+    </dgm:style>
+  </dgm:styleLbl>
+  <dgm:styleLbl name="parChTrans2D4">
+    <dgm:scene3d>
+      <a:camera prst="orthographicFront"/>
+      <a:lightRig rig="threePt" dir="t"/>
+    </dgm:scene3d>
+    <dgm:sp3d/>
+    <dgm:txPr/>
+    <dgm:style>
+      <a:lnRef idx="2">
+        <a:scrgbClr r="0" g="0" b="0"/>
+      </a:lnRef>
+      <a:fillRef idx="1">
+        <a:scrgbClr r="0" g="0" b="0"/>
+      </a:fillRef>
+      <a:effectRef idx="0">
+        <a:scrgbClr r="0" g="0" b="0"/>
+      </a:effectRef>
+      <a:fontRef idx="minor">
+        <a:schemeClr val="lt1"/>
+      </a:fontRef>
+    </dgm:style>
+  </dgm:styleLbl>
+  <dgm:styleLbl name="parChTrans1D1">
+    <dgm:scene3d>
+      <a:camera prst="orthographicFront"/>
+      <a:lightRig rig="threePt" dir="t"/>
+    </dgm:scene3d>
+    <dgm:sp3d/>
+    <dgm:txPr/>
+    <dgm:style>
+      <a:lnRef idx="2">
+        <a:scrgbClr r="0" g="0" b="0"/>
+      </a:lnRef>
+      <a:fillRef idx="0">
+        <a:scrgbClr r="0" g="0" b="0"/>
+      </a:fillRef>
+      <a:effectRef idx="0">
+        <a:scrgbClr r="0" g="0" b="0"/>
+      </a:effectRef>
+      <a:fontRef idx="minor"/>
+    </dgm:style>
+  </dgm:styleLbl>
+  <dgm:styleLbl name="parChTrans1D2">
+    <dgm:scene3d>
+      <a:camera prst="orthographicFront"/>
+      <a:lightRig rig="threePt" dir="t"/>
+    </dgm:scene3d>
+    <dgm:sp3d/>
+    <dgm:txPr/>
+    <dgm:style>
+      <a:lnRef idx="2">
+        <a:scrgbClr r="0" g="0" b="0"/>
+      </a:lnRef>
+      <a:fillRef idx="0">
+        <a:scrgbClr r="0" g="0" b="0"/>
+      </a:fillRef>
+      <a:effectRef idx="0">
+        <a:scrgbClr r="0" g="0" b="0"/>
+      </a:effectRef>
+      <a:fontRef idx="minor"/>
+    </dgm:style>
+  </dgm:styleLbl>
+  <dgm:styleLbl name="parChTrans1D3">
+    <dgm:scene3d>
+      <a:camera prst="orthographicFront"/>
+      <a:lightRig rig="threePt" dir="t"/>
+    </dgm:scene3d>
+    <dgm:sp3d/>
+    <dgm:txPr/>
+    <dgm:style>
+      <a:lnRef idx="2">
+        <a:scrgbClr r="0" g="0" b="0"/>
+      </a:lnRef>
+      <a:fillRef idx="0">
+        <a:scrgbClr r="0" g="0" b="0"/>
+      </a:fillRef>
+      <a:effectRef idx="0">
+        <a:scrgbClr r="0" g="0" b="0"/>
+      </a:effectRef>
+      <a:fontRef idx="minor"/>
+    </dgm:style>
+  </dgm:styleLbl>
+  <dgm:styleLbl name="parChTrans1D4">
+    <dgm:scene3d>
+      <a:camera prst="orthographicFront"/>
+      <a:lightRig rig="threePt" dir="t"/>
+    </dgm:scene3d>
+    <dgm:sp3d/>
+    <dgm:txPr/>
+    <dgm:style>
+      <a:lnRef idx="2">
+        <a:scrgbClr r="0" g="0" b="0"/>
+      </a:lnRef>
+      <a:fillRef idx="0">
+        <a:scrgbClr r="0" g="0" b="0"/>
+      </a:fillRef>
+      <a:effectRef idx="0">
+        <a:scrgbClr r="0" g="0" b="0"/>
+      </a:effectRef>
+      <a:fontRef idx="minor"/>
+    </dgm:style>
+  </dgm:styleLbl>
+  <dgm:styleLbl name="fgAcc1">
+    <dgm:scene3d>
+      <a:camera prst="orthographicFront"/>
+      <a:lightRig rig="threePt" dir="t"/>
+    </dgm:scene3d>
+    <dgm:sp3d/>
+    <dgm:txPr/>
+    <dgm:style>
+      <a:lnRef idx="2">
+        <a:scrgbClr r="0" g="0" b="0"/>
+      </a:lnRef>
+      <a:fillRef idx="1">
+        <a:scrgbClr r="0" g="0" b="0"/>
+      </a:fillRef>
+      <a:effectRef idx="0">
+        <a:scrgbClr r="0" g="0" b="0"/>
+      </a:effectRef>
+      <a:fontRef idx="minor"/>
+    </dgm:style>
+  </dgm:styleLbl>
+  <dgm:styleLbl name="conFgAcc1">
+    <dgm:scene3d>
+      <a:camera prst="orthographicFront"/>
+      <a:lightRig rig="threePt" dir="t"/>
+    </dgm:scene3d>
+    <dgm:sp3d/>
+    <dgm:txPr/>
+    <dgm:style>
+      <a:lnRef idx="2">
+        <a:scrgbClr r="0" g="0" b="0"/>
+      </a:lnRef>
+      <a:fillRef idx="1">
+        <a:scrgbClr r="0" g="0" b="0"/>
+      </a:fillRef>
+      <a:effectRef idx="0">
+        <a:scrgbClr r="0" g="0" b="0"/>
+      </a:effectRef>
+      <a:fontRef idx="minor"/>
+    </dgm:style>
+  </dgm:styleLbl>
+  <dgm:styleLbl name="alignAcc1">
+    <dgm:scene3d>
+      <a:camera prst="orthographicFront"/>
+      <a:lightRig rig="threePt" dir="t"/>
+    </dgm:scene3d>
+    <dgm:sp3d/>
+    <dgm:txPr/>
+    <dgm:style>
+      <a:lnRef idx="2">
+        <a:scrgbClr r="0" g="0" b="0"/>
+      </a:lnRef>
+      <a:fillRef idx="1">
+        <a:scrgbClr r="0" g="0" b="0"/>
+      </a:fillRef>
+      <a:effectRef idx="0">
+        <a:scrgbClr r="0" g="0" b="0"/>
+      </a:effectRef>
+      <a:fontRef idx="minor"/>
+    </dgm:style>
+  </dgm:styleLbl>
+  <dgm:styleLbl name="trAlignAcc1">
+    <dgm:scene3d>
+      <a:camera prst="orthographicFront"/>
+      <a:lightRig rig="threePt" dir="t"/>
+    </dgm:scene3d>
+    <dgm:sp3d/>
+    <dgm:txPr/>
+    <dgm:style>
+      <a:lnRef idx="1">
+        <a:scrgbClr r="0" g="0" b="0"/>
+      </a:lnRef>
+      <a:fillRef idx="1">
+        <a:scrgbClr r="0" g="0" b="0"/>
+      </a:fillRef>
+      <a:effectRef idx="0">
+        <a:scrgbClr r="0" g="0" b="0"/>
+      </a:effectRef>
+      <a:fontRef idx="minor"/>
+    </dgm:style>
+  </dgm:styleLbl>
+  <dgm:styleLbl name="bgAcc1">
+    <dgm:scene3d>
+      <a:camera prst="orthographicFront"/>
+      <a:lightRig rig="threePt" dir="t"/>
+    </dgm:scene3d>
+    <dgm:sp3d/>
+    <dgm:txPr/>
+    <dgm:style>
+      <a:lnRef idx="2">
+        <a:scrgbClr r="0" g="0" b="0"/>
+      </a:lnRef>
+      <a:fillRef idx="1">
+        <a:scrgbClr r="0" g="0" b="0"/>
+      </a:fillRef>
+      <a:effectRef idx="0">
+        <a:scrgbClr r="0" g="0" b="0"/>
+      </a:effectRef>
+      <a:fontRef idx="minor"/>
+    </dgm:style>
+  </dgm:styleLbl>
+  <dgm:styleLbl name="solidFgAcc1">
+    <dgm:scene3d>
+      <a:camera prst="orthographicFront"/>
+      <a:lightRig rig="threePt" dir="t"/>
+    </dgm:scene3d>
+    <dgm:sp3d/>
+    <dgm:txPr/>
+    <dgm:style>
+      <a:lnRef idx="2">
+        <a:scrgbClr r="0" g="0" b="0"/>
+      </a:lnRef>
+      <a:fillRef idx="1">
+        <a:scrgbClr r="0" g="0" b="0"/>
+      </a:fillRef>
+      <a:effectRef idx="0">
+        <a:scrgbClr r="0" g="0" b="0"/>
+      </a:effectRef>
+      <a:fontRef idx="minor"/>
+    </dgm:style>
+  </dgm:styleLbl>
+  <dgm:styleLbl name="solidAlignAcc1">
+    <dgm:scene3d>
+      <a:camera prst="orthographicFront"/>
+      <a:lightRig rig="threePt" dir="t"/>
+    </dgm:scene3d>
+    <dgm:sp3d/>
+    <dgm:txPr/>
+    <dgm:style>
+      <a:lnRef idx="2">
+        <a:scrgbClr r="0" g="0" b="0"/>
+      </a:lnRef>
+      <a:fillRef idx="1">
+        <a:scrgbClr r="0" g="0" b="0"/>
+      </a:fillRef>
+      <a:effectRef idx="0">
+        <a:scrgbClr r="0" g="0" b="0"/>
+      </a:effectRef>
+      <a:fontRef idx="minor"/>
+    </dgm:style>
+  </dgm:styleLbl>
+  <dgm:styleLbl name="solidBgAcc1">
+    <dgm:scene3d>
+      <a:camera prst="orthographicFront"/>
+      <a:lightRig rig="threePt" dir="t"/>
+    </dgm:scene3d>
+    <dgm:sp3d/>
+    <dgm:txPr/>
+    <dgm:style>
+      <a:lnRef idx="2">
+        <a:scrgbClr r="0" g="0" b="0"/>
+      </a:lnRef>
+      <a:fillRef idx="1">
+        <a:scrgbClr r="0" g="0" b="0"/>
+      </a:fillRef>
+      <a:effectRef idx="0">
+        <a:scrgbClr r="0" g="0" b="0"/>
+      </a:effectRef>
+      <a:fontRef idx="minor"/>
+    </dgm:style>
+  </dgm:styleLbl>
+  <dgm:styleLbl name="fgAccFollowNode1">
+    <dgm:scene3d>
+      <a:camera prst="orthographicFront"/>
+      <a:lightRig rig="threePt" dir="t"/>
+    </dgm:scene3d>
+    <dgm:sp3d/>
+    <dgm:txPr/>
+    <dgm:style>
+      <a:lnRef idx="2">
+        <a:scrgbClr r="0" g="0" b="0"/>
+      </a:lnRef>
+      <a:fillRef idx="1">
+        <a:scrgbClr r="0" g="0" b="0"/>
+      </a:fillRef>
+      <a:effectRef idx="0">
+        <a:scrgbClr r="0" g="0" b="0"/>
+      </a:effectRef>
+      <a:fontRef idx="minor"/>
+    </dgm:style>
+  </dgm:styleLbl>
+  <dgm:styleLbl name="alignAccFollowNode1">
+    <dgm:scene3d>
+      <a:camera prst="orthographicFront"/>
+      <a:lightRig rig="threePt" dir="t"/>
+    </dgm:scene3d>
+    <dgm:sp3d/>
+    <dgm:txPr/>
+    <dgm:style>
+      <a:lnRef idx="2">
+        <a:scrgbClr r="0" g="0" b="0"/>
+      </a:lnRef>
+      <a:fillRef idx="1">
+        <a:scrgbClr r="0" g="0" b="0"/>
+      </a:fillRef>
+      <a:effectRef idx="0">
+        <a:scrgbClr r="0" g="0" b="0"/>
+      </a:effectRef>
+      <a:fontRef idx="minor"/>
+    </dgm:style>
+  </dgm:styleLbl>
+  <dgm:styleLbl name="bgAccFollowNode1">
+    <dgm:scene3d>
+      <a:camera prst="orthographicFront"/>
+      <a:lightRig rig="threePt" dir="t"/>
+    </dgm:scene3d>
+    <dgm:sp3d/>
+    <dgm:txPr/>
+    <dgm:style>
+      <a:lnRef idx="2">
+        <a:scrgbClr r="0" g="0" b="0"/>
+      </a:lnRef>
+      <a:fillRef idx="1">
+        <a:scrgbClr r="0" g="0" b="0"/>
+      </a:fillRef>
+      <a:effectRef idx="0">
+        <a:scrgbClr r="0" g="0" b="0"/>
+      </a:effectRef>
+      <a:fontRef idx="minor"/>
+    </dgm:style>
+  </dgm:styleLbl>
+  <dgm:styleLbl name="fgAcc0">
+    <dgm:scene3d>
+      <a:camera prst="orthographicFront"/>
+      <a:lightRig rig="threePt" dir="t"/>
+    </dgm:scene3d>
+    <dgm:sp3d/>
+    <dgm:txPr/>
+    <dgm:style>
+      <a:lnRef idx="2">
+        <a:scrgbClr r="0" g="0" b="0"/>
+      </a:lnRef>
+      <a:fillRef idx="1">
+        <a:scrgbClr r="0" g="0" b="0"/>
+      </a:fillRef>
+      <a:effectRef idx="0">
+        <a:scrgbClr r="0" g="0" b="0"/>
+      </a:effectRef>
+      <a:fontRef idx="minor"/>
+    </dgm:style>
+  </dgm:styleLbl>
+  <dgm:styleLbl name="fgAcc2">
+    <dgm:scene3d>
+      <a:camera prst="orthographicFront"/>
+      <a:lightRig rig="threePt" dir="t"/>
+    </dgm:scene3d>
+    <dgm:sp3d/>
+    <dgm:txPr/>
+    <dgm:style>
+      <a:lnRef idx="2">
+        <a:scrgbClr r="0" g="0" b="0"/>
+      </a:lnRef>
+      <a:fillRef idx="1">
+        <a:scrgbClr r="0" g="0" b="0"/>
+      </a:fillRef>
+      <a:effectRef idx="0">
+        <a:scrgbClr r="0" g="0" b="0"/>
+      </a:effectRef>
+      <a:fontRef idx="minor"/>
+    </dgm:style>
+  </dgm:styleLbl>
+  <dgm:styleLbl name="fgAcc3">
+    <dgm:scene3d>
+      <a:camera prst="orthographicFront"/>
+      <a:lightRig rig="threePt" dir="t"/>
+    </dgm:scene3d>
+    <dgm:sp3d/>
+    <dgm:txPr/>
+    <dgm:style>
+      <a:lnRef idx="2">
+        <a:scrgbClr r="0" g="0" b="0"/>
+      </a:lnRef>
+      <a:fillRef idx="1">
+        <a:scrgbClr r="0" g="0" b="0"/>
+      </a:fillRef>
+      <a:effectRef idx="0">
+        <a:scrgbClr r="0" g="0" b="0"/>
+      </a:effectRef>
+      <a:fontRef idx="minor"/>
+    </dgm:style>
+  </dgm:styleLbl>
+  <dgm:styleLbl name="fgAcc4">
+    <dgm:scene3d>
+      <a:camera prst="orthographicFront"/>
+      <a:lightRig rig="threePt" dir="t"/>
+    </dgm:scene3d>
+    <dgm:sp3d/>
+    <dgm:txPr/>
+    <dgm:style>
+      <a:lnRef idx="2">
+        <a:scrgbClr r="0" g="0" b="0"/>
+      </a:lnRef>
+      <a:fillRef idx="1">
+        <a:scrgbClr r="0" g="0" b="0"/>
+      </a:fillRef>
+      <a:effectRef idx="0">
+        <a:scrgbClr r="0" g="0" b="0"/>
+      </a:effectRef>
+      <a:fontRef idx="minor"/>
+    </dgm:style>
+  </dgm:styleLbl>
+  <dgm:styleLbl name="bgShp">
+    <dgm:scene3d>
+      <a:camera prst="orthographicFront"/>
+      <a:lightRig rig="threePt" dir="t"/>
+    </dgm:scene3d>
+    <dgm:sp3d/>
+    <dgm:txPr/>
+    <dgm:style>
+      <a:lnRef idx="0">
+        <a:scrgbClr r="0" g="0" b="0"/>
+      </a:lnRef>
+      <a:fillRef idx="1">
+        <a:scrgbClr r="0" g="0" b="0"/>
+      </a:fillRef>
+      <a:effectRef idx="0">
+        <a:scrgbClr r="0" g="0" b="0"/>
+      </a:effectRef>
+      <a:fontRef idx="minor"/>
+    </dgm:style>
+  </dgm:styleLbl>
+  <dgm:styleLbl name="dkBgShp">
+    <dgm:scene3d>
+      <a:camera prst="orthographicFront"/>
+      <a:lightRig rig="threePt" dir="t"/>
+    </dgm:scene3d>
+    <dgm:sp3d/>
+    <dgm:txPr/>
+    <dgm:style>
+      <a:lnRef idx="0">
+        <a:scrgbClr r="0" g="0" b="0"/>
+      </a:lnRef>
+      <a:fillRef idx="1">
+        <a:scrgbClr r="0" g="0" b="0"/>
+      </a:fillRef>
+      <a:effectRef idx="0">
+        <a:scrgbClr r="0" g="0" b="0"/>
+      </a:effectRef>
+      <a:fontRef idx="minor"/>
+    </dgm:style>
+  </dgm:styleLbl>
+  <dgm:styleLbl name="trBgShp">
+    <dgm:scene3d>
+      <a:camera prst="orthographicFront"/>
+      <a:lightRig rig="threePt" dir="t"/>
+    </dgm:scene3d>
+    <dgm:sp3d/>
+    <dgm:txPr/>
+    <dgm:style>
+      <a:lnRef idx="0">
+        <a:scrgbClr r="0" g="0" b="0"/>
+      </a:lnRef>
+      <a:fillRef idx="1">
+        <a:scrgbClr r="0" g="0" b="0"/>
+      </a:fillRef>
+      <a:effectRef idx="0">
+        <a:scrgbClr r="0" g="0" b="0"/>
+      </a:effectRef>
+      <a:fontRef idx="minor"/>
+    </dgm:style>
+  </dgm:styleLbl>
+  <dgm:styleLbl name="fgShp">
+    <dgm:scene3d>
+      <a:camera prst="orthographicFront"/>
+      <a:lightRig rig="threePt" dir="t"/>
+    </dgm:scene3d>
+    <dgm:sp3d/>
+    <dgm:txPr/>
+    <dgm:style>
+      <a:lnRef idx="2">
+        <a:scrgbClr r="0" g="0" b="0"/>
+      </a:lnRef>
+      <a:fillRef idx="1">
+        <a:scrgbClr r="0" g="0" b="0"/>
+      </a:fillRef>
+      <a:effectRef idx="0">
+        <a:scrgbClr r="0" g="0" b="0"/>
+      </a:effectRef>
+      <a:fontRef idx="minor"/>
+    </dgm:style>
+  </dgm:styleLbl>
+  <dgm:styleLbl name="revTx">
+    <dgm:scene3d>
+      <a:camera prst="orthographicFront"/>
+      <a:lightRig rig="threePt" dir="t"/>
+    </dgm:scene3d>
+    <dgm:sp3d/>
+    <dgm:txPr/>
+    <dgm:style>
+      <a:lnRef idx="0">
+        <a:scrgbClr r="0" g="0" b="0"/>
+      </a:lnRef>
+      <a:fillRef idx="0">
+        <a:scrgbClr r="0" g="0" b="0"/>
+      </a:fillRef>
+      <a:effectRef idx="0">
+        <a:scrgbClr r="0" g="0" b="0"/>
+      </a:effectRef>
+      <a:fontRef idx="minor"/>
+    </dgm:style>
+  </dgm:styleLbl>
+</dgm:styleDef>
+</file>
+
 <file path=ppt/notesMasters/notesMaster1.xml><?xml version="1.0" encoding="utf-8"?>
 <p:notesMaster xmlns:a="http://schemas.openxmlformats.org/drawingml/2006/main" xmlns:r="http://schemas.openxmlformats.org/officeDocument/2006/relationships" xmlns:p="http://schemas.openxmlformats.org/presentationml/2006/main">
   <p:cSld>
@@ -282,7 +4155,7 @@
             <a:fld id="{E3057DDA-BF5C-4879-9957-16E91151DE1E}" type="datetimeFigureOut">
               <a:rPr lang="en-US" smtClean="0"/>
               <a:pPr/>
-              <a:t>7/24/2017</a:t>
+              <a:t>7/25/2017</a:t>
             </a:fld>
             <a:endParaRPr lang="en-US"/>
           </a:p>
@@ -874,7 +4747,7 @@
             <a:fld id="{47B2CBB0-62C7-44D8-B0B4-2BA0BA541526}" type="slidenum">
               <a:rPr lang="en-US" smtClean="0"/>
               <a:pPr/>
-              <a:t>31</a:t>
+              <a:t>33</a:t>
             </a:fld>
             <a:endParaRPr lang="en-US"/>
           </a:p>
@@ -959,7 +4832,7 @@
             <a:fld id="{6048B3DE-E9CD-4720-84B6-E24D30E64DE7}" type="slidenum">
               <a:rPr lang="en-US" smtClean="0"/>
               <a:pPr/>
-              <a:t>32</a:t>
+              <a:t>34</a:t>
             </a:fld>
             <a:endParaRPr lang="en-US"/>
           </a:p>
@@ -1165,7 +5038,7 @@
           <a:p>
             <a:fld id="{768B3A28-1884-497D-94C5-27227826CE2C}" type="datetime1">
               <a:rPr lang="en-US" smtClean="0"/>
-              <a:t>7/24/2017</a:t>
+              <a:t>7/25/2017</a:t>
             </a:fld>
             <a:endParaRPr lang="en-US"/>
           </a:p>
@@ -1434,7 +5307,7 @@
           <a:p>
             <a:fld id="{B8262C03-9B91-44B2-B7D5-2A844E6680F8}" type="datetime1">
               <a:rPr lang="en-US" smtClean="0"/>
-              <a:t>7/24/2017</a:t>
+              <a:t>7/25/2017</a:t>
             </a:fld>
             <a:endParaRPr lang="en-US"/>
           </a:p>
@@ -1619,7 +5492,7 @@
           <a:p>
             <a:fld id="{B11DCD3A-F44B-4ECF-B365-54BE99BB4BEA}" type="datetime1">
               <a:rPr lang="en-US" smtClean="0"/>
-              <a:t>7/24/2017</a:t>
+              <a:t>7/25/2017</a:t>
             </a:fld>
             <a:endParaRPr lang="en-US"/>
           </a:p>
@@ -1814,7 +5687,7 @@
           <a:p>
             <a:fld id="{94377941-97D9-4840-A51B-C8DAEDA2815C}" type="datetime1">
               <a:rPr lang="en-US" smtClean="0"/>
-              <a:t>7/24/2017</a:t>
+              <a:t>7/25/2017</a:t>
             </a:fld>
             <a:endParaRPr lang="en-US"/>
           </a:p>
@@ -2011,7 +5884,7 @@
           <a:p>
             <a:fld id="{AB7F5B1C-135C-4619-A2DE-25131AF5278A}" type="datetime1">
               <a:rPr lang="en-US" smtClean="0"/>
-              <a:t>7/24/2017</a:t>
+              <a:t>7/25/2017</a:t>
             </a:fld>
             <a:endParaRPr lang="en-US"/>
           </a:p>
@@ -2216,7 +6089,7 @@
           <a:p>
             <a:fld id="{29517BA8-26BA-4B7C-A41A-804B81F83A36}" type="datetime1">
               <a:rPr lang="en-US" smtClean="0"/>
-              <a:t>7/24/2017</a:t>
+              <a:t>7/25/2017</a:t>
             </a:fld>
             <a:endParaRPr lang="en-US"/>
           </a:p>
@@ -2478,7 +6351,7 @@
           <a:p>
             <a:fld id="{E54FABC5-F62F-49DD-A24E-5C2CE15A3D87}" type="datetime1">
               <a:rPr lang="en-US" smtClean="0"/>
-              <a:t>7/24/2017</a:t>
+              <a:t>7/25/2017</a:t>
             </a:fld>
             <a:endParaRPr lang="en-US"/>
           </a:p>
@@ -2780,7 +6653,7 @@
           <a:p>
             <a:fld id="{510AAC56-4986-4B63-9F74-D47EE64ADD9E}" type="datetime1">
               <a:rPr lang="en-US" smtClean="0"/>
-              <a:t>7/24/2017</a:t>
+              <a:t>7/25/2017</a:t>
             </a:fld>
             <a:endParaRPr lang="en-US"/>
           </a:p>
@@ -3216,7 +7089,7 @@
           <a:p>
             <a:fld id="{FCC14660-E407-48B8-9CF0-DD79C3F69AD0}" type="datetime1">
               <a:rPr lang="en-US" smtClean="0"/>
-              <a:t>7/24/2017</a:t>
+              <a:t>7/25/2017</a:t>
             </a:fld>
             <a:endParaRPr lang="en-US"/>
           </a:p>
@@ -3350,7 +7223,7 @@
           <a:p>
             <a:fld id="{9B0DE907-AEDA-4EE9-869A-B21DA6DC498D}" type="datetime1">
               <a:rPr lang="en-US" smtClean="0"/>
-              <a:t>7/24/2017</a:t>
+              <a:t>7/25/2017</a:t>
             </a:fld>
             <a:endParaRPr lang="en-US"/>
           </a:p>
@@ -3462,7 +7335,7 @@
           <a:p>
             <a:fld id="{38C540BA-3DB2-4124-8990-4661E7113E01}" type="datetime1">
               <a:rPr lang="en-US" smtClean="0"/>
-              <a:t>7/24/2017</a:t>
+              <a:t>7/25/2017</a:t>
             </a:fld>
             <a:endParaRPr lang="en-US"/>
           </a:p>
@@ -3754,7 +7627,7 @@
           <a:p>
             <a:fld id="{90F6EF63-9AC7-45BB-B551-A0640428FFFB}" type="datetime1">
               <a:rPr lang="en-US" smtClean="0"/>
-              <a:t>7/24/2017</a:t>
+              <a:t>7/25/2017</a:t>
             </a:fld>
             <a:endParaRPr lang="en-US"/>
           </a:p>
@@ -10434,19 +14307,21 @@
         </p:nvSpPr>
         <p:spPr/>
         <p:txBody>
-          <a:bodyPr/>
-          <a:lstStyle/>
-          <a:p>
-            <a:r>
-              <a:rPr lang="en-US" dirty="0"/>
-              <a:t>DDR Step 7: Review</a:t>
-            </a:r>
-          </a:p>
-        </p:txBody>
-      </p:sp>
-      <p:sp>
-        <p:nvSpPr>
-          <p:cNvPr id="4" name="Content Placeholder 3"/>
+          <a:bodyPr>
+            <a:normAutofit fontScale="90000"/>
+          </a:bodyPr>
+          <a:lstStyle/>
+          <a:p>
+            <a:r>
+              <a:rPr lang="en-US" dirty="0"/>
+              <a:t>The Shape of the Program Follows the Shape of the Data</a:t>
+            </a:r>
+          </a:p>
+        </p:txBody>
+      </p:sp>
+      <p:sp>
+        <p:nvSpPr>
+          <p:cNvPr id="5" name="Content Placeholder 4"/>
           <p:cNvSpPr>
             <a:spLocks noGrp="1"/>
           </p:cNvSpPr>
@@ -10456,25 +14331,121 @@
         </p:nvSpPr>
         <p:spPr/>
         <p:txBody>
-          <a:bodyPr/>
-          <a:lstStyle/>
-          <a:p>
-            <a:r>
-              <a:rPr lang="en-US" dirty="0"/>
-              <a:t>Nothing is done until you review it!</a:t>
-            </a:r>
-          </a:p>
-          <a:p>
-            <a:r>
-              <a:rPr lang="en-US" dirty="0"/>
-              <a:t>Before you move on, look at your data definition and ask the following questions</a:t>
-            </a:r>
-          </a:p>
-        </p:txBody>
-      </p:sp>
-      <p:sp>
-        <p:nvSpPr>
-          <p:cNvPr id="5" name="Slide Number Placeholder 4"/>
+          <a:bodyPr>
+            <a:normAutofit lnSpcReduction="10000"/>
+          </a:bodyPr>
+          <a:lstStyle/>
+          <a:p>
+            <a:r>
+              <a:rPr lang="en-US" dirty="0"/>
+              <a:t>A </a:t>
+            </a:r>
+            <a:r>
+              <a:rPr lang="en-US" dirty="0" err="1"/>
+              <a:t>BarOrder</a:t>
+            </a:r>
+            <a:r>
+              <a:rPr lang="en-US" dirty="0"/>
+              <a:t> is one of </a:t>
+            </a:r>
+          </a:p>
+          <a:p>
+            <a:pPr lvl="1"/>
+            <a:r>
+              <a:rPr lang="en-US" dirty="0"/>
+              <a:t>a </a:t>
+            </a:r>
+            <a:r>
+              <a:rPr lang="en-US" dirty="0" err="1"/>
+              <a:t>CoffeeOrder</a:t>
+            </a:r>
+            <a:endParaRPr lang="en-US" dirty="0"/>
+          </a:p>
+          <a:p>
+            <a:pPr lvl="1"/>
+            <a:r>
+              <a:rPr lang="en-US" dirty="0"/>
+              <a:t>a </a:t>
+            </a:r>
+            <a:r>
+              <a:rPr lang="en-US" dirty="0" err="1"/>
+              <a:t>WineOrder</a:t>
+            </a:r>
+            <a:r>
+              <a:rPr lang="en-US" dirty="0"/>
+              <a:t>, or</a:t>
+            </a:r>
+          </a:p>
+          <a:p>
+            <a:pPr lvl="1"/>
+            <a:r>
+              <a:rPr lang="en-US" dirty="0"/>
+              <a:t>a </a:t>
+            </a:r>
+            <a:r>
+              <a:rPr lang="en-US" dirty="0" err="1"/>
+              <a:t>TeaOrder</a:t>
+            </a:r>
+            <a:endParaRPr lang="en-US" dirty="0"/>
+          </a:p>
+          <a:p>
+            <a:r>
+              <a:rPr lang="en-US" dirty="0"/>
+              <a:t>The observer template tells that a function on </a:t>
+            </a:r>
+            <a:r>
+              <a:rPr lang="en-US" dirty="0" err="1"/>
+              <a:t>BarOrders</a:t>
+            </a:r>
+            <a:r>
+              <a:rPr lang="en-US" dirty="0"/>
+              <a:t> may call</a:t>
+            </a:r>
+          </a:p>
+          <a:p>
+            <a:pPr lvl="1"/>
+            <a:r>
+              <a:rPr lang="en-US" dirty="0"/>
+              <a:t>a function on </a:t>
+            </a:r>
+            <a:r>
+              <a:rPr lang="en-US" dirty="0" err="1"/>
+              <a:t>CoffeeOrders</a:t>
+            </a:r>
+            <a:endParaRPr lang="en-US" dirty="0"/>
+          </a:p>
+          <a:p>
+            <a:pPr lvl="1"/>
+            <a:r>
+              <a:rPr lang="en-US" dirty="0"/>
+              <a:t>a function on </a:t>
+            </a:r>
+            <a:r>
+              <a:rPr lang="en-US" dirty="0" err="1"/>
+              <a:t>WineOrders</a:t>
+            </a:r>
+            <a:r>
+              <a:rPr lang="en-US" dirty="0"/>
+              <a:t>, or</a:t>
+            </a:r>
+          </a:p>
+          <a:p>
+            <a:pPr lvl="1"/>
+            <a:r>
+              <a:rPr lang="en-US" dirty="0"/>
+              <a:t>a function on </a:t>
+            </a:r>
+            <a:r>
+              <a:rPr lang="en-US" dirty="0" err="1"/>
+              <a:t>TeaOrders</a:t>
+            </a:r>
+            <a:endParaRPr lang="en-US" dirty="0"/>
+          </a:p>
+        </p:txBody>
+      </p:sp>
+      <p:sp>
+        <p:nvSpPr>
+          <p:cNvPr id="4" name="Slide Number Placeholder 3"/>
           <p:cNvSpPr>
             <a:spLocks noGrp="1"/>
           </p:cNvSpPr>
@@ -10491,6 +14462,672 @@
               <a:rPr lang="en-US" smtClean="0"/>
               <a:pPr/>
               <a:t>31</a:t>
+            </a:fld>
+            <a:endParaRPr lang="en-US" dirty="0"/>
+          </a:p>
+        </p:txBody>
+      </p:sp>
+    </p:spTree>
+    <p:extLst>
+      <p:ext uri="{BB962C8B-B14F-4D97-AF65-F5344CB8AC3E}">
+        <p14:creationId xmlns:p14="http://schemas.microsoft.com/office/powerpoint/2010/main" val="3499858043"/>
+      </p:ext>
+    </p:extLst>
+  </p:cSld>
+  <p:clrMapOvr>
+    <a:masterClrMapping/>
+  </p:clrMapOvr>
+</p:sld>
+</file>
+
+<file path=ppt/slides/slide32.xml><?xml version="1.0" encoding="utf-8"?>
+<p:sld xmlns:a="http://schemas.openxmlformats.org/drawingml/2006/main" xmlns:r="http://schemas.openxmlformats.org/officeDocument/2006/relationships" xmlns:p="http://schemas.openxmlformats.org/presentationml/2006/main">
+  <p:cSld>
+    <p:spTree>
+      <p:nvGrpSpPr>
+        <p:cNvPr id="1" name=""/>
+        <p:cNvGrpSpPr/>
+        <p:nvPr/>
+      </p:nvGrpSpPr>
+      <p:grpSpPr>
+        <a:xfrm>
+          <a:off x="0" y="0"/>
+          <a:ext cx="0" cy="0"/>
+          <a:chOff x="0" y="0"/>
+          <a:chExt cx="0" cy="0"/>
+        </a:xfrm>
+      </p:grpSpPr>
+      <p:graphicFrame>
+        <p:nvGraphicFramePr>
+          <p:cNvPr id="7" name="Content Placeholder 6"/>
+          <p:cNvGraphicFramePr>
+            <a:graphicFrameLocks noGrp="1"/>
+          </p:cNvGraphicFramePr>
+          <p:nvPr>
+            <p:ph sz="half" idx="1"/>
+            <p:extLst>
+              <p:ext uri="{D42A27DB-BD31-4B8C-83A1-F6EECF244321}">
+                <p14:modId xmlns:p14="http://schemas.microsoft.com/office/powerpoint/2010/main" val="3517690711"/>
+              </p:ext>
+            </p:extLst>
+          </p:nvPr>
+        </p:nvGraphicFramePr>
+        <p:xfrm>
+          <a:off x="381000" y="1332681"/>
+          <a:ext cx="4038600" cy="4525963"/>
+        </p:xfrm>
+        <a:graphic>
+          <a:graphicData uri="http://schemas.openxmlformats.org/drawingml/2006/diagram">
+            <dgm:relIds xmlns:dgm="http://schemas.openxmlformats.org/drawingml/2006/diagram" xmlns:r="http://schemas.openxmlformats.org/officeDocument/2006/relationships" r:dm="rId2" r:lo="rId3" r:qs="rId4" r:cs="rId5"/>
+          </a:graphicData>
+        </a:graphic>
+      </p:graphicFrame>
+      <p:sp>
+        <p:nvSpPr>
+          <p:cNvPr id="2" name="Title 1"/>
+          <p:cNvSpPr>
+            <a:spLocks noGrp="1"/>
+          </p:cNvSpPr>
+          <p:nvPr>
+            <p:ph type="title"/>
+          </p:nvPr>
+        </p:nvSpPr>
+        <p:spPr>
+          <a:ln w="25400">
+            <a:solidFill>
+              <a:schemeClr val="accent1"/>
+            </a:solidFill>
+          </a:ln>
+        </p:spPr>
+        <p:txBody>
+          <a:bodyPr vert="horz" lIns="91440" tIns="45720" rIns="91440" bIns="45720" rtlCol="0" anchor="ctr">
+            <a:normAutofit fontScale="90000"/>
+          </a:bodyPr>
+          <a:lstStyle/>
+          <a:p>
+            <a:r>
+              <a:rPr lang="en-US" dirty="0"/>
+              <a:t>The Shape of the Program Follows the Shape of the Data</a:t>
+            </a:r>
+          </a:p>
+        </p:txBody>
+      </p:sp>
+      <p:sp>
+        <p:nvSpPr>
+          <p:cNvPr id="4" name="Slide Number Placeholder 3"/>
+          <p:cNvSpPr>
+            <a:spLocks noGrp="1"/>
+          </p:cNvSpPr>
+          <p:nvPr>
+            <p:ph type="sldNum" sz="quarter" idx="12"/>
+          </p:nvPr>
+        </p:nvSpPr>
+        <p:spPr/>
+        <p:txBody>
+          <a:bodyPr/>
+          <a:lstStyle/>
+          <a:p>
+            <a:fld id="{8D704B19-8EED-495A-99FA-12E5518CCC54}" type="slidenum">
+              <a:rPr lang="en-US" smtClean="0"/>
+              <a:pPr/>
+              <a:t>32</a:t>
+            </a:fld>
+            <a:endParaRPr lang="en-US"/>
+          </a:p>
+        </p:txBody>
+      </p:sp>
+      <p:sp>
+        <p:nvSpPr>
+          <p:cNvPr id="10" name="Rectangle 9"/>
+          <p:cNvSpPr/>
+          <p:nvPr/>
+        </p:nvSpPr>
+        <p:spPr>
+          <a:xfrm>
+            <a:off x="4648200" y="3575785"/>
+            <a:ext cx="1333500" cy="762000"/>
+          </a:xfrm>
+          <a:prstGeom prst="rect">
+            <a:avLst/>
+          </a:prstGeom>
+        </p:spPr>
+        <p:style>
+          <a:lnRef idx="2">
+            <a:schemeClr val="dk1"/>
+          </a:lnRef>
+          <a:fillRef idx="1">
+            <a:schemeClr val="lt1"/>
+          </a:fillRef>
+          <a:effectRef idx="0">
+            <a:schemeClr val="dk1"/>
+          </a:effectRef>
+          <a:fontRef idx="minor">
+            <a:schemeClr val="dk1"/>
+          </a:fontRef>
+        </p:style>
+        <p:txBody>
+          <a:bodyPr rtlCol="0" anchor="ctr"/>
+          <a:lstStyle/>
+          <a:p>
+            <a:pPr algn="ctr"/>
+            <a:r>
+              <a:rPr lang="en-US" dirty="0" err="1"/>
+              <a:t>CoffeeOrder</a:t>
+            </a:r>
+            <a:r>
+              <a:rPr lang="en-US" dirty="0"/>
+              <a:t> function</a:t>
+            </a:r>
+          </a:p>
+        </p:txBody>
+      </p:sp>
+      <p:sp>
+        <p:nvSpPr>
+          <p:cNvPr id="13" name="Rectangle 12"/>
+          <p:cNvSpPr/>
+          <p:nvPr/>
+        </p:nvSpPr>
+        <p:spPr>
+          <a:xfrm>
+            <a:off x="6139715" y="2341504"/>
+            <a:ext cx="1143000" cy="762000"/>
+          </a:xfrm>
+          <a:prstGeom prst="rect">
+            <a:avLst/>
+          </a:prstGeom>
+        </p:spPr>
+        <p:style>
+          <a:lnRef idx="2">
+            <a:schemeClr val="dk1"/>
+          </a:lnRef>
+          <a:fillRef idx="1">
+            <a:schemeClr val="lt1"/>
+          </a:fillRef>
+          <a:effectRef idx="0">
+            <a:schemeClr val="dk1"/>
+          </a:effectRef>
+          <a:fontRef idx="minor">
+            <a:schemeClr val="dk1"/>
+          </a:fontRef>
+        </p:style>
+        <p:txBody>
+          <a:bodyPr rtlCol="0" anchor="ctr"/>
+          <a:lstStyle/>
+          <a:p>
+            <a:pPr algn="ctr"/>
+            <a:r>
+              <a:rPr lang="en-US" dirty="0" err="1"/>
+              <a:t>BarOrder</a:t>
+            </a:r>
+            <a:r>
+              <a:rPr lang="en-US" dirty="0"/>
+              <a:t> function</a:t>
+            </a:r>
+          </a:p>
+        </p:txBody>
+      </p:sp>
+      <p:sp>
+        <p:nvSpPr>
+          <p:cNvPr id="15" name="Rectangle 14"/>
+          <p:cNvSpPr/>
+          <p:nvPr/>
+        </p:nvSpPr>
+        <p:spPr>
+          <a:xfrm>
+            <a:off x="6044465" y="3575785"/>
+            <a:ext cx="1333500" cy="762000"/>
+          </a:xfrm>
+          <a:prstGeom prst="rect">
+            <a:avLst/>
+          </a:prstGeom>
+        </p:spPr>
+        <p:style>
+          <a:lnRef idx="2">
+            <a:schemeClr val="dk1"/>
+          </a:lnRef>
+          <a:fillRef idx="1">
+            <a:schemeClr val="lt1"/>
+          </a:fillRef>
+          <a:effectRef idx="0">
+            <a:schemeClr val="dk1"/>
+          </a:effectRef>
+          <a:fontRef idx="minor">
+            <a:schemeClr val="dk1"/>
+          </a:fontRef>
+        </p:style>
+        <p:txBody>
+          <a:bodyPr rtlCol="0" anchor="ctr"/>
+          <a:lstStyle/>
+          <a:p>
+            <a:pPr algn="ctr"/>
+            <a:r>
+              <a:rPr lang="en-US" dirty="0" err="1"/>
+              <a:t>WineOrder</a:t>
+            </a:r>
+            <a:r>
+              <a:rPr lang="en-US" dirty="0"/>
+              <a:t> function</a:t>
+            </a:r>
+          </a:p>
+        </p:txBody>
+      </p:sp>
+      <p:sp>
+        <p:nvSpPr>
+          <p:cNvPr id="16" name="Rectangle 15"/>
+          <p:cNvSpPr/>
+          <p:nvPr/>
+        </p:nvSpPr>
+        <p:spPr>
+          <a:xfrm>
+            <a:off x="7505700" y="3595663"/>
+            <a:ext cx="1333500" cy="762000"/>
+          </a:xfrm>
+          <a:prstGeom prst="rect">
+            <a:avLst/>
+          </a:prstGeom>
+        </p:spPr>
+        <p:style>
+          <a:lnRef idx="2">
+            <a:schemeClr val="dk1"/>
+          </a:lnRef>
+          <a:fillRef idx="1">
+            <a:schemeClr val="lt1"/>
+          </a:fillRef>
+          <a:effectRef idx="0">
+            <a:schemeClr val="dk1"/>
+          </a:effectRef>
+          <a:fontRef idx="minor">
+            <a:schemeClr val="dk1"/>
+          </a:fontRef>
+        </p:style>
+        <p:txBody>
+          <a:bodyPr rtlCol="0" anchor="ctr"/>
+          <a:lstStyle/>
+          <a:p>
+            <a:pPr algn="ctr"/>
+            <a:r>
+              <a:rPr lang="en-US" dirty="0" err="1"/>
+              <a:t>TeaOrder</a:t>
+            </a:r>
+            <a:r>
+              <a:rPr lang="en-US" dirty="0"/>
+              <a:t> function</a:t>
+            </a:r>
+          </a:p>
+        </p:txBody>
+      </p:sp>
+      <p:sp>
+        <p:nvSpPr>
+          <p:cNvPr id="17" name="Isosceles Triangle 16"/>
+          <p:cNvSpPr/>
+          <p:nvPr/>
+        </p:nvSpPr>
+        <p:spPr>
+          <a:xfrm>
+            <a:off x="2252472" y="2966185"/>
+            <a:ext cx="295656" cy="274637"/>
+          </a:xfrm>
+          <a:prstGeom prst="triangle">
+            <a:avLst/>
+          </a:prstGeom>
+          <a:noFill/>
+          <a:ln>
+            <a:solidFill>
+              <a:schemeClr val="tx1"/>
+            </a:solidFill>
+          </a:ln>
+        </p:spPr>
+        <p:style>
+          <a:lnRef idx="2">
+            <a:schemeClr val="accent1">
+              <a:shade val="50000"/>
+            </a:schemeClr>
+          </a:lnRef>
+          <a:fillRef idx="1">
+            <a:schemeClr val="accent1"/>
+          </a:fillRef>
+          <a:effectRef idx="0">
+            <a:schemeClr val="accent1"/>
+          </a:effectRef>
+          <a:fontRef idx="minor">
+            <a:schemeClr val="lt1"/>
+          </a:fontRef>
+        </p:style>
+        <p:txBody>
+          <a:bodyPr rtlCol="0" anchor="ctr"/>
+          <a:lstStyle/>
+          <a:p>
+            <a:pPr algn="ctr"/>
+            <a:endParaRPr lang="en-US"/>
+          </a:p>
+        </p:txBody>
+      </p:sp>
+      <p:cxnSp>
+        <p:nvCxnSpPr>
+          <p:cNvPr id="21" name="Straight Arrow Connector 20"/>
+          <p:cNvCxnSpPr>
+            <a:stCxn id="13" idx="2"/>
+            <a:endCxn id="10" idx="0"/>
+          </p:cNvCxnSpPr>
+          <p:nvPr/>
+        </p:nvCxnSpPr>
+        <p:spPr>
+          <a:xfrm flipH="1">
+            <a:off x="5314950" y="3103504"/>
+            <a:ext cx="1396265" cy="472281"/>
+          </a:xfrm>
+          <a:prstGeom prst="straightConnector1">
+            <a:avLst/>
+          </a:prstGeom>
+          <a:ln w="19050">
+            <a:solidFill>
+              <a:schemeClr val="tx1"/>
+            </a:solidFill>
+            <a:tailEnd type="triangle"/>
+          </a:ln>
+        </p:spPr>
+        <p:style>
+          <a:lnRef idx="1">
+            <a:schemeClr val="accent1"/>
+          </a:lnRef>
+          <a:fillRef idx="0">
+            <a:schemeClr val="accent1"/>
+          </a:fillRef>
+          <a:effectRef idx="0">
+            <a:schemeClr val="accent1"/>
+          </a:effectRef>
+          <a:fontRef idx="minor">
+            <a:schemeClr val="tx1"/>
+          </a:fontRef>
+        </p:style>
+      </p:cxnSp>
+      <p:cxnSp>
+        <p:nvCxnSpPr>
+          <p:cNvPr id="23" name="Straight Arrow Connector 22"/>
+          <p:cNvCxnSpPr>
+            <a:stCxn id="13" idx="2"/>
+            <a:endCxn id="15" idx="0"/>
+          </p:cNvCxnSpPr>
+          <p:nvPr/>
+        </p:nvCxnSpPr>
+        <p:spPr>
+          <a:xfrm>
+            <a:off x="6711215" y="3103504"/>
+            <a:ext cx="0" cy="472281"/>
+          </a:xfrm>
+          <a:prstGeom prst="straightConnector1">
+            <a:avLst/>
+          </a:prstGeom>
+          <a:ln w="19050">
+            <a:solidFill>
+              <a:schemeClr val="tx1"/>
+            </a:solidFill>
+            <a:tailEnd type="triangle"/>
+          </a:ln>
+        </p:spPr>
+        <p:style>
+          <a:lnRef idx="1">
+            <a:schemeClr val="accent1"/>
+          </a:lnRef>
+          <a:fillRef idx="0">
+            <a:schemeClr val="accent1"/>
+          </a:fillRef>
+          <a:effectRef idx="0">
+            <a:schemeClr val="accent1"/>
+          </a:effectRef>
+          <a:fontRef idx="minor">
+            <a:schemeClr val="tx1"/>
+          </a:fontRef>
+        </p:style>
+      </p:cxnSp>
+      <p:cxnSp>
+        <p:nvCxnSpPr>
+          <p:cNvPr id="24" name="Straight Arrow Connector 23"/>
+          <p:cNvCxnSpPr>
+            <a:stCxn id="13" idx="2"/>
+            <a:endCxn id="16" idx="0"/>
+          </p:cNvCxnSpPr>
+          <p:nvPr/>
+        </p:nvCxnSpPr>
+        <p:spPr>
+          <a:xfrm>
+            <a:off x="6711215" y="3103504"/>
+            <a:ext cx="1461235" cy="492159"/>
+          </a:xfrm>
+          <a:prstGeom prst="straightConnector1">
+            <a:avLst/>
+          </a:prstGeom>
+          <a:ln w="19050">
+            <a:solidFill>
+              <a:schemeClr val="tx1"/>
+            </a:solidFill>
+            <a:tailEnd type="triangle"/>
+          </a:ln>
+        </p:spPr>
+        <p:style>
+          <a:lnRef idx="1">
+            <a:schemeClr val="accent1"/>
+          </a:lnRef>
+          <a:fillRef idx="0">
+            <a:schemeClr val="accent1"/>
+          </a:fillRef>
+          <a:effectRef idx="0">
+            <a:schemeClr val="accent1"/>
+          </a:effectRef>
+          <a:fontRef idx="minor">
+            <a:schemeClr val="tx1"/>
+          </a:fontRef>
+        </p:style>
+      </p:cxnSp>
+      <p:sp>
+        <p:nvSpPr>
+          <p:cNvPr id="27" name="TextBox 26"/>
+          <p:cNvSpPr txBox="1"/>
+          <p:nvPr/>
+        </p:nvSpPr>
+        <p:spPr>
+          <a:xfrm>
+            <a:off x="1295400" y="4648200"/>
+            <a:ext cx="2209800" cy="923330"/>
+          </a:xfrm>
+          <a:prstGeom prst="rect">
+            <a:avLst/>
+          </a:prstGeom>
+          <a:solidFill>
+            <a:schemeClr val="accent1">
+              <a:lumMod val="20000"/>
+              <a:lumOff val="80000"/>
+            </a:schemeClr>
+          </a:solidFill>
+        </p:spPr>
+        <p:txBody>
+          <a:bodyPr wrap="square" rtlCol="0">
+            <a:spAutoFit/>
+          </a:bodyPr>
+          <a:lstStyle/>
+          <a:p>
+            <a:r>
+              <a:rPr lang="en-US" dirty="0"/>
+              <a:t>Data Hierarchy (the open triangle means “OR”)</a:t>
+            </a:r>
+          </a:p>
+        </p:txBody>
+      </p:sp>
+      <p:sp>
+        <p:nvSpPr>
+          <p:cNvPr id="28" name="TextBox 27"/>
+          <p:cNvSpPr txBox="1"/>
+          <p:nvPr/>
+        </p:nvSpPr>
+        <p:spPr>
+          <a:xfrm flipH="1">
+            <a:off x="5682515" y="4660404"/>
+            <a:ext cx="2057400" cy="923330"/>
+          </a:xfrm>
+          <a:prstGeom prst="rect">
+            <a:avLst/>
+          </a:prstGeom>
+          <a:solidFill>
+            <a:schemeClr val="accent1">
+              <a:lumMod val="20000"/>
+              <a:lumOff val="80000"/>
+            </a:schemeClr>
+          </a:solidFill>
+        </p:spPr>
+        <p:txBody>
+          <a:bodyPr wrap="square" rtlCol="0">
+            <a:spAutoFit/>
+          </a:bodyPr>
+          <a:lstStyle/>
+          <a:p>
+            <a:r>
+              <a:rPr lang="en-US" dirty="0"/>
+              <a:t>Call Tree (the arrow goes from caller to </a:t>
+            </a:r>
+            <a:r>
+              <a:rPr lang="en-US" dirty="0" err="1"/>
+              <a:t>callee</a:t>
+            </a:r>
+            <a:r>
+              <a:rPr lang="en-US" dirty="0"/>
+              <a:t>)</a:t>
+            </a:r>
+          </a:p>
+        </p:txBody>
+      </p:sp>
+      <p:sp>
+        <p:nvSpPr>
+          <p:cNvPr id="29" name="TextBox 28"/>
+          <p:cNvSpPr txBox="1"/>
+          <p:nvPr/>
+        </p:nvSpPr>
+        <p:spPr>
+          <a:xfrm>
+            <a:off x="5789596" y="5710019"/>
+            <a:ext cx="3049604" cy="646331"/>
+          </a:xfrm>
+          <a:prstGeom prst="rect">
+            <a:avLst/>
+          </a:prstGeom>
+          <a:solidFill>
+            <a:schemeClr val="accent2">
+              <a:lumMod val="20000"/>
+              <a:lumOff val="80000"/>
+            </a:schemeClr>
+          </a:solidFill>
+        </p:spPr>
+        <p:txBody>
+          <a:bodyPr wrap="square" rtlCol="0">
+            <a:spAutoFit/>
+          </a:bodyPr>
+          <a:lstStyle/>
+          <a:p>
+            <a:r>
+              <a:rPr lang="en-US" dirty="0"/>
+              <a:t>We’ll see this principle over and over again!</a:t>
+            </a:r>
+          </a:p>
+        </p:txBody>
+      </p:sp>
+    </p:spTree>
+    <p:extLst>
+      <p:ext uri="{BB962C8B-B14F-4D97-AF65-F5344CB8AC3E}">
+        <p14:creationId xmlns:p14="http://schemas.microsoft.com/office/powerpoint/2010/main" val="3772012202"/>
+      </p:ext>
+    </p:extLst>
+  </p:cSld>
+  <p:clrMapOvr>
+    <a:masterClrMapping/>
+  </p:clrMapOvr>
+</p:sld>
+</file>
+
+<file path=ppt/slides/slide33.xml><?xml version="1.0" encoding="utf-8"?>
+<p:sld xmlns:a="http://schemas.openxmlformats.org/drawingml/2006/main" xmlns:r="http://schemas.openxmlformats.org/officeDocument/2006/relationships" xmlns:p="http://schemas.openxmlformats.org/presentationml/2006/main">
+  <p:cSld>
+    <p:spTree>
+      <p:nvGrpSpPr>
+        <p:cNvPr id="1" name=""/>
+        <p:cNvGrpSpPr/>
+        <p:nvPr/>
+      </p:nvGrpSpPr>
+      <p:grpSpPr>
+        <a:xfrm>
+          <a:off x="0" y="0"/>
+          <a:ext cx="0" cy="0"/>
+          <a:chOff x="0" y="0"/>
+          <a:chExt cx="0" cy="0"/>
+        </a:xfrm>
+      </p:grpSpPr>
+      <p:sp>
+        <p:nvSpPr>
+          <p:cNvPr id="2" name="Title 1"/>
+          <p:cNvSpPr>
+            <a:spLocks noGrp="1"/>
+          </p:cNvSpPr>
+          <p:nvPr>
+            <p:ph type="title"/>
+          </p:nvPr>
+        </p:nvSpPr>
+        <p:spPr/>
+        <p:txBody>
+          <a:bodyPr/>
+          <a:lstStyle/>
+          <a:p>
+            <a:r>
+              <a:rPr lang="en-US" dirty="0"/>
+              <a:t>DDR Step 7: Review</a:t>
+            </a:r>
+          </a:p>
+        </p:txBody>
+      </p:sp>
+      <p:sp>
+        <p:nvSpPr>
+          <p:cNvPr id="4" name="Content Placeholder 3"/>
+          <p:cNvSpPr>
+            <a:spLocks noGrp="1"/>
+          </p:cNvSpPr>
+          <p:nvPr>
+            <p:ph idx="1"/>
+          </p:nvPr>
+        </p:nvSpPr>
+        <p:spPr/>
+        <p:txBody>
+          <a:bodyPr/>
+          <a:lstStyle/>
+          <a:p>
+            <a:r>
+              <a:rPr lang="en-US" dirty="0"/>
+              <a:t>Nothing is done until you review it!</a:t>
+            </a:r>
+          </a:p>
+          <a:p>
+            <a:r>
+              <a:rPr lang="en-US" dirty="0"/>
+              <a:t>Before you move on, look at your data definition and ask the following questions</a:t>
+            </a:r>
+          </a:p>
+        </p:txBody>
+      </p:sp>
+      <p:sp>
+        <p:nvSpPr>
+          <p:cNvPr id="5" name="Slide Number Placeholder 4"/>
+          <p:cNvSpPr>
+            <a:spLocks noGrp="1"/>
+          </p:cNvSpPr>
+          <p:nvPr>
+            <p:ph type="sldNum" sz="quarter" idx="12"/>
+          </p:nvPr>
+        </p:nvSpPr>
+        <p:spPr/>
+        <p:txBody>
+          <a:bodyPr/>
+          <a:lstStyle/>
+          <a:p>
+            <a:fld id="{8D704B19-8EED-495A-99FA-12E5518CCC54}" type="slidenum">
+              <a:rPr lang="en-US" smtClean="0"/>
+              <a:pPr/>
+              <a:t>33</a:t>
             </a:fld>
             <a:endParaRPr lang="en-US"/>
           </a:p>
@@ -10509,7 +15146,7 @@
 </p:sld>
 </file>
 
-<file path=ppt/slides/slide32.xml><?xml version="1.0" encoding="utf-8"?>
+<file path=ppt/slides/slide34.xml><?xml version="1.0" encoding="utf-8"?>
 <p:sld xmlns:a="http://schemas.openxmlformats.org/drawingml/2006/main" xmlns:r="http://schemas.openxmlformats.org/officeDocument/2006/relationships" xmlns:p="http://schemas.openxmlformats.org/presentationml/2006/main">
   <p:cSld>
     <p:spTree>
@@ -10719,7 +15356,7 @@
             <a:fld id="{8D704B19-8EED-495A-99FA-12E5518CCC54}" type="slidenum">
               <a:rPr lang="en-US" smtClean="0"/>
               <a:pPr/>
-              <a:t>32</a:t>
+              <a:t>34</a:t>
             </a:fld>
             <a:endParaRPr lang="en-US"/>
           </a:p>
@@ -10738,7 +15375,7 @@
 </p:sld>
 </file>
 
-<file path=ppt/slides/slide33.xml><?xml version="1.0" encoding="utf-8"?>
+<file path=ppt/slides/slide35.xml><?xml version="1.0" encoding="utf-8"?>
 <p:sld xmlns:a="http://schemas.openxmlformats.org/drawingml/2006/main" xmlns:r="http://schemas.openxmlformats.org/officeDocument/2006/relationships" xmlns:p="http://schemas.openxmlformats.org/presentationml/2006/main">
   <p:cSld>
     <p:spTree>
@@ -10826,7 +15463,7 @@
           <a:p>
             <a:fld id="{2AF3B5EA-18B6-4040-9F78-6052AF49C681}" type="slidenum">
               <a:rPr lang="en-US" smtClean="0"/>
-              <a:t>33</a:t>
+              <a:t>35</a:t>
             </a:fld>
             <a:endParaRPr lang="en-US"/>
           </a:p>

</xml_diff>

<commit_message>
removed last few occurrences of 'mixed'
</commit_message>
<xml_diff>
--- a/Slides/Lesson 1.3 The Data Design Recipe.pptx
+++ b/Slides/Lesson 1.3 The Data Design Recipe.pptx
@@ -12124,7 +12124,15 @@
           <a:p>
             <a:r>
               <a:rPr lang="en-US" dirty="0"/>
-              <a:t>The observer template consists of a cond with as many clauses as there are cases.  The predicates in the cond select each case.</a:t>
+              <a:t>The observer template consists of a cond with as many clauses as there are cases.  The predicates in the cond select </a:t>
+            </a:r>
+            <a:r>
+              <a:rPr lang="en-US"/>
+              <a:t>the relevant case</a:t>
+            </a:r>
+            <a:r>
+              <a:rPr lang="en-US" dirty="0"/>
+              <a:t>.</a:t>
             </a:r>
           </a:p>
         </p:txBody>
@@ -16209,7 +16217,7 @@
           <a:p>
             <a:r>
               <a:rPr lang="en-US" dirty="0"/>
-              <a:t>At the end of step 1, you should know what kind of data you need (scalar, compound, mixed, etc.)</a:t>
+              <a:t>At the end of step 1, you should know what kind of data you need (scalar, compound, itemization, etc.)</a:t>
             </a:r>
           </a:p>
           <a:p>

</xml_diff>